<commit_message>
Einige kleinere Änderungen in der Präsentation
</commit_message>
<xml_diff>
--- a/presentations/Datenerzeugung und Datenanalyse_Sprint1_formatiert.pptx
+++ b/presentations/Datenerzeugung und Datenanalyse_Sprint1_formatiert.pptx
@@ -19,7 +19,7 @@
     <p:sldId id="270" r:id="rId10"/>
     <p:sldId id="271" r:id="rId11"/>
     <p:sldId id="272" r:id="rId12"/>
-    <p:sldId id="303" r:id="rId13"/>
+    <p:sldId id="319" r:id="rId13"/>
     <p:sldId id="302" r:id="rId14"/>
     <p:sldId id="273" r:id="rId15"/>
     <p:sldId id="274" r:id="rId16"/>
@@ -243,7 +243,7 @@
           <a:p>
             <a:fld id="{BD50FA3B-8C2A-45ED-9DC5-CB3028ABFCB7}" type="datetimeFigureOut">
               <a:rPr lang="de-DE" smtClean="0"/>
-              <a:t>08.11.2017</a:t>
+              <a:t>09.11.2017</a:t>
             </a:fld>
             <a:endParaRPr lang="de-DE"/>
           </a:p>
@@ -401,7 +401,7 @@
           <a:p>
             <a:fld id="{9246EBA2-7F35-4B7B-BE0F-6CB1169C1171}" type="slidenum">
               <a:rPr lang="de-DE" smtClean="0"/>
-              <a:t>‹#›</a:t>
+              <a:t>‹Nr.›</a:t>
             </a:fld>
             <a:endParaRPr lang="de-DE"/>
           </a:p>
@@ -849,7 +849,7 @@
           <a:p>
             <a:fld id="{26D84DCC-459A-439E-AA34-F06534B95DC9}" type="datetimeFigureOut">
               <a:rPr lang="de-DE" smtClean="0"/>
-              <a:t>08.11.2017</a:t>
+              <a:t>09.11.2017</a:t>
             </a:fld>
             <a:endParaRPr lang="de-DE"/>
           </a:p>
@@ -891,7 +891,7 @@
           <a:p>
             <a:fld id="{8EB1F8D4-1A17-4EA6-B4DA-69C0F3DAE759}" type="slidenum">
               <a:rPr lang="de-DE" smtClean="0"/>
-              <a:t>‹#›</a:t>
+              <a:t>‹Nr.›</a:t>
             </a:fld>
             <a:endParaRPr lang="de-DE"/>
           </a:p>
@@ -1019,7 +1019,7 @@
           <a:p>
             <a:fld id="{26D84DCC-459A-439E-AA34-F06534B95DC9}" type="datetimeFigureOut">
               <a:rPr lang="de-DE" smtClean="0"/>
-              <a:t>08.11.2017</a:t>
+              <a:t>09.11.2017</a:t>
             </a:fld>
             <a:endParaRPr lang="de-DE"/>
           </a:p>
@@ -1061,7 +1061,7 @@
           <a:p>
             <a:fld id="{8EB1F8D4-1A17-4EA6-B4DA-69C0F3DAE759}" type="slidenum">
               <a:rPr lang="de-DE" smtClean="0"/>
-              <a:t>‹#›</a:t>
+              <a:t>‹Nr.›</a:t>
             </a:fld>
             <a:endParaRPr lang="de-DE"/>
           </a:p>
@@ -1199,7 +1199,7 @@
           <a:p>
             <a:fld id="{26D84DCC-459A-439E-AA34-F06534B95DC9}" type="datetimeFigureOut">
               <a:rPr lang="de-DE" smtClean="0"/>
-              <a:t>08.11.2017</a:t>
+              <a:t>09.11.2017</a:t>
             </a:fld>
             <a:endParaRPr lang="de-DE"/>
           </a:p>
@@ -1241,7 +1241,7 @@
           <a:p>
             <a:fld id="{8EB1F8D4-1A17-4EA6-B4DA-69C0F3DAE759}" type="slidenum">
               <a:rPr lang="de-DE" smtClean="0"/>
-              <a:t>‹#›</a:t>
+              <a:t>‹Nr.›</a:t>
             </a:fld>
             <a:endParaRPr lang="de-DE"/>
           </a:p>
@@ -1369,7 +1369,7 @@
           <a:p>
             <a:fld id="{26D84DCC-459A-439E-AA34-F06534B95DC9}" type="datetimeFigureOut">
               <a:rPr lang="de-DE" smtClean="0"/>
-              <a:t>08.11.2017</a:t>
+              <a:t>09.11.2017</a:t>
             </a:fld>
             <a:endParaRPr lang="de-DE"/>
           </a:p>
@@ -1411,7 +1411,7 @@
           <a:p>
             <a:fld id="{8EB1F8D4-1A17-4EA6-B4DA-69C0F3DAE759}" type="slidenum">
               <a:rPr lang="de-DE" smtClean="0"/>
-              <a:t>‹#›</a:t>
+              <a:t>‹Nr.›</a:t>
             </a:fld>
             <a:endParaRPr lang="de-DE"/>
           </a:p>
@@ -1627,7 +1627,7 @@
           <a:p>
             <a:fld id="{26D84DCC-459A-439E-AA34-F06534B95DC9}" type="datetimeFigureOut">
               <a:rPr lang="de-DE" smtClean="0"/>
-              <a:t>08.11.2017</a:t>
+              <a:t>09.11.2017</a:t>
             </a:fld>
             <a:endParaRPr lang="de-DE"/>
           </a:p>
@@ -1669,7 +1669,7 @@
           <a:p>
             <a:fld id="{8EB1F8D4-1A17-4EA6-B4DA-69C0F3DAE759}" type="slidenum">
               <a:rPr lang="de-DE" smtClean="0"/>
-              <a:t>‹#›</a:t>
+              <a:t>‹Nr.›</a:t>
             </a:fld>
             <a:endParaRPr lang="de-DE"/>
           </a:p>
@@ -1915,7 +1915,7 @@
           <a:p>
             <a:fld id="{26D84DCC-459A-439E-AA34-F06534B95DC9}" type="datetimeFigureOut">
               <a:rPr lang="de-DE" smtClean="0"/>
-              <a:t>08.11.2017</a:t>
+              <a:t>09.11.2017</a:t>
             </a:fld>
             <a:endParaRPr lang="de-DE"/>
           </a:p>
@@ -1957,7 +1957,7 @@
           <a:p>
             <a:fld id="{8EB1F8D4-1A17-4EA6-B4DA-69C0F3DAE759}" type="slidenum">
               <a:rPr lang="de-DE" smtClean="0"/>
-              <a:t>‹#›</a:t>
+              <a:t>‹Nr.›</a:t>
             </a:fld>
             <a:endParaRPr lang="de-DE"/>
           </a:p>
@@ -2357,7 +2357,7 @@
           <a:p>
             <a:fld id="{26D84DCC-459A-439E-AA34-F06534B95DC9}" type="datetimeFigureOut">
               <a:rPr lang="de-DE" smtClean="0"/>
-              <a:t>08.11.2017</a:t>
+              <a:t>09.11.2017</a:t>
             </a:fld>
             <a:endParaRPr lang="de-DE"/>
           </a:p>
@@ -2399,7 +2399,7 @@
           <a:p>
             <a:fld id="{8EB1F8D4-1A17-4EA6-B4DA-69C0F3DAE759}" type="slidenum">
               <a:rPr lang="de-DE" smtClean="0"/>
-              <a:t>‹#›</a:t>
+              <a:t>‹Nr.›</a:t>
             </a:fld>
             <a:endParaRPr lang="de-DE"/>
           </a:p>
@@ -2475,7 +2475,7 @@
           <a:p>
             <a:fld id="{26D84DCC-459A-439E-AA34-F06534B95DC9}" type="datetimeFigureOut">
               <a:rPr lang="de-DE" smtClean="0"/>
-              <a:t>08.11.2017</a:t>
+              <a:t>09.11.2017</a:t>
             </a:fld>
             <a:endParaRPr lang="de-DE"/>
           </a:p>
@@ -2517,7 +2517,7 @@
           <a:p>
             <a:fld id="{8EB1F8D4-1A17-4EA6-B4DA-69C0F3DAE759}" type="slidenum">
               <a:rPr lang="de-DE" smtClean="0"/>
-              <a:t>‹#›</a:t>
+              <a:t>‹Nr.›</a:t>
             </a:fld>
             <a:endParaRPr lang="de-DE"/>
           </a:p>
@@ -2570,7 +2570,7 @@
           <a:p>
             <a:fld id="{26D84DCC-459A-439E-AA34-F06534B95DC9}" type="datetimeFigureOut">
               <a:rPr lang="de-DE" smtClean="0"/>
-              <a:t>08.11.2017</a:t>
+              <a:t>09.11.2017</a:t>
             </a:fld>
             <a:endParaRPr lang="de-DE"/>
           </a:p>
@@ -2612,7 +2612,7 @@
           <a:p>
             <a:fld id="{8EB1F8D4-1A17-4EA6-B4DA-69C0F3DAE759}" type="slidenum">
               <a:rPr lang="de-DE" smtClean="0"/>
-              <a:t>‹#›</a:t>
+              <a:t>‹Nr.›</a:t>
             </a:fld>
             <a:endParaRPr lang="de-DE"/>
           </a:p>
@@ -2858,7 +2858,7 @@
           <a:p>
             <a:fld id="{26D84DCC-459A-439E-AA34-F06534B95DC9}" type="datetimeFigureOut">
               <a:rPr lang="de-DE" smtClean="0"/>
-              <a:t>08.11.2017</a:t>
+              <a:t>09.11.2017</a:t>
             </a:fld>
             <a:endParaRPr lang="de-DE"/>
           </a:p>
@@ -2900,7 +2900,7 @@
           <a:p>
             <a:fld id="{8EB1F8D4-1A17-4EA6-B4DA-69C0F3DAE759}" type="slidenum">
               <a:rPr lang="de-DE" smtClean="0"/>
-              <a:t>‹#›</a:t>
+              <a:t>‹Nr.›</a:t>
             </a:fld>
             <a:endParaRPr lang="de-DE"/>
           </a:p>
@@ -3131,7 +3131,7 @@
           <a:p>
             <a:fld id="{26D84DCC-459A-439E-AA34-F06534B95DC9}" type="datetimeFigureOut">
               <a:rPr lang="de-DE" smtClean="0"/>
-              <a:t>08.11.2017</a:t>
+              <a:t>09.11.2017</a:t>
             </a:fld>
             <a:endParaRPr lang="de-DE"/>
           </a:p>
@@ -3178,7 +3178,7 @@
           <a:p>
             <a:fld id="{8EB1F8D4-1A17-4EA6-B4DA-69C0F3DAE759}" type="slidenum">
               <a:rPr lang="de-DE" smtClean="0"/>
-              <a:t>‹#›</a:t>
+              <a:t>‹Nr.›</a:t>
             </a:fld>
             <a:endParaRPr lang="de-DE"/>
           </a:p>
@@ -3428,7 +3428,7 @@
           <a:p>
             <a:fld id="{26D84DCC-459A-439E-AA34-F06534B95DC9}" type="datetimeFigureOut">
               <a:rPr lang="de-DE" smtClean="0"/>
-              <a:t>08.11.2017</a:t>
+              <a:t>09.11.2017</a:t>
             </a:fld>
             <a:endParaRPr lang="de-DE"/>
           </a:p>
@@ -3505,7 +3505,7 @@
           <a:p>
             <a:fld id="{8EB1F8D4-1A17-4EA6-B4DA-69C0F3DAE759}" type="slidenum">
               <a:rPr lang="de-DE" smtClean="0"/>
-              <a:t>‹#›</a:t>
+              <a:t>‹Nr.›</a:t>
             </a:fld>
             <a:endParaRPr lang="de-DE"/>
           </a:p>
@@ -4014,7 +4014,7 @@
           <p:cNvPr id="2" name="Titel 1">
             <a:extLst>
               <a:ext uri="{FF2B5EF4-FFF2-40B4-BE49-F238E27FC236}">
-                <a16:creationId xmlns:a16="http://schemas.microsoft.com/office/drawing/2014/main" id="{60271D86-4CB2-4409-B05F-BCA08D355142}"/>
+                <a16:creationId xmlns:a16="http://schemas.microsoft.com/office/drawing/2014/main" xmlns="" id="{60271D86-4CB2-4409-B05F-BCA08D355142}"/>
               </a:ext>
             </a:extLst>
           </p:cNvPr>
@@ -4044,7 +4044,7 @@
           <p:cNvPr id="3" name="Inhaltsplatzhalter 2">
             <a:extLst>
               <a:ext uri="{FF2B5EF4-FFF2-40B4-BE49-F238E27FC236}">
-                <a16:creationId xmlns:a16="http://schemas.microsoft.com/office/drawing/2014/main" id="{26DF3A91-1ACC-4D55-8616-F4C25321C110}"/>
+                <a16:creationId xmlns:a16="http://schemas.microsoft.com/office/drawing/2014/main" xmlns="" id="{26DF3A91-1ACC-4D55-8616-F4C25321C110}"/>
               </a:ext>
             </a:extLst>
           </p:cNvPr>
@@ -4242,7 +4242,7 @@
           <p:cNvPr id="2" name="Titel 1">
             <a:extLst>
               <a:ext uri="{FF2B5EF4-FFF2-40B4-BE49-F238E27FC236}">
-                <a16:creationId xmlns:a16="http://schemas.microsoft.com/office/drawing/2014/main" id="{CCAD9307-1B32-4D7F-9148-CD74FFEFF568}"/>
+                <a16:creationId xmlns:a16="http://schemas.microsoft.com/office/drawing/2014/main" xmlns="" id="{CCAD9307-1B32-4D7F-9148-CD74FFEFF568}"/>
               </a:ext>
             </a:extLst>
           </p:cNvPr>
@@ -4272,7 +4272,7 @@
           <p:cNvPr id="3" name="Inhaltsplatzhalter 2">
             <a:extLst>
               <a:ext uri="{FF2B5EF4-FFF2-40B4-BE49-F238E27FC236}">
-                <a16:creationId xmlns:a16="http://schemas.microsoft.com/office/drawing/2014/main" id="{D928D9F6-A085-466A-99D0-B93A9303E798}"/>
+                <a16:creationId xmlns:a16="http://schemas.microsoft.com/office/drawing/2014/main" xmlns="" id="{D928D9F6-A085-466A-99D0-B93A9303E798}"/>
               </a:ext>
             </a:extLst>
           </p:cNvPr>
@@ -4336,46 +4336,50 @@
       </p:grpSpPr>
       <p:sp>
         <p:nvSpPr>
-          <p:cNvPr id="2" name="Titel 1">
+          <p:cNvPr id="2" name="Title 6">
             <a:extLst>
               <a:ext uri="{FF2B5EF4-FFF2-40B4-BE49-F238E27FC236}">
-                <a16:creationId xmlns:a16="http://schemas.microsoft.com/office/drawing/2014/main" id="{CCAD9307-1B32-4D7F-9148-CD74FFEFF568}"/>
+                <a16:creationId xmlns:a16="http://schemas.microsoft.com/office/drawing/2014/main" xmlns="" id="{04F78A0C-BF40-4E0B-9FA4-AAAA57E3C4EF}"/>
               </a:ext>
             </a:extLst>
           </p:cNvPr>
-          <p:cNvSpPr>
-            <a:spLocks noGrp="1"/>
-          </p:cNvSpPr>
-          <p:nvPr>
-            <p:ph type="ctrTitle"/>
+          <p:cNvSpPr txBox="1">
+            <a:spLocks noGrp="1"/>
+          </p:cNvSpPr>
+          <p:nvPr>
+            <p:ph type="title"/>
           </p:nvPr>
         </p:nvSpPr>
         <p:spPr/>
         <p:txBody>
-          <a:bodyPr/>
-          <a:lstStyle/>
-          <a:p>
-            <a:r>
-              <a:rPr lang="de-DE" dirty="0"/>
-              <a:t>Selbsteinschätzung</a:t>
-            </a:r>
-          </a:p>
-        </p:txBody>
-      </p:sp>
-      <p:sp>
-        <p:nvSpPr>
-          <p:cNvPr id="3" name="Inhaltsplatzhalter 2">
+          <a:bodyPr>
+            <a:normAutofit/>
+          </a:bodyPr>
+          <a:lstStyle/>
+          <a:p>
+            <a:pPr lvl="0" algn="ctr"/>
+            <a:r>
+              <a:rPr lang="de-DE" sz="6600" dirty="0"/>
+              <a:t>~16 %</a:t>
+            </a:r>
+            <a:endParaRPr lang="en-GB" sz="2800" dirty="0"/>
+          </a:p>
+        </p:txBody>
+      </p:sp>
+      <p:sp>
+        <p:nvSpPr>
+          <p:cNvPr id="3" name="Content Placeholder 7">
             <a:extLst>
               <a:ext uri="{FF2B5EF4-FFF2-40B4-BE49-F238E27FC236}">
-                <a16:creationId xmlns:a16="http://schemas.microsoft.com/office/drawing/2014/main" id="{D928D9F6-A085-466A-99D0-B93A9303E798}"/>
+                <a16:creationId xmlns:a16="http://schemas.microsoft.com/office/drawing/2014/main" xmlns="" id="{3A52400E-A01D-4CCF-8280-EBE32B011F8E}"/>
               </a:ext>
             </a:extLst>
           </p:cNvPr>
-          <p:cNvSpPr>
-            <a:spLocks noGrp="1"/>
-          </p:cNvSpPr>
-          <p:nvPr>
-            <p:ph type="subTitle" idx="1"/>
+          <p:cNvSpPr txBox="1">
+            <a:spLocks noGrp="1"/>
+          </p:cNvSpPr>
+          <p:nvPr>
+            <p:ph idx="1"/>
           </p:nvPr>
         </p:nvSpPr>
         <p:spPr/>
@@ -4385,9 +4389,136 @@
           </a:bodyPr>
           <a:lstStyle/>
           <a:p>
-            <a:r>
-              <a:rPr lang="de-DE" sz="4800" dirty="0"/>
-              <a:t>16%</a:t>
+            <a:pPr marL="0" lvl="0" indent="0">
+              <a:lnSpc>
+                <a:spcPct val="200000"/>
+              </a:lnSpc>
+              <a:buNone/>
+            </a:pPr>
+            <a:r>
+              <a:rPr lang="de-DE" sz="2800" dirty="0">
+                <a:solidFill>
+                  <a:schemeClr val="tx1"/>
+                </a:solidFill>
+              </a:rPr>
+              <a:t>Selbsteinschätzung:</a:t>
+            </a:r>
+          </a:p>
+          <a:p>
+            <a:pPr lvl="0"/>
+            <a:r>
+              <a:rPr lang="de-DE" b="1" dirty="0">
+                <a:solidFill>
+                  <a:schemeClr val="tx1"/>
+                </a:solidFill>
+              </a:rPr>
+              <a:t>Einarbeitung in die Simulationssoftware Vadere 6%</a:t>
+            </a:r>
+          </a:p>
+          <a:p>
+            <a:pPr lvl="0"/>
+            <a:r>
+              <a:rPr lang="de-DE" b="1" dirty="0">
+                <a:solidFill>
+                  <a:schemeClr val="tx1"/>
+                </a:solidFill>
+              </a:rPr>
+              <a:t>Generierung der Test Szenarios 10%</a:t>
+            </a:r>
+          </a:p>
+          <a:p>
+            <a:pPr lvl="0"/>
+            <a:r>
+              <a:rPr lang="de-DE" b="1" dirty="0">
+                <a:solidFill>
+                  <a:schemeClr val="tx1"/>
+                </a:solidFill>
+              </a:rPr>
+              <a:t>Automatisierung von Simulationsdurchläufen 25%</a:t>
+            </a:r>
+          </a:p>
+          <a:p>
+            <a:pPr lvl="0"/>
+            <a:r>
+              <a:rPr lang="de-DE" dirty="0">
+                <a:solidFill>
+                  <a:schemeClr val="tx1"/>
+                </a:solidFill>
+              </a:rPr>
+              <a:t>Erstellen eines Datenformats für Trajektorien 20%</a:t>
+            </a:r>
+          </a:p>
+          <a:p>
+            <a:pPr lvl="0"/>
+            <a:r>
+              <a:rPr lang="de-DE" b="1" dirty="0">
+                <a:solidFill>
+                  <a:schemeClr val="tx1"/>
+                </a:solidFill>
+              </a:rPr>
+              <a:t>Literatur Recherche Bildfilter 4%</a:t>
+            </a:r>
+          </a:p>
+          <a:p>
+            <a:pPr lvl="0"/>
+            <a:r>
+              <a:rPr lang="de-DE" dirty="0">
+                <a:solidFill>
+                  <a:schemeClr val="tx1"/>
+                </a:solidFill>
+              </a:rPr>
+              <a:t>Personendichte 30%</a:t>
+            </a:r>
+          </a:p>
+          <a:p>
+            <a:pPr lvl="1"/>
+            <a:r>
+              <a:rPr lang="de-DE" dirty="0">
+                <a:solidFill>
+                  <a:schemeClr val="tx1"/>
+                </a:solidFill>
+              </a:rPr>
+              <a:t>Variante 1: Auslesung der Personendichte aus Vadere</a:t>
+            </a:r>
+          </a:p>
+          <a:p>
+            <a:pPr lvl="1"/>
+            <a:r>
+              <a:rPr lang="de-DE" dirty="0">
+                <a:solidFill>
+                  <a:schemeClr val="tx1"/>
+                </a:solidFill>
+              </a:rPr>
+              <a:t>Variante 2: Berechnung der Persoendichte aus Trajektorien</a:t>
+            </a:r>
+          </a:p>
+          <a:p>
+            <a:pPr lvl="1"/>
+            <a:r>
+              <a:rPr lang="de-DE" dirty="0">
+                <a:solidFill>
+                  <a:schemeClr val="tx1"/>
+                </a:solidFill>
+              </a:rPr>
+              <a:t>Testen der Ergebnisse</a:t>
+            </a:r>
+          </a:p>
+          <a:p>
+            <a:r>
+              <a:rPr lang="de-DE" dirty="0" err="1">
+                <a:solidFill>
+                  <a:schemeClr val="tx1"/>
+                </a:solidFill>
+              </a:rPr>
+              <a:t>Scrum</a:t>
+            </a:r>
+            <a:r>
+              <a:rPr lang="de-DE" dirty="0">
+                <a:solidFill>
+                  <a:schemeClr val="tx1"/>
+                </a:solidFill>
+              </a:rPr>
+              <a:t> Master 5%</a:t>
             </a:r>
           </a:p>
         </p:txBody>
@@ -4395,7 +4526,7 @@
     </p:spTree>
     <p:extLst>
       <p:ext uri="{BB962C8B-B14F-4D97-AF65-F5344CB8AC3E}">
-        <p14:creationId xmlns:p14="http://schemas.microsoft.com/office/powerpoint/2010/main" val="471301881"/>
+        <p14:creationId xmlns:p14="http://schemas.microsoft.com/office/powerpoint/2010/main" val="3812291170"/>
       </p:ext>
     </p:extLst>
   </p:cSld>
@@ -4430,7 +4561,7 @@
           <p:cNvPr id="2" name="Titel 1">
             <a:extLst>
               <a:ext uri="{FF2B5EF4-FFF2-40B4-BE49-F238E27FC236}">
-                <a16:creationId xmlns:a16="http://schemas.microsoft.com/office/drawing/2014/main" id="{CCAD9307-1B32-4D7F-9148-CD74FFEFF568}"/>
+                <a16:creationId xmlns:a16="http://schemas.microsoft.com/office/drawing/2014/main" xmlns="" id="{CCAD9307-1B32-4D7F-9148-CD74FFEFF568}"/>
               </a:ext>
             </a:extLst>
           </p:cNvPr>
@@ -4450,31 +4581,6 @@
               <a:rPr lang="de-DE" dirty="0"/>
               <a:t>Anita</a:t>
             </a:r>
-          </a:p>
-        </p:txBody>
-      </p:sp>
-      <p:sp>
-        <p:nvSpPr>
-          <p:cNvPr id="4" name="Subtitle 3">
-            <a:extLst>
-              <a:ext uri="{FF2B5EF4-FFF2-40B4-BE49-F238E27FC236}">
-                <a16:creationId xmlns:a16="http://schemas.microsoft.com/office/drawing/2014/main" id="{D5FD85F1-0B4A-418F-8F8F-960141868C05}"/>
-              </a:ext>
-            </a:extLst>
-          </p:cNvPr>
-          <p:cNvSpPr>
-            <a:spLocks noGrp="1"/>
-          </p:cNvSpPr>
-          <p:nvPr>
-            <p:ph type="subTitle" idx="1"/>
-          </p:nvPr>
-        </p:nvSpPr>
-        <p:spPr/>
-        <p:txBody>
-          <a:bodyPr/>
-          <a:lstStyle/>
-          <a:p>
-            <a:endParaRPr lang="en-GB"/>
           </a:p>
         </p:txBody>
       </p:sp>
@@ -4806,13 +4912,13 @@
           <p:nvPr>
             <p:extLst>
               <p:ext uri="{D42A27DB-BD31-4B8C-83A1-F6EECF244321}">
-                <p14:modId xmlns:p14="http://schemas.microsoft.com/office/powerpoint/2010/main" val="1129483908"/>
+                <p14:modId xmlns:p14="http://schemas.microsoft.com/office/powerpoint/2010/main" val="3510946681"/>
               </p:ext>
             </p:extLst>
           </p:nvPr>
         </p:nvGraphicFramePr>
         <p:xfrm>
-          <a:off x="3660606" y="3424428"/>
+          <a:off x="3499242" y="3424428"/>
           <a:ext cx="8278475" cy="579120"/>
         </p:xfrm>
         <a:graphic>
@@ -4825,56 +4931,56 @@
                 <a:gridCol w="1216476">
                   <a:extLst>
                     <a:ext uri="{9D8B030D-6E8A-4147-A177-3AD203B41FA5}">
-                      <a16:colId xmlns:a16="http://schemas.microsoft.com/office/drawing/2014/main" val="20000"/>
+                      <a16:colId xmlns:a16="http://schemas.microsoft.com/office/drawing/2014/main" xmlns="" val="20000"/>
                     </a:ext>
                   </a:extLst>
                 </a:gridCol>
                 <a:gridCol w="1455938">
                   <a:extLst>
                     <a:ext uri="{9D8B030D-6E8A-4147-A177-3AD203B41FA5}">
-                      <a16:colId xmlns:a16="http://schemas.microsoft.com/office/drawing/2014/main" val="20001"/>
+                      <a16:colId xmlns:a16="http://schemas.microsoft.com/office/drawing/2014/main" xmlns="" val="20001"/>
                     </a:ext>
                   </a:extLst>
                 </a:gridCol>
                 <a:gridCol w="1491449">
                   <a:extLst>
                     <a:ext uri="{9D8B030D-6E8A-4147-A177-3AD203B41FA5}">
-                      <a16:colId xmlns:a16="http://schemas.microsoft.com/office/drawing/2014/main" val="20002"/>
+                      <a16:colId xmlns:a16="http://schemas.microsoft.com/office/drawing/2014/main" xmlns="" val="20002"/>
                     </a:ext>
                   </a:extLst>
                 </a:gridCol>
                 <a:gridCol w="325313">
                   <a:extLst>
                     <a:ext uri="{9D8B030D-6E8A-4147-A177-3AD203B41FA5}">
-                      <a16:colId xmlns:a16="http://schemas.microsoft.com/office/drawing/2014/main" val="20003"/>
+                      <a16:colId xmlns:a16="http://schemas.microsoft.com/office/drawing/2014/main" xmlns="" val="20003"/>
                     </a:ext>
                   </a:extLst>
                 </a:gridCol>
                 <a:gridCol w="1491449">
                   <a:extLst>
                     <a:ext uri="{9D8B030D-6E8A-4147-A177-3AD203B41FA5}">
-                      <a16:colId xmlns:a16="http://schemas.microsoft.com/office/drawing/2014/main" val="20004"/>
+                      <a16:colId xmlns:a16="http://schemas.microsoft.com/office/drawing/2014/main" xmlns="" val="20004"/>
                     </a:ext>
                   </a:extLst>
                 </a:gridCol>
                 <a:gridCol w="585926">
                   <a:extLst>
                     <a:ext uri="{9D8B030D-6E8A-4147-A177-3AD203B41FA5}">
-                      <a16:colId xmlns:a16="http://schemas.microsoft.com/office/drawing/2014/main" val="20005"/>
+                      <a16:colId xmlns:a16="http://schemas.microsoft.com/office/drawing/2014/main" xmlns="" val="20005"/>
                     </a:ext>
                   </a:extLst>
                 </a:gridCol>
                 <a:gridCol w="949911">
                   <a:extLst>
                     <a:ext uri="{9D8B030D-6E8A-4147-A177-3AD203B41FA5}">
-                      <a16:colId xmlns:a16="http://schemas.microsoft.com/office/drawing/2014/main" val="20006"/>
+                      <a16:colId xmlns:a16="http://schemas.microsoft.com/office/drawing/2014/main" xmlns="" val="20006"/>
                     </a:ext>
                   </a:extLst>
                 </a:gridCol>
                 <a:gridCol w="762013">
                   <a:extLst>
                     <a:ext uri="{9D8B030D-6E8A-4147-A177-3AD203B41FA5}">
-                      <a16:colId xmlns:a16="http://schemas.microsoft.com/office/drawing/2014/main" val="20007"/>
+                      <a16:colId xmlns:a16="http://schemas.microsoft.com/office/drawing/2014/main" xmlns="" val="20007"/>
                     </a:ext>
                   </a:extLst>
                 </a:gridCol>
@@ -5010,7 +5116,7 @@
                 </a:tc>
                 <a:extLst>
                   <a:ext uri="{0D108BD9-81ED-4DB2-BD59-A6C34878D82A}">
-                    <a16:rowId xmlns:a16="http://schemas.microsoft.com/office/drawing/2014/main" val="10000"/>
+                    <a16:rowId xmlns:a16="http://schemas.microsoft.com/office/drawing/2014/main" xmlns="" val="10000"/>
                   </a:ext>
                 </a:extLst>
               </a:tr>
@@ -5149,7 +5255,7 @@
           <p:cNvPr id="2" name="Title 6">
             <a:extLst>
               <a:ext uri="{FF2B5EF4-FFF2-40B4-BE49-F238E27FC236}">
-                <a16:creationId xmlns:a16="http://schemas.microsoft.com/office/drawing/2014/main" id="{04F78A0C-BF40-4E0B-9FA4-AAAA57E3C4EF}"/>
+                <a16:creationId xmlns:a16="http://schemas.microsoft.com/office/drawing/2014/main" xmlns="" id="{04F78A0C-BF40-4E0B-9FA4-AAAA57E3C4EF}"/>
               </a:ext>
             </a:extLst>
           </p:cNvPr>
@@ -5181,7 +5287,7 @@
           <p:cNvPr id="3" name="Content Placeholder 7">
             <a:extLst>
               <a:ext uri="{FF2B5EF4-FFF2-40B4-BE49-F238E27FC236}">
-                <a16:creationId xmlns:a16="http://schemas.microsoft.com/office/drawing/2014/main" id="{3A52400E-A01D-4CCF-8280-EBE32B011F8E}"/>
+                <a16:creationId xmlns:a16="http://schemas.microsoft.com/office/drawing/2014/main" xmlns="" id="{3A52400E-A01D-4CCF-8280-EBE32B011F8E}"/>
               </a:ext>
             </a:extLst>
           </p:cNvPr>
@@ -5239,12 +5345,23 @@
           <a:p>
             <a:pPr lvl="0"/>
             <a:r>
+              <a:rPr lang="de-DE" dirty="0">
+                <a:solidFill>
+                  <a:schemeClr val="tx1"/>
+                </a:solidFill>
+              </a:rPr>
+              <a:t>Automatisierung von Simulationsdurchläufen 25%</a:t>
+            </a:r>
+          </a:p>
+          <a:p>
+            <a:pPr lvl="0"/>
+            <a:r>
               <a:rPr lang="de-DE" b="1" dirty="0">
                 <a:solidFill>
                   <a:schemeClr val="tx1"/>
                 </a:solidFill>
               </a:rPr>
-              <a:t>Automatisierung von Simulationsdurchläufen 25%</a:t>
+              <a:t>Erstellen eines Datenformats für Trajektorien 20%</a:t>
             </a:r>
           </a:p>
           <a:p>
@@ -5255,29 +5372,29 @@
                   <a:schemeClr val="tx1"/>
                 </a:solidFill>
               </a:rPr>
-              <a:t>Erstellen eines Datenformats für Trajektorien 20%</a:t>
+              <a:t>Literatur Recherche Bildfilter 4%</a:t>
             </a:r>
           </a:p>
           <a:p>
             <a:pPr lvl="0"/>
             <a:r>
+              <a:rPr lang="de-DE" b="1" dirty="0">
+                <a:solidFill>
+                  <a:schemeClr val="tx1"/>
+                </a:solidFill>
+              </a:rPr>
+              <a:t>Personendichte 30%</a:t>
+            </a:r>
+          </a:p>
+          <a:p>
+            <a:pPr lvl="1"/>
+            <a:r>
               <a:rPr lang="de-DE" dirty="0">
                 <a:solidFill>
                   <a:schemeClr val="tx1"/>
                 </a:solidFill>
               </a:rPr>
-              <a:t>Literatur Recherche Bildfilter 4%</a:t>
-            </a:r>
-          </a:p>
-          <a:p>
-            <a:pPr lvl="0"/>
-            <a:r>
-              <a:rPr lang="de-DE" b="1" dirty="0">
-                <a:solidFill>
-                  <a:schemeClr val="tx1"/>
-                </a:solidFill>
-              </a:rPr>
-              <a:t>Personendichte 30%</a:t>
+              <a:t>Variante 1: Auslesung der Personendichte aus Vadere</a:t>
             </a:r>
           </a:p>
           <a:p>
@@ -5288,7 +5405,7 @@
                   <a:schemeClr val="tx1"/>
                 </a:solidFill>
               </a:rPr>
-              <a:t>Variante 1: Auslesung der Personendichte aus Vadere</a:t>
+              <a:t>Variante 2: Berechnung der Persoendichte aus Trajektorien</a:t>
             </a:r>
           </a:p>
           <a:p>
@@ -5299,23 +5416,12 @@
                   <a:schemeClr val="tx1"/>
                 </a:solidFill>
               </a:rPr>
-              <a:t>Variante 2: Berechnung der Persoendichte aus Trajektorien</a:t>
-            </a:r>
-          </a:p>
-          <a:p>
-            <a:pPr lvl="1"/>
-            <a:r>
-              <a:rPr lang="de-DE" b="1" dirty="0">
-                <a:solidFill>
-                  <a:schemeClr val="tx1"/>
-                </a:solidFill>
-              </a:rPr>
               <a:t>Testen der Ergebnisse</a:t>
             </a:r>
           </a:p>
           <a:p>
             <a:r>
-              <a:rPr lang="de-DE" b="1" dirty="0" err="1">
+              <a:rPr lang="de-DE" dirty="0" err="1">
                 <a:solidFill>
                   <a:schemeClr val="tx1"/>
                 </a:solidFill>
@@ -5323,28 +5429,12 @@
               <a:t>Scrum</a:t>
             </a:r>
             <a:r>
-              <a:rPr lang="de-DE" b="1" dirty="0">
-                <a:solidFill>
-                  <a:schemeClr val="tx1"/>
-                </a:solidFill>
-              </a:rPr>
-              <a:t> Master</a:t>
-            </a:r>
-            <a:r>
               <a:rPr lang="de-DE" dirty="0">
                 <a:solidFill>
                   <a:schemeClr val="tx1"/>
                 </a:solidFill>
               </a:rPr>
-              <a:t> </a:t>
-            </a:r>
-            <a:r>
-              <a:rPr lang="de-DE" b="1" dirty="0">
-                <a:solidFill>
-                  <a:schemeClr val="tx1"/>
-                </a:solidFill>
-              </a:rPr>
-              <a:t>5%</a:t>
+              <a:t> Master 5%</a:t>
             </a:r>
           </a:p>
         </p:txBody>
@@ -5524,25 +5614,6 @@
           </a:p>
         </p:txBody>
       </p:sp>
-      <p:sp>
-        <p:nvSpPr>
-          <p:cNvPr id="3" name="Untertitel 2"/>
-          <p:cNvSpPr>
-            <a:spLocks noGrp="1"/>
-          </p:cNvSpPr>
-          <p:nvPr>
-            <p:ph type="subTitle" idx="1"/>
-          </p:nvPr>
-        </p:nvSpPr>
-        <p:spPr/>
-        <p:txBody>
-          <a:bodyPr/>
-          <a:lstStyle/>
-          <a:p>
-            <a:endParaRPr lang="de-DE"/>
-          </a:p>
-        </p:txBody>
-      </p:sp>
     </p:spTree>
     <p:extLst>
       <p:ext uri="{BB962C8B-B14F-4D97-AF65-F5344CB8AC3E}">
@@ -5612,7 +5683,7 @@
           <p:cNvPr id="3" name="Content Placeholder 2">
             <a:extLst>
               <a:ext uri="{FF2B5EF4-FFF2-40B4-BE49-F238E27FC236}">
-                <a16:creationId xmlns:a16="http://schemas.microsoft.com/office/drawing/2014/main" id="{5D4B6457-3E37-4879-A8CB-262CE10EA13A}"/>
+                <a16:creationId xmlns:a16="http://schemas.microsoft.com/office/drawing/2014/main" xmlns="" id="{5D4B6457-3E37-4879-A8CB-262CE10EA13A}"/>
               </a:ext>
             </a:extLst>
           </p:cNvPr>
@@ -5790,7 +5861,7 @@
           <p:cNvPr id="2" name="Title 1">
             <a:extLst>
               <a:ext uri="{FF2B5EF4-FFF2-40B4-BE49-F238E27FC236}">
-                <a16:creationId xmlns:a16="http://schemas.microsoft.com/office/drawing/2014/main" id="{42987CE7-B13A-4B59-8B96-2888C00F9009}"/>
+                <a16:creationId xmlns:a16="http://schemas.microsoft.com/office/drawing/2014/main" xmlns="" id="{42987CE7-B13A-4B59-8B96-2888C00F9009}"/>
               </a:ext>
             </a:extLst>
           </p:cNvPr>
@@ -6084,7 +6155,7 @@
           <p:cNvPr id="2" name="Title 1">
             <a:extLst>
               <a:ext uri="{FF2B5EF4-FFF2-40B4-BE49-F238E27FC236}">
-                <a16:creationId xmlns:a16="http://schemas.microsoft.com/office/drawing/2014/main" id="{093A1977-6FA5-4F92-8973-FAD67E671E73}"/>
+                <a16:creationId xmlns:a16="http://schemas.microsoft.com/office/drawing/2014/main" xmlns="" id="{093A1977-6FA5-4F92-8973-FAD67E671E73}"/>
               </a:ext>
             </a:extLst>
           </p:cNvPr>
@@ -6326,7 +6397,7 @@
           <p:cNvPr id="2" name="Title 1">
             <a:extLst>
               <a:ext uri="{FF2B5EF4-FFF2-40B4-BE49-F238E27FC236}">
-                <a16:creationId xmlns:a16="http://schemas.microsoft.com/office/drawing/2014/main" id="{980B2DBA-E02C-4557-864C-17B2FDEB2149}"/>
+                <a16:creationId xmlns:a16="http://schemas.microsoft.com/office/drawing/2014/main" xmlns="" id="{980B2DBA-E02C-4557-864C-17B2FDEB2149}"/>
               </a:ext>
             </a:extLst>
           </p:cNvPr>
@@ -6645,7 +6716,7 @@
           <p:cNvPr id="2" name="Title 6">
             <a:extLst>
               <a:ext uri="{FF2B5EF4-FFF2-40B4-BE49-F238E27FC236}">
-                <a16:creationId xmlns:a16="http://schemas.microsoft.com/office/drawing/2014/main" id="{04F78A0C-BF40-4E0B-9FA4-AAAA57E3C4EF}"/>
+                <a16:creationId xmlns:a16="http://schemas.microsoft.com/office/drawing/2014/main" xmlns="" id="{04F78A0C-BF40-4E0B-9FA4-AAAA57E3C4EF}"/>
               </a:ext>
             </a:extLst>
           </p:cNvPr>
@@ -6664,10 +6735,6 @@
           <a:lstStyle/>
           <a:p>
             <a:pPr lvl="0" algn="ctr"/>
-            <a:r>
-              <a:rPr lang="de-DE" sz="6600" dirty="0"/>
-              <a:t>17 %</a:t>
-            </a:r>
             <a:endParaRPr lang="en-GB" sz="2800" dirty="0"/>
           </a:p>
         </p:txBody>
@@ -6677,7 +6744,7 @@
           <p:cNvPr id="3" name="Content Placeholder 7">
             <a:extLst>
               <a:ext uri="{FF2B5EF4-FFF2-40B4-BE49-F238E27FC236}">
-                <a16:creationId xmlns:a16="http://schemas.microsoft.com/office/drawing/2014/main" id="{3A52400E-A01D-4CCF-8280-EBE32B011F8E}"/>
+                <a16:creationId xmlns:a16="http://schemas.microsoft.com/office/drawing/2014/main" xmlns="" id="{3A52400E-A01D-4CCF-8280-EBE32B011F8E}"/>
               </a:ext>
             </a:extLst>
           </p:cNvPr>
@@ -6746,7 +6813,7 @@
           <a:p>
             <a:pPr lvl="0"/>
             <a:r>
-              <a:rPr lang="de-DE" dirty="0">
+              <a:rPr lang="de-DE" b="1" dirty="0">
                 <a:solidFill>
                   <a:schemeClr val="tx1"/>
                 </a:solidFill>
@@ -6867,7 +6934,7 @@
           <p:cNvPr id="2" name="Title 1">
             <a:extLst>
               <a:ext uri="{FF2B5EF4-FFF2-40B4-BE49-F238E27FC236}">
-                <a16:creationId xmlns:a16="http://schemas.microsoft.com/office/drawing/2014/main" id="{4830BEB7-55A9-47F9-992E-3F39B8ED4A85}"/>
+                <a16:creationId xmlns:a16="http://schemas.microsoft.com/office/drawing/2014/main" xmlns="" id="{4830BEB7-55A9-47F9-992E-3F39B8ED4A85}"/>
               </a:ext>
             </a:extLst>
           </p:cNvPr>
@@ -6888,30 +6955,6 @@
               <a:t>Do</a:t>
             </a:r>
             <a:endParaRPr lang="en-GB" dirty="0"/>
-          </a:p>
-        </p:txBody>
-      </p:sp>
-      <p:sp>
-        <p:nvSpPr>
-          <p:cNvPr id="3" name="Inhaltsplatzhalter 2"/>
-          <p:cNvSpPr>
-            <a:spLocks noGrp="1"/>
-          </p:cNvSpPr>
-          <p:nvPr>
-            <p:ph type="subTitle" idx="1"/>
-          </p:nvPr>
-        </p:nvSpPr>
-        <p:spPr/>
-        <p:txBody>
-          <a:bodyPr>
-            <a:normAutofit/>
-          </a:bodyPr>
-          <a:lstStyle/>
-          <a:p>
-            <a:pPr marL="0" indent="0">
-              <a:buNone/>
-            </a:pPr>
-            <a:endParaRPr lang="en-GB" sz="4400" dirty="0"/>
           </a:p>
         </p:txBody>
       </p:sp>
@@ -7471,7 +7514,7 @@
           <p:cNvPr id="2" name="Title 6">
             <a:extLst>
               <a:ext uri="{FF2B5EF4-FFF2-40B4-BE49-F238E27FC236}">
-                <a16:creationId xmlns:a16="http://schemas.microsoft.com/office/drawing/2014/main" id="{04F78A0C-BF40-4E0B-9FA4-AAAA57E3C4EF}"/>
+                <a16:creationId xmlns:a16="http://schemas.microsoft.com/office/drawing/2014/main" xmlns="" id="{04F78A0C-BF40-4E0B-9FA4-AAAA57E3C4EF}"/>
               </a:ext>
             </a:extLst>
           </p:cNvPr>
@@ -7503,7 +7546,7 @@
           <p:cNvPr id="3" name="Content Placeholder 7">
             <a:extLst>
               <a:ext uri="{FF2B5EF4-FFF2-40B4-BE49-F238E27FC236}">
-                <a16:creationId xmlns:a16="http://schemas.microsoft.com/office/drawing/2014/main" id="{3A52400E-A01D-4CCF-8280-EBE32B011F8E}"/>
+                <a16:creationId xmlns:a16="http://schemas.microsoft.com/office/drawing/2014/main" xmlns="" id="{3A52400E-A01D-4CCF-8280-EBE32B011F8E}"/>
               </a:ext>
             </a:extLst>
           </p:cNvPr>
@@ -7804,7 +7847,7 @@
           <p:cNvPr id="9" name="Content Placeholder 8">
             <a:extLst>
               <a:ext uri="{FF2B5EF4-FFF2-40B4-BE49-F238E27FC236}">
-                <a16:creationId xmlns:a16="http://schemas.microsoft.com/office/drawing/2014/main" id="{08DF57E2-668B-4E5A-AEBF-D8CEC596E7D4}"/>
+                <a16:creationId xmlns:a16="http://schemas.microsoft.com/office/drawing/2014/main" xmlns="" id="{08DF57E2-668B-4E5A-AEBF-D8CEC596E7D4}"/>
               </a:ext>
             </a:extLst>
           </p:cNvPr>
@@ -8059,7 +8102,7 @@
           <p:cNvPr id="2" name="Title 6">
             <a:extLst>
               <a:ext uri="{FF2B5EF4-FFF2-40B4-BE49-F238E27FC236}">
-                <a16:creationId xmlns:a16="http://schemas.microsoft.com/office/drawing/2014/main" id="{04F78A0C-BF40-4E0B-9FA4-AAAA57E3C4EF}"/>
+                <a16:creationId xmlns:a16="http://schemas.microsoft.com/office/drawing/2014/main" xmlns="" id="{04F78A0C-BF40-4E0B-9FA4-AAAA57E3C4EF}"/>
               </a:ext>
             </a:extLst>
           </p:cNvPr>
@@ -8089,7 +8132,7 @@
           <p:cNvPr id="3" name="Content Placeholder 7">
             <a:extLst>
               <a:ext uri="{FF2B5EF4-FFF2-40B4-BE49-F238E27FC236}">
-                <a16:creationId xmlns:a16="http://schemas.microsoft.com/office/drawing/2014/main" id="{3A52400E-A01D-4CCF-8280-EBE32B011F8E}"/>
+                <a16:creationId xmlns:a16="http://schemas.microsoft.com/office/drawing/2014/main" xmlns="" id="{3A52400E-A01D-4CCF-8280-EBE32B011F8E}"/>
               </a:ext>
             </a:extLst>
           </p:cNvPr>
@@ -8193,7 +8236,7 @@
           <p:cNvPr id="2" name="Title 1">
             <a:extLst>
               <a:ext uri="{FF2B5EF4-FFF2-40B4-BE49-F238E27FC236}">
-                <a16:creationId xmlns:a16="http://schemas.microsoft.com/office/drawing/2014/main" id="{6A957F68-909E-49D3-98A5-0D417ABCFAB9}"/>
+                <a16:creationId xmlns:a16="http://schemas.microsoft.com/office/drawing/2014/main" xmlns="" id="{6A957F68-909E-49D3-98A5-0D417ABCFAB9}"/>
               </a:ext>
             </a:extLst>
           </p:cNvPr>
@@ -8225,7 +8268,7 @@
           <p:cNvPr id="3" name="Content Placeholder 2">
             <a:extLst>
               <a:ext uri="{FF2B5EF4-FFF2-40B4-BE49-F238E27FC236}">
-                <a16:creationId xmlns:a16="http://schemas.microsoft.com/office/drawing/2014/main" id="{D998EE4F-50DE-4482-A66D-E9A06C7DFD16}"/>
+                <a16:creationId xmlns:a16="http://schemas.microsoft.com/office/drawing/2014/main" xmlns="" id="{D998EE4F-50DE-4482-A66D-E9A06C7DFD16}"/>
               </a:ext>
             </a:extLst>
           </p:cNvPr>
@@ -8320,7 +8363,7 @@
           <p:cNvPr id="4" name="Content Placeholder 5">
             <a:extLst>
               <a:ext uri="{FF2B5EF4-FFF2-40B4-BE49-F238E27FC236}">
-                <a16:creationId xmlns:a16="http://schemas.microsoft.com/office/drawing/2014/main" id="{0CADCC4B-41EB-442D-8677-2E3D32E5998C}"/>
+                <a16:creationId xmlns:a16="http://schemas.microsoft.com/office/drawing/2014/main" xmlns="" id="{0CADCC4B-41EB-442D-8677-2E3D32E5998C}"/>
               </a:ext>
             </a:extLst>
           </p:cNvPr>
@@ -8382,7 +8425,7 @@
           <p:cNvPr id="2" name="Title 1">
             <a:extLst>
               <a:ext uri="{FF2B5EF4-FFF2-40B4-BE49-F238E27FC236}">
-                <a16:creationId xmlns:a16="http://schemas.microsoft.com/office/drawing/2014/main" id="{84CA9567-EE70-447E-95ED-B75B1E5769FC}"/>
+                <a16:creationId xmlns:a16="http://schemas.microsoft.com/office/drawing/2014/main" xmlns="" id="{84CA9567-EE70-447E-95ED-B75B1E5769FC}"/>
               </a:ext>
             </a:extLst>
           </p:cNvPr>
@@ -8414,7 +8457,7 @@
           <p:cNvPr id="3" name="Content Placeholder 2">
             <a:extLst>
               <a:ext uri="{FF2B5EF4-FFF2-40B4-BE49-F238E27FC236}">
-                <a16:creationId xmlns:a16="http://schemas.microsoft.com/office/drawing/2014/main" id="{492DD7BD-063F-4E3D-8E9A-3AB783D556D8}"/>
+                <a16:creationId xmlns:a16="http://schemas.microsoft.com/office/drawing/2014/main" xmlns="" id="{492DD7BD-063F-4E3D-8E9A-3AB783D556D8}"/>
               </a:ext>
             </a:extLst>
           </p:cNvPr>
@@ -8580,7 +8623,7 @@
           <p:cNvPr id="2" name="Title 1">
             <a:extLst>
               <a:ext uri="{FF2B5EF4-FFF2-40B4-BE49-F238E27FC236}">
-                <a16:creationId xmlns:a16="http://schemas.microsoft.com/office/drawing/2014/main" id="{125D1A1F-72A6-4F53-94B7-AA52911C148C}"/>
+                <a16:creationId xmlns:a16="http://schemas.microsoft.com/office/drawing/2014/main" xmlns="" id="{125D1A1F-72A6-4F53-94B7-AA52911C148C}"/>
               </a:ext>
             </a:extLst>
           </p:cNvPr>
@@ -8612,7 +8655,7 @@
           <p:cNvPr id="3" name="Content Placeholder 2">
             <a:extLst>
               <a:ext uri="{FF2B5EF4-FFF2-40B4-BE49-F238E27FC236}">
-                <a16:creationId xmlns:a16="http://schemas.microsoft.com/office/drawing/2014/main" id="{9200409B-6442-4073-882A-466AA2C1EA55}"/>
+                <a16:creationId xmlns:a16="http://schemas.microsoft.com/office/drawing/2014/main" xmlns="" id="{9200409B-6442-4073-882A-466AA2C1EA55}"/>
               </a:ext>
             </a:extLst>
           </p:cNvPr>
@@ -8714,7 +8757,7 @@
           <p:cNvPr id="2" name="Title 6">
             <a:extLst>
               <a:ext uri="{FF2B5EF4-FFF2-40B4-BE49-F238E27FC236}">
-                <a16:creationId xmlns:a16="http://schemas.microsoft.com/office/drawing/2014/main" id="{04F78A0C-BF40-4E0B-9FA4-AAAA57E3C4EF}"/>
+                <a16:creationId xmlns:a16="http://schemas.microsoft.com/office/drawing/2014/main" xmlns="" id="{04F78A0C-BF40-4E0B-9FA4-AAAA57E3C4EF}"/>
               </a:ext>
             </a:extLst>
           </p:cNvPr>
@@ -8746,7 +8789,7 @@
           <p:cNvPr id="3" name="Content Placeholder 7">
             <a:extLst>
               <a:ext uri="{FF2B5EF4-FFF2-40B4-BE49-F238E27FC236}">
-                <a16:creationId xmlns:a16="http://schemas.microsoft.com/office/drawing/2014/main" id="{3A52400E-A01D-4CCF-8280-EBE32B011F8E}"/>
+                <a16:creationId xmlns:a16="http://schemas.microsoft.com/office/drawing/2014/main" xmlns="" id="{3A52400E-A01D-4CCF-8280-EBE32B011F8E}"/>
               </a:ext>
             </a:extLst>
           </p:cNvPr>
@@ -8944,7 +8987,7 @@
           <p:cNvPr id="2" name="Title 6">
             <a:extLst>
               <a:ext uri="{FF2B5EF4-FFF2-40B4-BE49-F238E27FC236}">
-                <a16:creationId xmlns:a16="http://schemas.microsoft.com/office/drawing/2014/main" id="{04F78A0C-BF40-4E0B-9FA4-AAAA57E3C4EF}"/>
+                <a16:creationId xmlns:a16="http://schemas.microsoft.com/office/drawing/2014/main" xmlns="" id="{04F78A0C-BF40-4E0B-9FA4-AAAA57E3C4EF}"/>
               </a:ext>
             </a:extLst>
           </p:cNvPr>
@@ -8968,31 +9011,6 @@
               <a:t>Hubert</a:t>
             </a:r>
             <a:endParaRPr lang="en-GB" sz="2800" dirty="0"/>
-          </a:p>
-        </p:txBody>
-      </p:sp>
-      <p:sp>
-        <p:nvSpPr>
-          <p:cNvPr id="3" name="Subtitle 2">
-            <a:extLst>
-              <a:ext uri="{FF2B5EF4-FFF2-40B4-BE49-F238E27FC236}">
-                <a16:creationId xmlns:a16="http://schemas.microsoft.com/office/drawing/2014/main" id="{3ACF5549-6553-4B18-AE03-1EB8EB165B13}"/>
-              </a:ext>
-            </a:extLst>
-          </p:cNvPr>
-          <p:cNvSpPr>
-            <a:spLocks noGrp="1"/>
-          </p:cNvSpPr>
-          <p:nvPr>
-            <p:ph type="subTitle" idx="1"/>
-          </p:nvPr>
-        </p:nvSpPr>
-        <p:spPr/>
-        <p:txBody>
-          <a:bodyPr/>
-          <a:lstStyle/>
-          <a:p>
-            <a:endParaRPr lang="en-GB"/>
           </a:p>
         </p:txBody>
       </p:sp>
@@ -9034,7 +9052,7 @@
           <p:cNvPr id="2" name="Title 6">
             <a:extLst>
               <a:ext uri="{FF2B5EF4-FFF2-40B4-BE49-F238E27FC236}">
-                <a16:creationId xmlns:a16="http://schemas.microsoft.com/office/drawing/2014/main" id="{04F78A0C-BF40-4E0B-9FA4-AAAA57E3C4EF}"/>
+                <a16:creationId xmlns:a16="http://schemas.microsoft.com/office/drawing/2014/main" xmlns="" id="{04F78A0C-BF40-4E0B-9FA4-AAAA57E3C4EF}"/>
               </a:ext>
             </a:extLst>
           </p:cNvPr>
@@ -9066,7 +9084,7 @@
           <p:cNvPr id="3" name="Content Placeholder 7">
             <a:extLst>
               <a:ext uri="{FF2B5EF4-FFF2-40B4-BE49-F238E27FC236}">
-                <a16:creationId xmlns:a16="http://schemas.microsoft.com/office/drawing/2014/main" id="{3A52400E-A01D-4CCF-8280-EBE32B011F8E}"/>
+                <a16:creationId xmlns:a16="http://schemas.microsoft.com/office/drawing/2014/main" xmlns="" id="{3A52400E-A01D-4CCF-8280-EBE32B011F8E}"/>
               </a:ext>
             </a:extLst>
           </p:cNvPr>
@@ -9278,7 +9296,7 @@
           <p:cNvPr id="2" name="Title 6">
             <a:extLst>
               <a:ext uri="{FF2B5EF4-FFF2-40B4-BE49-F238E27FC236}">
-                <a16:creationId xmlns:a16="http://schemas.microsoft.com/office/drawing/2014/main" id="{04F78A0C-BF40-4E0B-9FA4-AAAA57E3C4EF}"/>
+                <a16:creationId xmlns:a16="http://schemas.microsoft.com/office/drawing/2014/main" xmlns="" id="{04F78A0C-BF40-4E0B-9FA4-AAAA57E3C4EF}"/>
               </a:ext>
             </a:extLst>
           </p:cNvPr>
@@ -9302,18 +9320,38 @@
           <a:lstStyle/>
           <a:p>
             <a:pPr lvl="0" algn="ctr"/>
+            <a:r>
+              <a:rPr lang="en-GB" sz="2800" dirty="0"/>
+              <a:t/>
+            </a:r>
             <a:br>
               <a:rPr lang="en-GB" sz="2800" dirty="0"/>
             </a:br>
+            <a:r>
+              <a:rPr lang="en-GB" sz="2800" dirty="0"/>
+              <a:t/>
+            </a:r>
             <a:br>
               <a:rPr lang="en-GB" sz="2800" dirty="0"/>
             </a:br>
+            <a:r>
+              <a:rPr lang="en-GB" sz="2800" dirty="0"/>
+              <a:t/>
+            </a:r>
             <a:br>
               <a:rPr lang="en-GB" sz="2800" dirty="0"/>
             </a:br>
+            <a:r>
+              <a:rPr lang="en-GB" sz="2800" dirty="0"/>
+              <a:t/>
+            </a:r>
             <a:br>
               <a:rPr lang="en-GB" sz="2800" dirty="0"/>
             </a:br>
+            <a:r>
+              <a:rPr lang="en-GB" sz="2800" dirty="0"/>
+              <a:t/>
+            </a:r>
             <a:br>
               <a:rPr lang="en-GB" sz="2800" dirty="0"/>
             </a:br>
@@ -9326,7 +9364,7 @@
           <p:cNvPr id="3" name="Content Placeholder 7">
             <a:extLst>
               <a:ext uri="{FF2B5EF4-FFF2-40B4-BE49-F238E27FC236}">
-                <a16:creationId xmlns:a16="http://schemas.microsoft.com/office/drawing/2014/main" id="{3A52400E-A01D-4CCF-8280-EBE32B011F8E}"/>
+                <a16:creationId xmlns:a16="http://schemas.microsoft.com/office/drawing/2014/main" xmlns="" id="{3A52400E-A01D-4CCF-8280-EBE32B011F8E}"/>
               </a:ext>
             </a:extLst>
           </p:cNvPr>
@@ -9434,7 +9472,7 @@
           <p:cNvPr id="2" name="Title 6">
             <a:extLst>
               <a:ext uri="{FF2B5EF4-FFF2-40B4-BE49-F238E27FC236}">
-                <a16:creationId xmlns:a16="http://schemas.microsoft.com/office/drawing/2014/main" id="{04F78A0C-BF40-4E0B-9FA4-AAAA57E3C4EF}"/>
+                <a16:creationId xmlns:a16="http://schemas.microsoft.com/office/drawing/2014/main" xmlns="" id="{04F78A0C-BF40-4E0B-9FA4-AAAA57E3C4EF}"/>
               </a:ext>
             </a:extLst>
           </p:cNvPr>
@@ -9470,7 +9508,7 @@
           <p:cNvPr id="3" name="Content Placeholder 7">
             <a:extLst>
               <a:ext uri="{FF2B5EF4-FFF2-40B4-BE49-F238E27FC236}">
-                <a16:creationId xmlns:a16="http://schemas.microsoft.com/office/drawing/2014/main" id="{3A52400E-A01D-4CCF-8280-EBE32B011F8E}"/>
+                <a16:creationId xmlns:a16="http://schemas.microsoft.com/office/drawing/2014/main" xmlns="" id="{3A52400E-A01D-4CCF-8280-EBE32B011F8E}"/>
               </a:ext>
             </a:extLst>
           </p:cNvPr>
@@ -9540,7 +9578,7 @@
           <p:cNvPr id="2" name="Title 6">
             <a:extLst>
               <a:ext uri="{FF2B5EF4-FFF2-40B4-BE49-F238E27FC236}">
-                <a16:creationId xmlns:a16="http://schemas.microsoft.com/office/drawing/2014/main" id="{04F78A0C-BF40-4E0B-9FA4-AAAA57E3C4EF}"/>
+                <a16:creationId xmlns:a16="http://schemas.microsoft.com/office/drawing/2014/main" xmlns="" id="{04F78A0C-BF40-4E0B-9FA4-AAAA57E3C4EF}"/>
               </a:ext>
             </a:extLst>
           </p:cNvPr>
@@ -9572,7 +9610,7 @@
           <p:cNvPr id="3" name="Content Placeholder 7">
             <a:extLst>
               <a:ext uri="{FF2B5EF4-FFF2-40B4-BE49-F238E27FC236}">
-                <a16:creationId xmlns:a16="http://schemas.microsoft.com/office/drawing/2014/main" id="{3A52400E-A01D-4CCF-8280-EBE32B011F8E}"/>
+                <a16:creationId xmlns:a16="http://schemas.microsoft.com/office/drawing/2014/main" xmlns="" id="{3A52400E-A01D-4CCF-8280-EBE32B011F8E}"/>
               </a:ext>
             </a:extLst>
           </p:cNvPr>
@@ -9762,7 +9800,7 @@
           <p:cNvPr id="8" name="Text Placeholder 7">
             <a:extLst>
               <a:ext uri="{FF2B5EF4-FFF2-40B4-BE49-F238E27FC236}">
-                <a16:creationId xmlns:a16="http://schemas.microsoft.com/office/drawing/2014/main" id="{7C7B7B5E-EB63-48A8-BCF5-30057479D808}"/>
+                <a16:creationId xmlns:a16="http://schemas.microsoft.com/office/drawing/2014/main" xmlns="" id="{7C7B7B5E-EB63-48A8-BCF5-30057479D808}"/>
               </a:ext>
             </a:extLst>
           </p:cNvPr>
@@ -9801,7 +9839,7 @@
           <p:cNvPr id="9" name="Content Placeholder 8">
             <a:extLst>
               <a:ext uri="{FF2B5EF4-FFF2-40B4-BE49-F238E27FC236}">
-                <a16:creationId xmlns:a16="http://schemas.microsoft.com/office/drawing/2014/main" id="{B69192B4-B668-4E8C-8C21-3A34BA8E13E7}"/>
+                <a16:creationId xmlns:a16="http://schemas.microsoft.com/office/drawing/2014/main" xmlns="" id="{B69192B4-B668-4E8C-8C21-3A34BA8E13E7}"/>
               </a:ext>
             </a:extLst>
           </p:cNvPr>
@@ -9851,12 +9889,12 @@
               <a:t>Gute Kommunikation über </a:t>
             </a:r>
             <a:r>
-              <a:rPr lang="de-DE" sz="2400" dirty="0" err="1">
-                <a:solidFill>
-                  <a:schemeClr val="tx1"/>
-                </a:solidFill>
-              </a:rPr>
-              <a:t>Whatsapp</a:t>
+              <a:rPr lang="de-DE" sz="2400" dirty="0" smtClean="0">
+                <a:solidFill>
+                  <a:schemeClr val="tx1"/>
+                </a:solidFill>
+              </a:rPr>
+              <a:t>WhatsApp</a:t>
             </a:r>
             <a:r>
               <a:rPr lang="de-DE" sz="2400" dirty="0">
@@ -9867,7 +9905,15 @@
               <a:t>, </a:t>
             </a:r>
             <a:r>
-              <a:rPr lang="de-DE" sz="2400" dirty="0" err="1">
+              <a:rPr lang="de-DE" sz="2400" dirty="0" smtClean="0">
+                <a:solidFill>
+                  <a:schemeClr val="tx1"/>
+                </a:solidFill>
+              </a:rPr>
+              <a:t>Skype, </a:t>
+            </a:r>
+            <a:r>
+              <a:rPr lang="de-DE" sz="2400" dirty="0" err="1" smtClean="0">
                 <a:solidFill>
                   <a:schemeClr val="tx1"/>
                 </a:solidFill>
@@ -9924,7 +9970,7 @@
           <p:cNvPr id="10" name="Text Placeholder 9">
             <a:extLst>
               <a:ext uri="{FF2B5EF4-FFF2-40B4-BE49-F238E27FC236}">
-                <a16:creationId xmlns:a16="http://schemas.microsoft.com/office/drawing/2014/main" id="{528A301B-E3B1-4B35-BE7D-F69C91D785D0}"/>
+                <a16:creationId xmlns:a16="http://schemas.microsoft.com/office/drawing/2014/main" xmlns="" id="{528A301B-E3B1-4B35-BE7D-F69C91D785D0}"/>
               </a:ext>
             </a:extLst>
           </p:cNvPr>
@@ -9963,7 +10009,7 @@
           <p:cNvPr id="11" name="Content Placeholder 10">
             <a:extLst>
               <a:ext uri="{FF2B5EF4-FFF2-40B4-BE49-F238E27FC236}">
-                <a16:creationId xmlns:a16="http://schemas.microsoft.com/office/drawing/2014/main" id="{33DCA290-89C4-4275-A93D-319C803D2771}"/>
+                <a16:creationId xmlns:a16="http://schemas.microsoft.com/office/drawing/2014/main" xmlns="" id="{33DCA290-89C4-4275-A93D-319C803D2771}"/>
               </a:ext>
             </a:extLst>
           </p:cNvPr>
@@ -9991,13 +10037,64 @@
               <a:buChar char="•"/>
             </a:pPr>
             <a:r>
-              <a:rPr lang="de-DE" sz="2400" dirty="0">
-                <a:solidFill>
-                  <a:schemeClr val="tx1"/>
-                </a:solidFill>
-              </a:rPr>
-              <a:t>Kommunikation zwischen den Gruppen zu Beginn schwierig</a:t>
-            </a:r>
+              <a:rPr lang="de-DE" sz="2400" dirty="0" smtClean="0">
+                <a:solidFill>
+                  <a:schemeClr val="tx1"/>
+                </a:solidFill>
+              </a:rPr>
+              <a:t>Anfängliche Kommunikation </a:t>
+            </a:r>
+          </a:p>
+          <a:p>
+            <a:pPr marL="631825" indent="-363538">
+              <a:buFont typeface="Wingdings" panose="05000000000000000000" pitchFamily="2" charset="2"/>
+              <a:buChar char="Ø"/>
+            </a:pPr>
+            <a:r>
+              <a:rPr lang="de-DE" sz="2400" dirty="0" smtClean="0">
+                <a:solidFill>
+                  <a:schemeClr val="tx1"/>
+                </a:solidFill>
+              </a:rPr>
+              <a:t>Behoben durch </a:t>
+            </a:r>
+            <a:r>
+              <a:rPr lang="de-DE" sz="2400" dirty="0" err="1" smtClean="0">
+                <a:solidFill>
+                  <a:schemeClr val="tx1"/>
+                </a:solidFill>
+              </a:rPr>
+              <a:t>Slack</a:t>
+            </a:r>
+            <a:r>
+              <a:rPr lang="de-DE" sz="2400" dirty="0" smtClean="0">
+                <a:solidFill>
+                  <a:schemeClr val="tx1"/>
+                </a:solidFill>
+              </a:rPr>
+              <a:t> und </a:t>
+            </a:r>
+            <a:r>
+              <a:rPr lang="de-DE" sz="2400" dirty="0" err="1" smtClean="0">
+                <a:solidFill>
+                  <a:schemeClr val="tx1"/>
+                </a:solidFill>
+              </a:rPr>
+              <a:t>Srum</a:t>
+            </a:r>
+            <a:r>
+              <a:rPr lang="de-DE" sz="2400" dirty="0" smtClean="0">
+                <a:solidFill>
+                  <a:schemeClr val="tx1"/>
+                </a:solidFill>
+              </a:rPr>
+              <a:t> Master</a:t>
+            </a:r>
+            <a:endParaRPr lang="de-DE" sz="2400" dirty="0">
+              <a:solidFill>
+                <a:schemeClr val="tx1"/>
+              </a:solidFill>
+            </a:endParaRPr>
           </a:p>
           <a:p>
             <a:pPr marL="285750" indent="-285750">
@@ -10010,8 +10107,35 @@
                   <a:schemeClr val="tx1"/>
                 </a:solidFill>
               </a:rPr>
-              <a:t>Datenauslieferung hat länger gedauert, als geplant</a:t>
-            </a:r>
+              <a:t>Datenauslieferung hat länger gedauert, als </a:t>
+            </a:r>
+            <a:r>
+              <a:rPr lang="de-DE" sz="2400" dirty="0" smtClean="0">
+                <a:solidFill>
+                  <a:schemeClr val="tx1"/>
+                </a:solidFill>
+              </a:rPr>
+              <a:t>geplant</a:t>
+            </a:r>
+          </a:p>
+          <a:p>
+            <a:pPr marL="706437" indent="-342900">
+              <a:buFont typeface="Wingdings" panose="05000000000000000000" pitchFamily="2" charset="2"/>
+              <a:buChar char="Ø"/>
+            </a:pPr>
+            <a:r>
+              <a:rPr lang="de-DE" sz="2400" dirty="0" smtClean="0">
+                <a:solidFill>
+                  <a:schemeClr val="tx1"/>
+                </a:solidFill>
+              </a:rPr>
+              <a:t>Bessere Einschätzung</a:t>
+            </a:r>
+            <a:endParaRPr lang="de-DE" sz="2400" dirty="0">
+              <a:solidFill>
+                <a:schemeClr val="tx1"/>
+              </a:solidFill>
+            </a:endParaRPr>
           </a:p>
           <a:p>
             <a:endParaRPr lang="en-GB" sz="2400" dirty="0">
@@ -10027,7 +10151,7 @@
           <p:cNvPr id="12" name="Arrow: Down 11">
             <a:extLst>
               <a:ext uri="{FF2B5EF4-FFF2-40B4-BE49-F238E27FC236}">
-                <a16:creationId xmlns:a16="http://schemas.microsoft.com/office/drawing/2014/main" id="{5F710989-371B-4482-A9BD-56DFD57DBD75}"/>
+                <a16:creationId xmlns:a16="http://schemas.microsoft.com/office/drawing/2014/main" xmlns="" id="{5F710989-371B-4482-A9BD-56DFD57DBD75}"/>
               </a:ext>
             </a:extLst>
           </p:cNvPr>
@@ -10081,7 +10205,7 @@
           <p:cNvPr id="13" name="Arrow: Down 12">
             <a:extLst>
               <a:ext uri="{FF2B5EF4-FFF2-40B4-BE49-F238E27FC236}">
-                <a16:creationId xmlns:a16="http://schemas.microsoft.com/office/drawing/2014/main" id="{3C3CD861-7549-47BE-8D26-BF01FD79F024}"/>
+                <a16:creationId xmlns:a16="http://schemas.microsoft.com/office/drawing/2014/main" xmlns="" id="{3C3CD861-7549-47BE-8D26-BF01FD79F024}"/>
               </a:ext>
             </a:extLst>
           </p:cNvPr>
@@ -10168,7 +10292,7 @@
           <p:cNvPr id="2" name="Title 6">
             <a:extLst>
               <a:ext uri="{FF2B5EF4-FFF2-40B4-BE49-F238E27FC236}">
-                <a16:creationId xmlns:a16="http://schemas.microsoft.com/office/drawing/2014/main" id="{04F78A0C-BF40-4E0B-9FA4-AAAA57E3C4EF}"/>
+                <a16:creationId xmlns:a16="http://schemas.microsoft.com/office/drawing/2014/main" xmlns="" id="{04F78A0C-BF40-4E0B-9FA4-AAAA57E3C4EF}"/>
               </a:ext>
             </a:extLst>
           </p:cNvPr>
@@ -10200,7 +10324,7 @@
           <p:cNvPr id="4" name="Subtitle 3">
             <a:extLst>
               <a:ext uri="{FF2B5EF4-FFF2-40B4-BE49-F238E27FC236}">
-                <a16:creationId xmlns:a16="http://schemas.microsoft.com/office/drawing/2014/main" id="{944F6B10-491F-4152-9337-40A35086FCEA}"/>
+                <a16:creationId xmlns:a16="http://schemas.microsoft.com/office/drawing/2014/main" xmlns="" id="{944F6B10-491F-4152-9337-40A35086FCEA}"/>
               </a:ext>
             </a:extLst>
           </p:cNvPr>
@@ -10288,7 +10412,7 @@
           <p:cNvPr id="3" name="Content Placeholder 2">
             <a:extLst>
               <a:ext uri="{FF2B5EF4-FFF2-40B4-BE49-F238E27FC236}">
-                <a16:creationId xmlns:a16="http://schemas.microsoft.com/office/drawing/2014/main" id="{F7349B0D-CF00-4A1B-8AF6-99D24FD1B835}"/>
+                <a16:creationId xmlns:a16="http://schemas.microsoft.com/office/drawing/2014/main" xmlns="" id="{F7349B0D-CF00-4A1B-8AF6-99D24FD1B835}"/>
               </a:ext>
             </a:extLst>
           </p:cNvPr>
@@ -10464,7 +10588,7 @@
           <p:cNvPr id="3" name="Content Placeholder 2">
             <a:extLst>
               <a:ext uri="{FF2B5EF4-FFF2-40B4-BE49-F238E27FC236}">
-                <a16:creationId xmlns:a16="http://schemas.microsoft.com/office/drawing/2014/main" id="{7F058883-6F2A-40BA-866C-965B491E500F}"/>
+                <a16:creationId xmlns:a16="http://schemas.microsoft.com/office/drawing/2014/main" xmlns="" id="{7F058883-6F2A-40BA-866C-965B491E500F}"/>
               </a:ext>
             </a:extLst>
           </p:cNvPr>
@@ -10486,27 +10610,33 @@
                   <a:schemeClr val="tx1"/>
                 </a:solidFill>
               </a:rPr>
-              <a:t>Vadere: Probleme beim bei der Simulation (Instabil)</a:t>
-            </a:r>
-          </a:p>
-          <a:p>
+              <a:t>Vadere: Probleme beim bei der </a:t>
+            </a:r>
+            <a:r>
+              <a:rPr lang="de-DE" dirty="0" smtClean="0">
+                <a:solidFill>
+                  <a:schemeClr val="tx1"/>
+                </a:solidFill>
+              </a:rPr>
+              <a:t>Simulation</a:t>
+            </a:r>
+          </a:p>
+          <a:p>
+            <a:r>
+              <a:rPr lang="de-DE" dirty="0" smtClean="0">
+                <a:solidFill>
+                  <a:schemeClr val="tx1"/>
+                </a:solidFill>
+              </a:rPr>
+              <a:t>Automatisierung</a:t>
+            </a:r>
             <a:r>
               <a:rPr lang="de-DE" dirty="0">
                 <a:solidFill>
                   <a:schemeClr val="tx1"/>
                 </a:solidFill>
               </a:rPr>
-              <a:t>Einarbeitung in Vadere/Python ist zeitaufwendig</a:t>
-            </a:r>
-          </a:p>
-          <a:p>
-            <a:r>
-              <a:rPr lang="de-DE" dirty="0">
-                <a:solidFill>
-                  <a:schemeClr val="tx1"/>
-                </a:solidFill>
-              </a:rPr>
-              <a:t>Automatisierung: Starten der Simulation von außerhalb </a:t>
+              <a:t>: Starten der Simulation von außerhalb </a:t>
             </a:r>
             <a:r>
               <a:rPr lang="de-DE" dirty="0" err="1">
@@ -10562,7 +10692,7 @@
           <p:cNvPr id="2" name="Title 6">
             <a:extLst>
               <a:ext uri="{FF2B5EF4-FFF2-40B4-BE49-F238E27FC236}">
-                <a16:creationId xmlns:a16="http://schemas.microsoft.com/office/drawing/2014/main" id="{04F78A0C-BF40-4E0B-9FA4-AAAA57E3C4EF}"/>
+                <a16:creationId xmlns:a16="http://schemas.microsoft.com/office/drawing/2014/main" xmlns="" id="{04F78A0C-BF40-4E0B-9FA4-AAAA57E3C4EF}"/>
               </a:ext>
             </a:extLst>
           </p:cNvPr>
@@ -10594,7 +10724,7 @@
           <p:cNvPr id="3" name="Content Placeholder 7">
             <a:extLst>
               <a:ext uri="{FF2B5EF4-FFF2-40B4-BE49-F238E27FC236}">
-                <a16:creationId xmlns:a16="http://schemas.microsoft.com/office/drawing/2014/main" id="{3A52400E-A01D-4CCF-8280-EBE32B011F8E}"/>
+                <a16:creationId xmlns:a16="http://schemas.microsoft.com/office/drawing/2014/main" xmlns="" id="{3A52400E-A01D-4CCF-8280-EBE32B011F8E}"/>
               </a:ext>
             </a:extLst>
           </p:cNvPr>
@@ -10800,7 +10930,7 @@
           <p:cNvPr id="11" name="Text Placeholder 10">
             <a:extLst>
               <a:ext uri="{FF2B5EF4-FFF2-40B4-BE49-F238E27FC236}">
-                <a16:creationId xmlns:a16="http://schemas.microsoft.com/office/drawing/2014/main" id="{EA176D17-8200-422B-A524-7F10475ECEF8}"/>
+                <a16:creationId xmlns:a16="http://schemas.microsoft.com/office/drawing/2014/main" xmlns="" id="{EA176D17-8200-422B-A524-7F10475ECEF8}"/>
               </a:ext>
             </a:extLst>
           </p:cNvPr>
@@ -10844,7 +10974,7 @@
           <p:cNvPr id="8" name="Content Placeholder 7">
             <a:extLst>
               <a:ext uri="{FF2B5EF4-FFF2-40B4-BE49-F238E27FC236}">
-                <a16:creationId xmlns:a16="http://schemas.microsoft.com/office/drawing/2014/main" id="{5FF4DCB6-21B0-4D52-90D0-4B41F67FF51E}"/>
+                <a16:creationId xmlns:a16="http://schemas.microsoft.com/office/drawing/2014/main" xmlns="" id="{5FF4DCB6-21B0-4D52-90D0-4B41F67FF51E}"/>
               </a:ext>
             </a:extLst>
           </p:cNvPr>
@@ -10928,7 +11058,7 @@
           <p:cNvPr id="9" name="Content Placeholder 8">
             <a:extLst>
               <a:ext uri="{FF2B5EF4-FFF2-40B4-BE49-F238E27FC236}">
-                <a16:creationId xmlns:a16="http://schemas.microsoft.com/office/drawing/2014/main" id="{6D926286-4DAB-48EB-97A3-06175DC678CE}"/>
+                <a16:creationId xmlns:a16="http://schemas.microsoft.com/office/drawing/2014/main" xmlns="" id="{6D926286-4DAB-48EB-97A3-06175DC678CE}"/>
               </a:ext>
             </a:extLst>
           </p:cNvPr>
@@ -11026,7 +11156,7 @@
           <p:cNvPr id="14" name="Picture 13">
             <a:extLst>
               <a:ext uri="{FF2B5EF4-FFF2-40B4-BE49-F238E27FC236}">
-                <a16:creationId xmlns:a16="http://schemas.microsoft.com/office/drawing/2014/main" id="{6F1B2972-00B7-472B-870D-CC70C6F0BD20}"/>
+                <a16:creationId xmlns:a16="http://schemas.microsoft.com/office/drawing/2014/main" xmlns="" id="{6F1B2972-00B7-472B-870D-CC70C6F0BD20}"/>
               </a:ext>
             </a:extLst>
           </p:cNvPr>
@@ -11057,6 +11187,1302 @@
           </a:prstGeom>
         </p:spPr>
       </p:pic>
+      <p:sp>
+        <p:nvSpPr>
+          <p:cNvPr id="2" name="Flussdiagramm: Verbindungsstelle 1"/>
+          <p:cNvSpPr/>
+          <p:nvPr/>
+        </p:nvSpPr>
+        <p:spPr>
+          <a:xfrm>
+            <a:off x="5925669" y="2359032"/>
+            <a:ext cx="161365" cy="161926"/>
+          </a:xfrm>
+          <a:prstGeom prst="flowChartConnector">
+            <a:avLst/>
+          </a:prstGeom>
+          <a:solidFill>
+            <a:srgbClr val="92D050"/>
+          </a:solidFill>
+          <a:ln>
+            <a:solidFill>
+              <a:srgbClr val="92D050"/>
+            </a:solidFill>
+          </a:ln>
+        </p:spPr>
+        <p:style>
+          <a:lnRef idx="2">
+            <a:schemeClr val="accent1">
+              <a:shade val="50000"/>
+            </a:schemeClr>
+          </a:lnRef>
+          <a:fillRef idx="1">
+            <a:schemeClr val="accent1"/>
+          </a:fillRef>
+          <a:effectRef idx="0">
+            <a:schemeClr val="accent1"/>
+          </a:effectRef>
+          <a:fontRef idx="minor">
+            <a:schemeClr val="lt1"/>
+          </a:fontRef>
+        </p:style>
+        <p:txBody>
+          <a:bodyPr rtlCol="0" anchor="ctr"/>
+          <a:lstStyle/>
+          <a:p>
+            <a:pPr algn="ctr"/>
+            <a:endParaRPr lang="de-DE"/>
+          </a:p>
+        </p:txBody>
+      </p:sp>
+      <p:sp>
+        <p:nvSpPr>
+          <p:cNvPr id="7" name="Flussdiagramm: Verbindungsstelle 6"/>
+          <p:cNvSpPr/>
+          <p:nvPr/>
+        </p:nvSpPr>
+        <p:spPr>
+          <a:xfrm>
+            <a:off x="6185645" y="2358751"/>
+            <a:ext cx="161365" cy="161926"/>
+          </a:xfrm>
+          <a:prstGeom prst="flowChartConnector">
+            <a:avLst/>
+          </a:prstGeom>
+          <a:solidFill>
+            <a:srgbClr val="92D050"/>
+          </a:solidFill>
+          <a:ln>
+            <a:solidFill>
+              <a:srgbClr val="92D050"/>
+            </a:solidFill>
+          </a:ln>
+        </p:spPr>
+        <p:style>
+          <a:lnRef idx="2">
+            <a:schemeClr val="accent1">
+              <a:shade val="50000"/>
+            </a:schemeClr>
+          </a:lnRef>
+          <a:fillRef idx="1">
+            <a:schemeClr val="accent1"/>
+          </a:fillRef>
+          <a:effectRef idx="0">
+            <a:schemeClr val="accent1"/>
+          </a:effectRef>
+          <a:fontRef idx="minor">
+            <a:schemeClr val="lt1"/>
+          </a:fontRef>
+        </p:style>
+        <p:txBody>
+          <a:bodyPr rtlCol="0" anchor="ctr"/>
+          <a:lstStyle/>
+          <a:p>
+            <a:pPr algn="ctr"/>
+            <a:endParaRPr lang="de-DE"/>
+          </a:p>
+        </p:txBody>
+      </p:sp>
+      <p:sp>
+        <p:nvSpPr>
+          <p:cNvPr id="10" name="Flussdiagramm: Verbindungsstelle 9"/>
+          <p:cNvSpPr/>
+          <p:nvPr/>
+        </p:nvSpPr>
+        <p:spPr>
+          <a:xfrm>
+            <a:off x="6486663" y="2358751"/>
+            <a:ext cx="161365" cy="161926"/>
+          </a:xfrm>
+          <a:prstGeom prst="flowChartConnector">
+            <a:avLst/>
+          </a:prstGeom>
+          <a:solidFill>
+            <a:srgbClr val="92D050"/>
+          </a:solidFill>
+          <a:ln>
+            <a:solidFill>
+              <a:srgbClr val="92D050"/>
+            </a:solidFill>
+          </a:ln>
+        </p:spPr>
+        <p:style>
+          <a:lnRef idx="2">
+            <a:schemeClr val="accent1">
+              <a:shade val="50000"/>
+            </a:schemeClr>
+          </a:lnRef>
+          <a:fillRef idx="1">
+            <a:schemeClr val="accent1"/>
+          </a:fillRef>
+          <a:effectRef idx="0">
+            <a:schemeClr val="accent1"/>
+          </a:effectRef>
+          <a:fontRef idx="minor">
+            <a:schemeClr val="lt1"/>
+          </a:fontRef>
+        </p:style>
+        <p:txBody>
+          <a:bodyPr rtlCol="0" anchor="ctr"/>
+          <a:lstStyle/>
+          <a:p>
+            <a:pPr algn="ctr"/>
+            <a:endParaRPr lang="de-DE"/>
+          </a:p>
+        </p:txBody>
+      </p:sp>
+      <p:sp>
+        <p:nvSpPr>
+          <p:cNvPr id="12" name="Flussdiagramm: Verbindungsstelle 11"/>
+          <p:cNvSpPr/>
+          <p:nvPr/>
+        </p:nvSpPr>
+        <p:spPr>
+          <a:xfrm>
+            <a:off x="6482183" y="3107235"/>
+            <a:ext cx="161365" cy="161926"/>
+          </a:xfrm>
+          <a:prstGeom prst="flowChartConnector">
+            <a:avLst/>
+          </a:prstGeom>
+          <a:solidFill>
+            <a:srgbClr val="92D050"/>
+          </a:solidFill>
+          <a:ln>
+            <a:solidFill>
+              <a:srgbClr val="92D050"/>
+            </a:solidFill>
+          </a:ln>
+        </p:spPr>
+        <p:style>
+          <a:lnRef idx="2">
+            <a:schemeClr val="accent1">
+              <a:shade val="50000"/>
+            </a:schemeClr>
+          </a:lnRef>
+          <a:fillRef idx="1">
+            <a:schemeClr val="accent1"/>
+          </a:fillRef>
+          <a:effectRef idx="0">
+            <a:schemeClr val="accent1"/>
+          </a:effectRef>
+          <a:fontRef idx="minor">
+            <a:schemeClr val="lt1"/>
+          </a:fontRef>
+        </p:style>
+        <p:txBody>
+          <a:bodyPr rtlCol="0" anchor="ctr"/>
+          <a:lstStyle/>
+          <a:p>
+            <a:pPr algn="ctr"/>
+            <a:endParaRPr lang="de-DE"/>
+          </a:p>
+        </p:txBody>
+      </p:sp>
+      <p:sp>
+        <p:nvSpPr>
+          <p:cNvPr id="13" name="Flussdiagramm: Verbindungsstelle 12"/>
+          <p:cNvSpPr/>
+          <p:nvPr/>
+        </p:nvSpPr>
+        <p:spPr>
+          <a:xfrm>
+            <a:off x="6185645" y="3110979"/>
+            <a:ext cx="161365" cy="161926"/>
+          </a:xfrm>
+          <a:prstGeom prst="flowChartConnector">
+            <a:avLst/>
+          </a:prstGeom>
+          <a:solidFill>
+            <a:srgbClr val="92D050"/>
+          </a:solidFill>
+          <a:ln>
+            <a:solidFill>
+              <a:srgbClr val="92D050"/>
+            </a:solidFill>
+          </a:ln>
+        </p:spPr>
+        <p:style>
+          <a:lnRef idx="2">
+            <a:schemeClr val="accent1">
+              <a:shade val="50000"/>
+            </a:schemeClr>
+          </a:lnRef>
+          <a:fillRef idx="1">
+            <a:schemeClr val="accent1"/>
+          </a:fillRef>
+          <a:effectRef idx="0">
+            <a:schemeClr val="accent1"/>
+          </a:effectRef>
+          <a:fontRef idx="minor">
+            <a:schemeClr val="lt1"/>
+          </a:fontRef>
+        </p:style>
+        <p:txBody>
+          <a:bodyPr rtlCol="0" anchor="ctr"/>
+          <a:lstStyle/>
+          <a:p>
+            <a:pPr algn="ctr"/>
+            <a:endParaRPr lang="de-DE"/>
+          </a:p>
+        </p:txBody>
+      </p:sp>
+      <p:sp>
+        <p:nvSpPr>
+          <p:cNvPr id="15" name="Flussdiagramm: Verbindungsstelle 14"/>
+          <p:cNvSpPr/>
+          <p:nvPr/>
+        </p:nvSpPr>
+        <p:spPr>
+          <a:xfrm>
+            <a:off x="5925670" y="3110979"/>
+            <a:ext cx="161365" cy="161926"/>
+          </a:xfrm>
+          <a:prstGeom prst="flowChartConnector">
+            <a:avLst/>
+          </a:prstGeom>
+          <a:solidFill>
+            <a:srgbClr val="92D050"/>
+          </a:solidFill>
+          <a:ln>
+            <a:solidFill>
+              <a:srgbClr val="92D050"/>
+            </a:solidFill>
+          </a:ln>
+        </p:spPr>
+        <p:style>
+          <a:lnRef idx="2">
+            <a:schemeClr val="accent1">
+              <a:shade val="50000"/>
+            </a:schemeClr>
+          </a:lnRef>
+          <a:fillRef idx="1">
+            <a:schemeClr val="accent1"/>
+          </a:fillRef>
+          <a:effectRef idx="0">
+            <a:schemeClr val="accent1"/>
+          </a:effectRef>
+          <a:fontRef idx="minor">
+            <a:schemeClr val="lt1"/>
+          </a:fontRef>
+        </p:style>
+        <p:txBody>
+          <a:bodyPr rtlCol="0" anchor="ctr"/>
+          <a:lstStyle/>
+          <a:p>
+            <a:pPr algn="ctr"/>
+            <a:endParaRPr lang="de-DE"/>
+          </a:p>
+        </p:txBody>
+      </p:sp>
+      <p:sp>
+        <p:nvSpPr>
+          <p:cNvPr id="16" name="Flussdiagramm: Verbindungsstelle 15"/>
+          <p:cNvSpPr/>
+          <p:nvPr/>
+        </p:nvSpPr>
+        <p:spPr>
+          <a:xfrm>
+            <a:off x="6482182" y="3780690"/>
+            <a:ext cx="161365" cy="161926"/>
+          </a:xfrm>
+          <a:prstGeom prst="flowChartConnector">
+            <a:avLst/>
+          </a:prstGeom>
+          <a:solidFill>
+            <a:srgbClr val="FFFF00"/>
+          </a:solidFill>
+          <a:ln>
+            <a:solidFill>
+              <a:srgbClr val="FFFF00"/>
+            </a:solidFill>
+          </a:ln>
+        </p:spPr>
+        <p:style>
+          <a:lnRef idx="2">
+            <a:schemeClr val="accent1">
+              <a:shade val="50000"/>
+            </a:schemeClr>
+          </a:lnRef>
+          <a:fillRef idx="1">
+            <a:schemeClr val="accent1"/>
+          </a:fillRef>
+          <a:effectRef idx="0">
+            <a:schemeClr val="accent1"/>
+          </a:effectRef>
+          <a:fontRef idx="minor">
+            <a:schemeClr val="lt1"/>
+          </a:fontRef>
+        </p:style>
+        <p:txBody>
+          <a:bodyPr rtlCol="0" anchor="ctr"/>
+          <a:lstStyle/>
+          <a:p>
+            <a:pPr algn="ctr"/>
+            <a:endParaRPr lang="de-DE"/>
+          </a:p>
+        </p:txBody>
+      </p:sp>
+      <p:sp>
+        <p:nvSpPr>
+          <p:cNvPr id="17" name="Flussdiagramm: Verbindungsstelle 16"/>
+          <p:cNvSpPr/>
+          <p:nvPr/>
+        </p:nvSpPr>
+        <p:spPr>
+          <a:xfrm>
+            <a:off x="6185645" y="3781963"/>
+            <a:ext cx="161365" cy="161926"/>
+          </a:xfrm>
+          <a:prstGeom prst="flowChartConnector">
+            <a:avLst/>
+          </a:prstGeom>
+          <a:solidFill>
+            <a:srgbClr val="92D050"/>
+          </a:solidFill>
+          <a:ln>
+            <a:solidFill>
+              <a:srgbClr val="92D050"/>
+            </a:solidFill>
+          </a:ln>
+        </p:spPr>
+        <p:style>
+          <a:lnRef idx="2">
+            <a:schemeClr val="accent1">
+              <a:shade val="50000"/>
+            </a:schemeClr>
+          </a:lnRef>
+          <a:fillRef idx="1">
+            <a:schemeClr val="accent1"/>
+          </a:fillRef>
+          <a:effectRef idx="0">
+            <a:schemeClr val="accent1"/>
+          </a:effectRef>
+          <a:fontRef idx="minor">
+            <a:schemeClr val="lt1"/>
+          </a:fontRef>
+        </p:style>
+        <p:txBody>
+          <a:bodyPr rtlCol="0" anchor="ctr"/>
+          <a:lstStyle/>
+          <a:p>
+            <a:pPr algn="ctr"/>
+            <a:endParaRPr lang="de-DE"/>
+          </a:p>
+        </p:txBody>
+      </p:sp>
+      <p:sp>
+        <p:nvSpPr>
+          <p:cNvPr id="18" name="Flussdiagramm: Verbindungsstelle 17"/>
+          <p:cNvSpPr/>
+          <p:nvPr/>
+        </p:nvSpPr>
+        <p:spPr>
+          <a:xfrm>
+            <a:off x="5930151" y="3781963"/>
+            <a:ext cx="161365" cy="161926"/>
+          </a:xfrm>
+          <a:prstGeom prst="flowChartConnector">
+            <a:avLst/>
+          </a:prstGeom>
+          <a:solidFill>
+            <a:srgbClr val="92D050"/>
+          </a:solidFill>
+          <a:ln>
+            <a:solidFill>
+              <a:srgbClr val="92D050"/>
+            </a:solidFill>
+          </a:ln>
+        </p:spPr>
+        <p:style>
+          <a:lnRef idx="2">
+            <a:schemeClr val="accent1">
+              <a:shade val="50000"/>
+            </a:schemeClr>
+          </a:lnRef>
+          <a:fillRef idx="1">
+            <a:schemeClr val="accent1"/>
+          </a:fillRef>
+          <a:effectRef idx="0">
+            <a:schemeClr val="accent1"/>
+          </a:effectRef>
+          <a:fontRef idx="minor">
+            <a:schemeClr val="lt1"/>
+          </a:fontRef>
+        </p:style>
+        <p:txBody>
+          <a:bodyPr rtlCol="0" anchor="ctr"/>
+          <a:lstStyle/>
+          <a:p>
+            <a:pPr algn="ctr"/>
+            <a:endParaRPr lang="de-DE"/>
+          </a:p>
+        </p:txBody>
+      </p:sp>
+      <p:sp>
+        <p:nvSpPr>
+          <p:cNvPr id="19" name="Flussdiagramm: Verbindungsstelle 18"/>
+          <p:cNvSpPr/>
+          <p:nvPr/>
+        </p:nvSpPr>
+        <p:spPr>
+          <a:xfrm>
+            <a:off x="6911634" y="4472471"/>
+            <a:ext cx="161365" cy="161926"/>
+          </a:xfrm>
+          <a:prstGeom prst="flowChartConnector">
+            <a:avLst/>
+          </a:prstGeom>
+          <a:solidFill>
+            <a:srgbClr val="FF0000"/>
+          </a:solidFill>
+          <a:ln>
+            <a:solidFill>
+              <a:srgbClr val="FF0000"/>
+            </a:solidFill>
+          </a:ln>
+        </p:spPr>
+        <p:style>
+          <a:lnRef idx="2">
+            <a:schemeClr val="accent1">
+              <a:shade val="50000"/>
+            </a:schemeClr>
+          </a:lnRef>
+          <a:fillRef idx="1">
+            <a:schemeClr val="accent1"/>
+          </a:fillRef>
+          <a:effectRef idx="0">
+            <a:schemeClr val="accent1"/>
+          </a:effectRef>
+          <a:fontRef idx="minor">
+            <a:schemeClr val="lt1"/>
+          </a:fontRef>
+        </p:style>
+        <p:txBody>
+          <a:bodyPr rtlCol="0" anchor="ctr"/>
+          <a:lstStyle/>
+          <a:p>
+            <a:pPr algn="ctr"/>
+            <a:endParaRPr lang="de-DE"/>
+          </a:p>
+        </p:txBody>
+      </p:sp>
+      <p:sp>
+        <p:nvSpPr>
+          <p:cNvPr id="20" name="Flussdiagramm: Verbindungsstelle 19"/>
+          <p:cNvSpPr/>
+          <p:nvPr/>
+        </p:nvSpPr>
+        <p:spPr>
+          <a:xfrm>
+            <a:off x="6617520" y="4472471"/>
+            <a:ext cx="161365" cy="161926"/>
+          </a:xfrm>
+          <a:prstGeom prst="flowChartConnector">
+            <a:avLst/>
+          </a:prstGeom>
+          <a:solidFill>
+            <a:srgbClr val="FFFF00"/>
+          </a:solidFill>
+          <a:ln>
+            <a:solidFill>
+              <a:srgbClr val="FFFF00"/>
+            </a:solidFill>
+          </a:ln>
+        </p:spPr>
+        <p:style>
+          <a:lnRef idx="2">
+            <a:schemeClr val="accent1">
+              <a:shade val="50000"/>
+            </a:schemeClr>
+          </a:lnRef>
+          <a:fillRef idx="1">
+            <a:schemeClr val="accent1"/>
+          </a:fillRef>
+          <a:effectRef idx="0">
+            <a:schemeClr val="accent1"/>
+          </a:effectRef>
+          <a:fontRef idx="minor">
+            <a:schemeClr val="lt1"/>
+          </a:fontRef>
+        </p:style>
+        <p:txBody>
+          <a:bodyPr rtlCol="0" anchor="ctr"/>
+          <a:lstStyle/>
+          <a:p>
+            <a:pPr algn="ctr"/>
+            <a:endParaRPr lang="de-DE"/>
+          </a:p>
+        </p:txBody>
+      </p:sp>
+      <p:sp>
+        <p:nvSpPr>
+          <p:cNvPr id="21" name="Flussdiagramm: Verbindungsstelle 20"/>
+          <p:cNvSpPr/>
+          <p:nvPr/>
+        </p:nvSpPr>
+        <p:spPr>
+          <a:xfrm>
+            <a:off x="6323406" y="4472471"/>
+            <a:ext cx="161365" cy="161926"/>
+          </a:xfrm>
+          <a:prstGeom prst="flowChartConnector">
+            <a:avLst/>
+          </a:prstGeom>
+          <a:solidFill>
+            <a:srgbClr val="92D050"/>
+          </a:solidFill>
+          <a:ln>
+            <a:solidFill>
+              <a:srgbClr val="92D050"/>
+            </a:solidFill>
+          </a:ln>
+        </p:spPr>
+        <p:style>
+          <a:lnRef idx="2">
+            <a:schemeClr val="accent1">
+              <a:shade val="50000"/>
+            </a:schemeClr>
+          </a:lnRef>
+          <a:fillRef idx="1">
+            <a:schemeClr val="accent1"/>
+          </a:fillRef>
+          <a:effectRef idx="0">
+            <a:schemeClr val="accent1"/>
+          </a:effectRef>
+          <a:fontRef idx="minor">
+            <a:schemeClr val="lt1"/>
+          </a:fontRef>
+        </p:style>
+        <p:txBody>
+          <a:bodyPr rtlCol="0" anchor="ctr"/>
+          <a:lstStyle/>
+          <a:p>
+            <a:pPr algn="ctr"/>
+            <a:endParaRPr lang="de-DE"/>
+          </a:p>
+        </p:txBody>
+      </p:sp>
+      <p:sp>
+        <p:nvSpPr>
+          <p:cNvPr id="22" name="Flussdiagramm: Verbindungsstelle 21"/>
+          <p:cNvSpPr/>
+          <p:nvPr/>
+        </p:nvSpPr>
+        <p:spPr>
+          <a:xfrm>
+            <a:off x="6509683" y="5202629"/>
+            <a:ext cx="161365" cy="161926"/>
+          </a:xfrm>
+          <a:prstGeom prst="flowChartConnector">
+            <a:avLst/>
+          </a:prstGeom>
+          <a:solidFill>
+            <a:srgbClr val="92D050"/>
+          </a:solidFill>
+          <a:ln>
+            <a:solidFill>
+              <a:srgbClr val="92D050"/>
+            </a:solidFill>
+          </a:ln>
+        </p:spPr>
+        <p:style>
+          <a:lnRef idx="2">
+            <a:schemeClr val="accent1">
+              <a:shade val="50000"/>
+            </a:schemeClr>
+          </a:lnRef>
+          <a:fillRef idx="1">
+            <a:schemeClr val="accent1"/>
+          </a:fillRef>
+          <a:effectRef idx="0">
+            <a:schemeClr val="accent1"/>
+          </a:effectRef>
+          <a:fontRef idx="minor">
+            <a:schemeClr val="lt1"/>
+          </a:fontRef>
+        </p:style>
+        <p:txBody>
+          <a:bodyPr rtlCol="0" anchor="ctr"/>
+          <a:lstStyle/>
+          <a:p>
+            <a:pPr algn="ctr"/>
+            <a:endParaRPr lang="de-DE"/>
+          </a:p>
+        </p:txBody>
+      </p:sp>
+      <p:sp>
+        <p:nvSpPr>
+          <p:cNvPr id="23" name="Flussdiagramm: Verbindungsstelle 22"/>
+          <p:cNvSpPr/>
+          <p:nvPr/>
+        </p:nvSpPr>
+        <p:spPr>
+          <a:xfrm>
+            <a:off x="6207721" y="5204894"/>
+            <a:ext cx="161365" cy="161926"/>
+          </a:xfrm>
+          <a:prstGeom prst="flowChartConnector">
+            <a:avLst/>
+          </a:prstGeom>
+          <a:solidFill>
+            <a:srgbClr val="92D050"/>
+          </a:solidFill>
+          <a:ln>
+            <a:solidFill>
+              <a:srgbClr val="92D050"/>
+            </a:solidFill>
+          </a:ln>
+        </p:spPr>
+        <p:style>
+          <a:lnRef idx="2">
+            <a:schemeClr val="accent1">
+              <a:shade val="50000"/>
+            </a:schemeClr>
+          </a:lnRef>
+          <a:fillRef idx="1">
+            <a:schemeClr val="accent1"/>
+          </a:fillRef>
+          <a:effectRef idx="0">
+            <a:schemeClr val="accent1"/>
+          </a:effectRef>
+          <a:fontRef idx="minor">
+            <a:schemeClr val="lt1"/>
+          </a:fontRef>
+        </p:style>
+        <p:txBody>
+          <a:bodyPr rtlCol="0" anchor="ctr"/>
+          <a:lstStyle/>
+          <a:p>
+            <a:pPr algn="ctr"/>
+            <a:endParaRPr lang="de-DE"/>
+          </a:p>
+        </p:txBody>
+      </p:sp>
+      <p:sp>
+        <p:nvSpPr>
+          <p:cNvPr id="24" name="Flussdiagramm: Verbindungsstelle 23"/>
+          <p:cNvSpPr/>
+          <p:nvPr/>
+        </p:nvSpPr>
+        <p:spPr>
+          <a:xfrm>
+            <a:off x="5923601" y="5204894"/>
+            <a:ext cx="161365" cy="161926"/>
+          </a:xfrm>
+          <a:prstGeom prst="flowChartConnector">
+            <a:avLst/>
+          </a:prstGeom>
+          <a:solidFill>
+            <a:srgbClr val="92D050"/>
+          </a:solidFill>
+          <a:ln>
+            <a:solidFill>
+              <a:srgbClr val="92D050"/>
+            </a:solidFill>
+          </a:ln>
+        </p:spPr>
+        <p:style>
+          <a:lnRef idx="2">
+            <a:schemeClr val="accent1">
+              <a:shade val="50000"/>
+            </a:schemeClr>
+          </a:lnRef>
+          <a:fillRef idx="1">
+            <a:schemeClr val="accent1"/>
+          </a:fillRef>
+          <a:effectRef idx="0">
+            <a:schemeClr val="accent1"/>
+          </a:effectRef>
+          <a:fontRef idx="minor">
+            <a:schemeClr val="lt1"/>
+          </a:fontRef>
+        </p:style>
+        <p:txBody>
+          <a:bodyPr rtlCol="0" anchor="ctr"/>
+          <a:lstStyle/>
+          <a:p>
+            <a:pPr algn="ctr"/>
+            <a:endParaRPr lang="de-DE"/>
+          </a:p>
+        </p:txBody>
+      </p:sp>
+      <p:sp>
+        <p:nvSpPr>
+          <p:cNvPr id="25" name="Flussdiagramm: Verbindungsstelle 24"/>
+          <p:cNvSpPr/>
+          <p:nvPr/>
+        </p:nvSpPr>
+        <p:spPr>
+          <a:xfrm>
+            <a:off x="11483789" y="2043111"/>
+            <a:ext cx="161365" cy="161926"/>
+          </a:xfrm>
+          <a:prstGeom prst="flowChartConnector">
+            <a:avLst/>
+          </a:prstGeom>
+          <a:solidFill>
+            <a:srgbClr val="92D050"/>
+          </a:solidFill>
+          <a:ln>
+            <a:solidFill>
+              <a:srgbClr val="92D050"/>
+            </a:solidFill>
+          </a:ln>
+        </p:spPr>
+        <p:style>
+          <a:lnRef idx="2">
+            <a:schemeClr val="accent1">
+              <a:shade val="50000"/>
+            </a:schemeClr>
+          </a:lnRef>
+          <a:fillRef idx="1">
+            <a:schemeClr val="accent1"/>
+          </a:fillRef>
+          <a:effectRef idx="0">
+            <a:schemeClr val="accent1"/>
+          </a:effectRef>
+          <a:fontRef idx="minor">
+            <a:schemeClr val="lt1"/>
+          </a:fontRef>
+        </p:style>
+        <p:txBody>
+          <a:bodyPr rtlCol="0" anchor="ctr"/>
+          <a:lstStyle/>
+          <a:p>
+            <a:pPr algn="ctr"/>
+            <a:endParaRPr lang="de-DE"/>
+          </a:p>
+        </p:txBody>
+      </p:sp>
+      <p:sp>
+        <p:nvSpPr>
+          <p:cNvPr id="26" name="Flussdiagramm: Verbindungsstelle 25"/>
+          <p:cNvSpPr/>
+          <p:nvPr/>
+        </p:nvSpPr>
+        <p:spPr>
+          <a:xfrm>
+            <a:off x="11186674" y="2043111"/>
+            <a:ext cx="161365" cy="161926"/>
+          </a:xfrm>
+          <a:prstGeom prst="flowChartConnector">
+            <a:avLst/>
+          </a:prstGeom>
+          <a:solidFill>
+            <a:srgbClr val="92D050"/>
+          </a:solidFill>
+          <a:ln>
+            <a:solidFill>
+              <a:srgbClr val="92D050"/>
+            </a:solidFill>
+          </a:ln>
+        </p:spPr>
+        <p:style>
+          <a:lnRef idx="2">
+            <a:schemeClr val="accent1">
+              <a:shade val="50000"/>
+            </a:schemeClr>
+          </a:lnRef>
+          <a:fillRef idx="1">
+            <a:schemeClr val="accent1"/>
+          </a:fillRef>
+          <a:effectRef idx="0">
+            <a:schemeClr val="accent1"/>
+          </a:effectRef>
+          <a:fontRef idx="minor">
+            <a:schemeClr val="lt1"/>
+          </a:fontRef>
+        </p:style>
+        <p:txBody>
+          <a:bodyPr rtlCol="0" anchor="ctr"/>
+          <a:lstStyle/>
+          <a:p>
+            <a:pPr algn="ctr"/>
+            <a:endParaRPr lang="de-DE"/>
+          </a:p>
+        </p:txBody>
+      </p:sp>
+      <p:sp>
+        <p:nvSpPr>
+          <p:cNvPr id="27" name="Flussdiagramm: Verbindungsstelle 26"/>
+          <p:cNvSpPr/>
+          <p:nvPr/>
+        </p:nvSpPr>
+        <p:spPr>
+          <a:xfrm>
+            <a:off x="10941423" y="2043111"/>
+            <a:ext cx="161365" cy="161926"/>
+          </a:xfrm>
+          <a:prstGeom prst="flowChartConnector">
+            <a:avLst/>
+          </a:prstGeom>
+          <a:solidFill>
+            <a:srgbClr val="92D050"/>
+          </a:solidFill>
+          <a:ln>
+            <a:solidFill>
+              <a:srgbClr val="92D050"/>
+            </a:solidFill>
+          </a:ln>
+        </p:spPr>
+        <p:style>
+          <a:lnRef idx="2">
+            <a:schemeClr val="accent1">
+              <a:shade val="50000"/>
+            </a:schemeClr>
+          </a:lnRef>
+          <a:fillRef idx="1">
+            <a:schemeClr val="accent1"/>
+          </a:fillRef>
+          <a:effectRef idx="0">
+            <a:schemeClr val="accent1"/>
+          </a:effectRef>
+          <a:fontRef idx="minor">
+            <a:schemeClr val="lt1"/>
+          </a:fontRef>
+        </p:style>
+        <p:txBody>
+          <a:bodyPr rtlCol="0" anchor="ctr"/>
+          <a:lstStyle/>
+          <a:p>
+            <a:pPr algn="ctr"/>
+            <a:endParaRPr lang="de-DE"/>
+          </a:p>
+        </p:txBody>
+      </p:sp>
+      <p:sp>
+        <p:nvSpPr>
+          <p:cNvPr id="28" name="Flussdiagramm: Verbindungsstelle 27"/>
+          <p:cNvSpPr/>
+          <p:nvPr/>
+        </p:nvSpPr>
+        <p:spPr>
+          <a:xfrm>
+            <a:off x="10448364" y="4822450"/>
+            <a:ext cx="161365" cy="161926"/>
+          </a:xfrm>
+          <a:prstGeom prst="flowChartConnector">
+            <a:avLst/>
+          </a:prstGeom>
+          <a:solidFill>
+            <a:srgbClr val="92D050"/>
+          </a:solidFill>
+          <a:ln>
+            <a:solidFill>
+              <a:srgbClr val="92D050"/>
+            </a:solidFill>
+          </a:ln>
+        </p:spPr>
+        <p:style>
+          <a:lnRef idx="2">
+            <a:schemeClr val="accent1">
+              <a:shade val="50000"/>
+            </a:schemeClr>
+          </a:lnRef>
+          <a:fillRef idx="1">
+            <a:schemeClr val="accent1"/>
+          </a:fillRef>
+          <a:effectRef idx="0">
+            <a:schemeClr val="accent1"/>
+          </a:effectRef>
+          <a:fontRef idx="minor">
+            <a:schemeClr val="lt1"/>
+          </a:fontRef>
+        </p:style>
+        <p:txBody>
+          <a:bodyPr rtlCol="0" anchor="ctr"/>
+          <a:lstStyle/>
+          <a:p>
+            <a:pPr algn="ctr"/>
+            <a:endParaRPr lang="de-DE"/>
+          </a:p>
+        </p:txBody>
+      </p:sp>
+      <p:sp>
+        <p:nvSpPr>
+          <p:cNvPr id="29" name="Flussdiagramm: Verbindungsstelle 28"/>
+          <p:cNvSpPr/>
+          <p:nvPr/>
+        </p:nvSpPr>
+        <p:spPr>
+          <a:xfrm>
+            <a:off x="10062882" y="4822450"/>
+            <a:ext cx="161365" cy="161926"/>
+          </a:xfrm>
+          <a:prstGeom prst="flowChartConnector">
+            <a:avLst/>
+          </a:prstGeom>
+          <a:solidFill>
+            <a:srgbClr val="92D050"/>
+          </a:solidFill>
+          <a:ln>
+            <a:solidFill>
+              <a:srgbClr val="92D050"/>
+            </a:solidFill>
+          </a:ln>
+        </p:spPr>
+        <p:style>
+          <a:lnRef idx="2">
+            <a:schemeClr val="accent1">
+              <a:shade val="50000"/>
+            </a:schemeClr>
+          </a:lnRef>
+          <a:fillRef idx="1">
+            <a:schemeClr val="accent1"/>
+          </a:fillRef>
+          <a:effectRef idx="0">
+            <a:schemeClr val="accent1"/>
+          </a:effectRef>
+          <a:fontRef idx="minor">
+            <a:schemeClr val="lt1"/>
+          </a:fontRef>
+        </p:style>
+        <p:txBody>
+          <a:bodyPr rtlCol="0" anchor="ctr"/>
+          <a:lstStyle/>
+          <a:p>
+            <a:pPr algn="ctr"/>
+            <a:endParaRPr lang="de-DE"/>
+          </a:p>
+        </p:txBody>
+      </p:sp>
+      <p:sp>
+        <p:nvSpPr>
+          <p:cNvPr id="30" name="Flussdiagramm: Verbindungsstelle 29"/>
+          <p:cNvSpPr/>
+          <p:nvPr/>
+        </p:nvSpPr>
+        <p:spPr>
+          <a:xfrm>
+            <a:off x="9690847" y="4822450"/>
+            <a:ext cx="161365" cy="161926"/>
+          </a:xfrm>
+          <a:prstGeom prst="flowChartConnector">
+            <a:avLst/>
+          </a:prstGeom>
+          <a:solidFill>
+            <a:srgbClr val="92D050"/>
+          </a:solidFill>
+          <a:ln>
+            <a:solidFill>
+              <a:srgbClr val="92D050"/>
+            </a:solidFill>
+          </a:ln>
+        </p:spPr>
+        <p:style>
+          <a:lnRef idx="2">
+            <a:schemeClr val="accent1">
+              <a:shade val="50000"/>
+            </a:schemeClr>
+          </a:lnRef>
+          <a:fillRef idx="1">
+            <a:schemeClr val="accent1"/>
+          </a:fillRef>
+          <a:effectRef idx="0">
+            <a:schemeClr val="accent1"/>
+          </a:effectRef>
+          <a:fontRef idx="minor">
+            <a:schemeClr val="lt1"/>
+          </a:fontRef>
+        </p:style>
+        <p:txBody>
+          <a:bodyPr rtlCol="0" anchor="ctr"/>
+          <a:lstStyle/>
+          <a:p>
+            <a:pPr algn="ctr"/>
+            <a:endParaRPr lang="de-DE"/>
+          </a:p>
+        </p:txBody>
+      </p:sp>
+      <p:sp>
+        <p:nvSpPr>
+          <p:cNvPr id="31" name="Flussdiagramm: Verbindungsstelle 30"/>
+          <p:cNvSpPr/>
+          <p:nvPr/>
+        </p:nvSpPr>
+        <p:spPr>
+          <a:xfrm>
+            <a:off x="10094258" y="5557274"/>
+            <a:ext cx="161365" cy="161926"/>
+          </a:xfrm>
+          <a:prstGeom prst="flowChartConnector">
+            <a:avLst/>
+          </a:prstGeom>
+          <a:solidFill>
+            <a:srgbClr val="FF0000"/>
+          </a:solidFill>
+          <a:ln>
+            <a:solidFill>
+              <a:srgbClr val="FF0000"/>
+            </a:solidFill>
+          </a:ln>
+        </p:spPr>
+        <p:style>
+          <a:lnRef idx="2">
+            <a:schemeClr val="accent1">
+              <a:shade val="50000"/>
+            </a:schemeClr>
+          </a:lnRef>
+          <a:fillRef idx="1">
+            <a:schemeClr val="accent1"/>
+          </a:fillRef>
+          <a:effectRef idx="0">
+            <a:schemeClr val="accent1"/>
+          </a:effectRef>
+          <a:fontRef idx="minor">
+            <a:schemeClr val="lt1"/>
+          </a:fontRef>
+        </p:style>
+        <p:txBody>
+          <a:bodyPr rtlCol="0" anchor="ctr"/>
+          <a:lstStyle/>
+          <a:p>
+            <a:pPr algn="ctr"/>
+            <a:endParaRPr lang="de-DE"/>
+          </a:p>
+        </p:txBody>
+      </p:sp>
+      <p:sp>
+        <p:nvSpPr>
+          <p:cNvPr id="32" name="Flussdiagramm: Verbindungsstelle 31"/>
+          <p:cNvSpPr/>
+          <p:nvPr/>
+        </p:nvSpPr>
+        <p:spPr>
+          <a:xfrm>
+            <a:off x="9737119" y="5562038"/>
+            <a:ext cx="161365" cy="161926"/>
+          </a:xfrm>
+          <a:prstGeom prst="flowChartConnector">
+            <a:avLst/>
+          </a:prstGeom>
+          <a:solidFill>
+            <a:srgbClr val="FF0000"/>
+          </a:solidFill>
+          <a:ln>
+            <a:solidFill>
+              <a:srgbClr val="FF0000"/>
+            </a:solidFill>
+          </a:ln>
+        </p:spPr>
+        <p:style>
+          <a:lnRef idx="2">
+            <a:schemeClr val="accent1">
+              <a:shade val="50000"/>
+            </a:schemeClr>
+          </a:lnRef>
+          <a:fillRef idx="1">
+            <a:schemeClr val="accent1"/>
+          </a:fillRef>
+          <a:effectRef idx="0">
+            <a:schemeClr val="accent1"/>
+          </a:effectRef>
+          <a:fontRef idx="minor">
+            <a:schemeClr val="lt1"/>
+          </a:fontRef>
+        </p:style>
+        <p:txBody>
+          <a:bodyPr rtlCol="0" anchor="ctr"/>
+          <a:lstStyle/>
+          <a:p>
+            <a:pPr algn="ctr"/>
+            <a:endParaRPr lang="de-DE"/>
+          </a:p>
+        </p:txBody>
+      </p:sp>
+      <p:sp>
+        <p:nvSpPr>
+          <p:cNvPr id="33" name="Flussdiagramm: Verbindungsstelle 32"/>
+          <p:cNvSpPr/>
+          <p:nvPr/>
+        </p:nvSpPr>
+        <p:spPr>
+          <a:xfrm>
+            <a:off x="9397047" y="5562038"/>
+            <a:ext cx="161365" cy="161926"/>
+          </a:xfrm>
+          <a:prstGeom prst="flowChartConnector">
+            <a:avLst/>
+          </a:prstGeom>
+          <a:solidFill>
+            <a:srgbClr val="FFFF00"/>
+          </a:solidFill>
+          <a:ln>
+            <a:solidFill>
+              <a:srgbClr val="FFFF00"/>
+            </a:solidFill>
+          </a:ln>
+        </p:spPr>
+        <p:style>
+          <a:lnRef idx="2">
+            <a:schemeClr val="accent1">
+              <a:shade val="50000"/>
+            </a:schemeClr>
+          </a:lnRef>
+          <a:fillRef idx="1">
+            <a:schemeClr val="accent1"/>
+          </a:fillRef>
+          <a:effectRef idx="0">
+            <a:schemeClr val="accent1"/>
+          </a:effectRef>
+          <a:fontRef idx="minor">
+            <a:schemeClr val="lt1"/>
+          </a:fontRef>
+        </p:style>
+        <p:txBody>
+          <a:bodyPr rtlCol="0" anchor="ctr"/>
+          <a:lstStyle/>
+          <a:p>
+            <a:pPr algn="ctr"/>
+            <a:endParaRPr lang="de-DE"/>
+          </a:p>
+        </p:txBody>
+      </p:sp>
+      <p:sp>
+        <p:nvSpPr>
+          <p:cNvPr id="34" name="Flussdiagramm: Verbindungsstelle 33"/>
+          <p:cNvSpPr/>
+          <p:nvPr/>
+        </p:nvSpPr>
+        <p:spPr>
+          <a:xfrm>
+            <a:off x="11483789" y="3530281"/>
+            <a:ext cx="161365" cy="161926"/>
+          </a:xfrm>
+          <a:prstGeom prst="flowChartConnector">
+            <a:avLst/>
+          </a:prstGeom>
+          <a:solidFill>
+            <a:srgbClr val="FFFF00"/>
+          </a:solidFill>
+          <a:ln>
+            <a:solidFill>
+              <a:srgbClr val="FFFF00"/>
+            </a:solidFill>
+          </a:ln>
+        </p:spPr>
+        <p:style>
+          <a:lnRef idx="2">
+            <a:schemeClr val="accent1">
+              <a:shade val="50000"/>
+            </a:schemeClr>
+          </a:lnRef>
+          <a:fillRef idx="1">
+            <a:schemeClr val="accent1"/>
+          </a:fillRef>
+          <a:effectRef idx="0">
+            <a:schemeClr val="accent1"/>
+          </a:effectRef>
+          <a:fontRef idx="minor">
+            <a:schemeClr val="lt1"/>
+          </a:fontRef>
+        </p:style>
+        <p:txBody>
+          <a:bodyPr rtlCol="0" anchor="ctr"/>
+          <a:lstStyle/>
+          <a:p>
+            <a:pPr algn="ctr"/>
+            <a:endParaRPr lang="de-DE"/>
+          </a:p>
+        </p:txBody>
+      </p:sp>
+      <p:sp>
+        <p:nvSpPr>
+          <p:cNvPr id="35" name="Flussdiagramm: Verbindungsstelle 34"/>
+          <p:cNvSpPr/>
+          <p:nvPr/>
+        </p:nvSpPr>
+        <p:spPr>
+          <a:xfrm>
+            <a:off x="11213568" y="3544009"/>
+            <a:ext cx="161365" cy="161926"/>
+          </a:xfrm>
+          <a:prstGeom prst="flowChartConnector">
+            <a:avLst/>
+          </a:prstGeom>
+          <a:solidFill>
+            <a:srgbClr val="92D050"/>
+          </a:solidFill>
+          <a:ln>
+            <a:solidFill>
+              <a:srgbClr val="92D050"/>
+            </a:solidFill>
+          </a:ln>
+        </p:spPr>
+        <p:style>
+          <a:lnRef idx="2">
+            <a:schemeClr val="accent1">
+              <a:shade val="50000"/>
+            </a:schemeClr>
+          </a:lnRef>
+          <a:fillRef idx="1">
+            <a:schemeClr val="accent1"/>
+          </a:fillRef>
+          <a:effectRef idx="0">
+            <a:schemeClr val="accent1"/>
+          </a:effectRef>
+          <a:fontRef idx="minor">
+            <a:schemeClr val="lt1"/>
+          </a:fontRef>
+        </p:style>
+        <p:txBody>
+          <a:bodyPr rtlCol="0" anchor="ctr"/>
+          <a:lstStyle/>
+          <a:p>
+            <a:pPr algn="ctr"/>
+            <a:endParaRPr lang="de-DE"/>
+          </a:p>
+        </p:txBody>
+      </p:sp>
+      <p:sp>
+        <p:nvSpPr>
+          <p:cNvPr id="36" name="Flussdiagramm: Verbindungsstelle 35"/>
+          <p:cNvSpPr/>
+          <p:nvPr/>
+        </p:nvSpPr>
+        <p:spPr>
+          <a:xfrm>
+            <a:off x="10941421" y="3544009"/>
+            <a:ext cx="161365" cy="161926"/>
+          </a:xfrm>
+          <a:prstGeom prst="flowChartConnector">
+            <a:avLst/>
+          </a:prstGeom>
+          <a:solidFill>
+            <a:srgbClr val="92D050"/>
+          </a:solidFill>
+          <a:ln>
+            <a:solidFill>
+              <a:srgbClr val="92D050"/>
+            </a:solidFill>
+          </a:ln>
+        </p:spPr>
+        <p:style>
+          <a:lnRef idx="2">
+            <a:schemeClr val="accent1">
+              <a:shade val="50000"/>
+            </a:schemeClr>
+          </a:lnRef>
+          <a:fillRef idx="1">
+            <a:schemeClr val="accent1"/>
+          </a:fillRef>
+          <a:effectRef idx="0">
+            <a:schemeClr val="accent1"/>
+          </a:effectRef>
+          <a:fontRef idx="minor">
+            <a:schemeClr val="lt1"/>
+          </a:fontRef>
+        </p:style>
+        <p:txBody>
+          <a:bodyPr rtlCol="0" anchor="ctr"/>
+          <a:lstStyle/>
+          <a:p>
+            <a:pPr algn="ctr"/>
+            <a:endParaRPr lang="de-DE"/>
+          </a:p>
+        </p:txBody>
+      </p:sp>
     </p:spTree>
     <p:extLst>
       <p:ext uri="{BB962C8B-B14F-4D97-AF65-F5344CB8AC3E}">
@@ -11095,7 +12521,7 @@
           <p:cNvPr id="14" name="Content Placeholder 13">
             <a:extLst>
               <a:ext uri="{FF2B5EF4-FFF2-40B4-BE49-F238E27FC236}">
-                <a16:creationId xmlns:a16="http://schemas.microsoft.com/office/drawing/2014/main" id="{86EA5D6E-C62C-47D0-8138-CB405D04E4E4}"/>
+                <a16:creationId xmlns:a16="http://schemas.microsoft.com/office/drawing/2014/main" xmlns="" id="{86EA5D6E-C62C-47D0-8138-CB405D04E4E4}"/>
               </a:ext>
             </a:extLst>
           </p:cNvPr>
@@ -11199,7 +12625,7 @@
           <p:cNvPr id="9" name="Titel 1">
             <a:extLst>
               <a:ext uri="{FF2B5EF4-FFF2-40B4-BE49-F238E27FC236}">
-                <a16:creationId xmlns:a16="http://schemas.microsoft.com/office/drawing/2014/main" id="{E5885248-D7EC-46A9-881C-FEC0809E0C48}"/>
+                <a16:creationId xmlns:a16="http://schemas.microsoft.com/office/drawing/2014/main" xmlns="" id="{E5885248-D7EC-46A9-881C-FEC0809E0C48}"/>
               </a:ext>
             </a:extLst>
           </p:cNvPr>
@@ -11219,7 +12645,7 @@
         </p:spPr>
         <p:txBody>
           <a:bodyPr vert="horz" lIns="91440" tIns="45720" rIns="91440" bIns="45720" rtlCol="0" anchor="b">
-            <a:normAutofit/>
+            <a:normAutofit lnSpcReduction="10000"/>
           </a:bodyPr>
           <a:lstStyle>
             <a:lvl1pPr algn="l" defTabSz="914400" rtl="0" eaLnBrk="1" latinLnBrk="0" hangingPunct="1">
@@ -11259,7 +12685,7 @@
           <p:cNvPr id="16" name="Title 15">
             <a:extLst>
               <a:ext uri="{FF2B5EF4-FFF2-40B4-BE49-F238E27FC236}">
-                <a16:creationId xmlns:a16="http://schemas.microsoft.com/office/drawing/2014/main" id="{0311113E-B278-4458-8FCF-AD752B46CF64}"/>
+                <a16:creationId xmlns:a16="http://schemas.microsoft.com/office/drawing/2014/main" xmlns="" id="{0311113E-B278-4458-8FCF-AD752B46CF64}"/>
               </a:ext>
             </a:extLst>
           </p:cNvPr>
@@ -11348,31 +12774,6 @@
           </a:p>
         </p:txBody>
       </p:sp>
-      <p:sp>
-        <p:nvSpPr>
-          <p:cNvPr id="3" name="Subtitle 2">
-            <a:extLst>
-              <a:ext uri="{FF2B5EF4-FFF2-40B4-BE49-F238E27FC236}">
-                <a16:creationId xmlns:a16="http://schemas.microsoft.com/office/drawing/2014/main" id="{ED146BDD-F21E-4928-A34F-9B26B0AD227B}"/>
-              </a:ext>
-            </a:extLst>
-          </p:cNvPr>
-          <p:cNvSpPr>
-            <a:spLocks noGrp="1"/>
-          </p:cNvSpPr>
-          <p:nvPr>
-            <p:ph type="subTitle" idx="1"/>
-          </p:nvPr>
-        </p:nvSpPr>
-        <p:spPr/>
-        <p:txBody>
-          <a:bodyPr/>
-          <a:lstStyle/>
-          <a:p>
-            <a:endParaRPr lang="en-GB"/>
-          </a:p>
-        </p:txBody>
-      </p:sp>
     </p:spTree>
     <p:extLst>
       <p:ext uri="{BB962C8B-B14F-4D97-AF65-F5344CB8AC3E}">
@@ -11411,7 +12812,7 @@
           <p:cNvPr id="2" name="Titel 1">
             <a:extLst>
               <a:ext uri="{FF2B5EF4-FFF2-40B4-BE49-F238E27FC236}">
-                <a16:creationId xmlns:a16="http://schemas.microsoft.com/office/drawing/2014/main" id="{F92BECF1-38C4-42E7-ABE8-26C37206B6D1}"/>
+                <a16:creationId xmlns:a16="http://schemas.microsoft.com/office/drawing/2014/main" xmlns="" id="{F92BECF1-38C4-42E7-ABE8-26C37206B6D1}"/>
               </a:ext>
             </a:extLst>
           </p:cNvPr>
@@ -11439,7 +12840,7 @@
           <p:cNvPr id="3" name="Inhaltsplatzhalter 2">
             <a:extLst>
               <a:ext uri="{FF2B5EF4-FFF2-40B4-BE49-F238E27FC236}">
-                <a16:creationId xmlns:a16="http://schemas.microsoft.com/office/drawing/2014/main" id="{74BE07E9-9FDA-4058-9B8B-903BFFE92079}"/>
+                <a16:creationId xmlns:a16="http://schemas.microsoft.com/office/drawing/2014/main" xmlns="" id="{74BE07E9-9FDA-4058-9B8B-903BFFE92079}"/>
               </a:ext>
             </a:extLst>
           </p:cNvPr>
@@ -11563,7 +12964,7 @@
           <p:cNvPr id="2" name="Titel 1">
             <a:extLst>
               <a:ext uri="{FF2B5EF4-FFF2-40B4-BE49-F238E27FC236}">
-                <a16:creationId xmlns:a16="http://schemas.microsoft.com/office/drawing/2014/main" id="{CDDEC2E6-79C2-4973-B961-08C3F6BB30BF}"/>
+                <a16:creationId xmlns:a16="http://schemas.microsoft.com/office/drawing/2014/main" xmlns="" id="{CDDEC2E6-79C2-4973-B961-08C3F6BB30BF}"/>
               </a:ext>
             </a:extLst>
           </p:cNvPr>
@@ -11593,7 +12994,7 @@
           <p:cNvPr id="3" name="Inhaltsplatzhalter 2">
             <a:extLst>
               <a:ext uri="{FF2B5EF4-FFF2-40B4-BE49-F238E27FC236}">
-                <a16:creationId xmlns:a16="http://schemas.microsoft.com/office/drawing/2014/main" id="{D7F1D4C7-5B58-4412-A1E9-C7528849B143}"/>
+                <a16:creationId xmlns:a16="http://schemas.microsoft.com/office/drawing/2014/main" xmlns="" id="{D7F1D4C7-5B58-4412-A1E9-C7528849B143}"/>
               </a:ext>
             </a:extLst>
           </p:cNvPr>
@@ -11693,7 +13094,7 @@
           <p:cNvPr id="4" name="Grafik 3">
             <a:extLst>
               <a:ext uri="{FF2B5EF4-FFF2-40B4-BE49-F238E27FC236}">
-                <a16:creationId xmlns:a16="http://schemas.microsoft.com/office/drawing/2014/main" id="{B65E04B7-248E-49AA-AD46-0E4C2A8140EA}"/>
+                <a16:creationId xmlns:a16="http://schemas.microsoft.com/office/drawing/2014/main" xmlns="" id="{B65E04B7-248E-49AA-AD46-0E4C2A8140EA}"/>
               </a:ext>
             </a:extLst>
           </p:cNvPr>

</xml_diff>

<commit_message>
Letzte Änderungen an Julians Folien
</commit_message>
<xml_diff>
--- a/presentations/Datenerzeugung und Datenanalyse_Sprint1_formatiert.pptx
+++ b/presentations/Datenerzeugung und Datenanalyse_Sprint1_formatiert.pptx
@@ -5,7 +5,7 @@
     <p:sldMasterId id="2147483677" r:id="rId1"/>
   </p:sldMasterIdLst>
   <p:notesMasterIdLst>
-    <p:notesMasterId r:id="rId46"/>
+    <p:notesMasterId r:id="rId45"/>
   </p:notesMasterIdLst>
   <p:sldIdLst>
     <p:sldId id="309" r:id="rId2"/>
@@ -46,12 +46,11 @@
     <p:sldId id="292" r:id="rId37"/>
     <p:sldId id="293" r:id="rId38"/>
     <p:sldId id="294" r:id="rId39"/>
-    <p:sldId id="295" r:id="rId40"/>
-    <p:sldId id="297" r:id="rId41"/>
-    <p:sldId id="307" r:id="rId42"/>
-    <p:sldId id="299" r:id="rId43"/>
-    <p:sldId id="300" r:id="rId44"/>
-    <p:sldId id="301" r:id="rId45"/>
+    <p:sldId id="297" r:id="rId40"/>
+    <p:sldId id="307" r:id="rId41"/>
+    <p:sldId id="299" r:id="rId42"/>
+    <p:sldId id="300" r:id="rId43"/>
+    <p:sldId id="301" r:id="rId44"/>
   </p:sldIdLst>
   <p:sldSz cx="12192000" cy="6858000"/>
   <p:notesSz cx="6858000" cy="9144000"/>
@@ -3990,6 +3989,13 @@
   <p:transition spd="slow">
     <p:push dir="u"/>
   </p:transition>
+  <p:timing>
+    <p:tnLst>
+      <p:par>
+        <p:cTn id="1" dur="indefinite" restart="never" nodeType="tmRoot"/>
+      </p:par>
+    </p:tnLst>
+  </p:timing>
 </p:sld>
 </file>
 
@@ -4015,7 +4021,7 @@
           <p:cNvPr id="2" name="Titel 1">
             <a:extLst>
               <a:ext uri="{FF2B5EF4-FFF2-40B4-BE49-F238E27FC236}">
-                <a16:creationId xmlns:a16="http://schemas.microsoft.com/office/drawing/2014/main" xmlns="" id="{CDDEC2E6-79C2-4973-B961-08C3F6BB30BF}"/>
+                <a16:creationId xmlns="" xmlns:a16="http://schemas.microsoft.com/office/drawing/2014/main" id="{CDDEC2E6-79C2-4973-B961-08C3F6BB30BF}"/>
               </a:ext>
             </a:extLst>
           </p:cNvPr>
@@ -4045,7 +4051,7 @@
           <p:cNvPr id="3" name="Inhaltsplatzhalter 2">
             <a:extLst>
               <a:ext uri="{FF2B5EF4-FFF2-40B4-BE49-F238E27FC236}">
-                <a16:creationId xmlns:a16="http://schemas.microsoft.com/office/drawing/2014/main" xmlns="" id="{D7F1D4C7-5B58-4412-A1E9-C7528849B143}"/>
+                <a16:creationId xmlns="" xmlns:a16="http://schemas.microsoft.com/office/drawing/2014/main" id="{D7F1D4C7-5B58-4412-A1E9-C7528849B143}"/>
               </a:ext>
             </a:extLst>
           </p:cNvPr>
@@ -4067,70 +4073,65 @@
                   <a:schemeClr val="tx1"/>
                 </a:solidFill>
               </a:rPr>
-              <a:t>Einarbeitung in Vadere (erstes Testszenarios)</a:t>
-            </a:r>
-          </a:p>
-          <a:p>
+              <a:t>Einarbeitung in Vadere (erstes </a:t>
+            </a:r>
+            <a:r>
+              <a:rPr lang="de-DE" dirty="0" smtClean="0">
+                <a:solidFill>
+                  <a:schemeClr val="tx1"/>
+                </a:solidFill>
+              </a:rPr>
+              <a:t>Tests</a:t>
+            </a:r>
+            <a:r>
+              <a:rPr lang="de-DE" dirty="0" smtClean="0">
+                <a:solidFill>
+                  <a:schemeClr val="tx1"/>
+                </a:solidFill>
+              </a:rPr>
+              <a:t>zenarios</a:t>
+            </a:r>
             <a:r>
               <a:rPr lang="de-DE" dirty="0">
                 <a:solidFill>
                   <a:schemeClr val="tx1"/>
                 </a:solidFill>
               </a:rPr>
-              <a:t>Erstellung eines ersten Testszenarios (~60 Outputs) für das Testen der neuronalen Netze</a:t>
-            </a:r>
-          </a:p>
-          <a:p>
-            <a:pPr>
-              <a:buFont typeface="Wingdings" panose="05000000000000000000" pitchFamily="2" charset="2"/>
-              <a:buChar char="à"/>
-            </a:pPr>
+              <a:t>)</a:t>
+            </a:r>
+          </a:p>
+          <a:p>
             <a:r>
               <a:rPr lang="de-DE" dirty="0">
                 <a:solidFill>
                   <a:schemeClr val="tx1"/>
                 </a:solidFill>
-                <a:sym typeface="Wingdings" panose="05000000000000000000" pitchFamily="2" charset="2"/>
-              </a:rPr>
-              <a:t> Alle Permutationen 600 Leute auf 3 </a:t>
-            </a:r>
-          </a:p>
-          <a:p>
-            <a:pPr marL="0" indent="0">
-              <a:buNone/>
-            </a:pPr>
+              </a:rPr>
+              <a:t>Erstellung eines ersten </a:t>
+            </a:r>
+            <a:r>
+              <a:rPr lang="de-DE" dirty="0" smtClean="0">
+                <a:solidFill>
+                  <a:schemeClr val="tx1"/>
+                </a:solidFill>
+              </a:rPr>
+              <a:t>Trainingsszenarios </a:t>
+            </a:r>
             <a:r>
               <a:rPr lang="de-DE" dirty="0">
                 <a:solidFill>
                   <a:schemeClr val="tx1"/>
                 </a:solidFill>
-                <a:sym typeface="Wingdings" panose="05000000000000000000" pitchFamily="2" charset="2"/>
-              </a:rPr>
-              <a:t>     Ziele in 50er Schritten aufzuteilen</a:t>
-            </a:r>
-          </a:p>
-          <a:p>
-            <a:pPr>
-              <a:buFont typeface="Wingdings" panose="05000000000000000000" pitchFamily="2" charset="2"/>
-              <a:buChar char="à"/>
-            </a:pPr>
-            <a:r>
-              <a:rPr lang="de-DE" dirty="0">
-                <a:solidFill>
-                  <a:schemeClr val="tx1"/>
-                </a:solidFill>
-                <a:sym typeface="Wingdings" panose="05000000000000000000" pitchFamily="2" charset="2"/>
-              </a:rPr>
-              <a:t> </a:t>
-            </a:r>
-            <a:r>
-              <a:rPr lang="de-DE" dirty="0" err="1">
-                <a:solidFill>
-                  <a:schemeClr val="tx1"/>
-                </a:solidFill>
-                <a:sym typeface="Wingdings" panose="05000000000000000000" pitchFamily="2" charset="2"/>
-              </a:rPr>
-              <a:t>hardcoded</a:t>
+              </a:rPr>
+              <a:t>(~60 Outputs) für </a:t>
+            </a:r>
+            <a:r>
+              <a:rPr lang="de-DE" dirty="0" smtClean="0">
+                <a:solidFill>
+                  <a:schemeClr val="tx1"/>
+                </a:solidFill>
+              </a:rPr>
+              <a:t>die Datenvorverarbeitung</a:t>
             </a:r>
             <a:endParaRPr lang="de-DE" dirty="0">
               <a:solidFill>
@@ -4138,6 +4139,79 @@
               </a:solidFill>
             </a:endParaRPr>
           </a:p>
+          <a:p>
+            <a:pPr>
+              <a:buFont typeface="Wingdings" panose="05000000000000000000" pitchFamily="2" charset="2"/>
+              <a:buChar char="à"/>
+            </a:pPr>
+            <a:r>
+              <a:rPr lang="de-DE" dirty="0">
+                <a:solidFill>
+                  <a:schemeClr val="tx1"/>
+                </a:solidFill>
+                <a:sym typeface="Wingdings" panose="05000000000000000000" pitchFamily="2" charset="2"/>
+              </a:rPr>
+              <a:t> Alle Permutationen 600 Leute auf 3 </a:t>
+            </a:r>
+          </a:p>
+          <a:p>
+            <a:pPr marL="268288" indent="-268288">
+              <a:buNone/>
+            </a:pPr>
+            <a:r>
+              <a:rPr lang="de-DE" dirty="0">
+                <a:solidFill>
+                  <a:schemeClr val="tx1"/>
+                </a:solidFill>
+                <a:sym typeface="Wingdings" panose="05000000000000000000" pitchFamily="2" charset="2"/>
+              </a:rPr>
+              <a:t>     Ziele in 50er Schritten </a:t>
+            </a:r>
+            <a:r>
+              <a:rPr lang="de-DE" dirty="0" smtClean="0">
+                <a:solidFill>
+                  <a:schemeClr val="tx1"/>
+                </a:solidFill>
+                <a:sym typeface="Wingdings" panose="05000000000000000000" pitchFamily="2" charset="2"/>
+              </a:rPr>
+              <a:t>aufzuteilen</a:t>
+            </a:r>
+            <a:endParaRPr lang="de-DE" dirty="0">
+              <a:solidFill>
+                <a:schemeClr val="tx1"/>
+              </a:solidFill>
+              <a:sym typeface="Wingdings" panose="05000000000000000000" pitchFamily="2" charset="2"/>
+            </a:endParaRPr>
+          </a:p>
+          <a:p>
+            <a:pPr>
+              <a:buFont typeface="Wingdings" panose="05000000000000000000" pitchFamily="2" charset="2"/>
+              <a:buChar char="à"/>
+            </a:pPr>
+            <a:r>
+              <a:rPr lang="de-DE" dirty="0">
+                <a:solidFill>
+                  <a:schemeClr val="tx1"/>
+                </a:solidFill>
+                <a:sym typeface="Wingdings" panose="05000000000000000000" pitchFamily="2" charset="2"/>
+              </a:rPr>
+              <a:t> </a:t>
+            </a:r>
+            <a:r>
+              <a:rPr lang="de-DE" dirty="0" smtClean="0">
+                <a:solidFill>
+                  <a:schemeClr val="tx1"/>
+                </a:solidFill>
+                <a:sym typeface="Wingdings" panose="05000000000000000000" pitchFamily="2" charset="2"/>
+              </a:rPr>
+              <a:t>manuell erstellt</a:t>
+            </a:r>
+            <a:endParaRPr lang="de-DE" dirty="0">
+              <a:solidFill>
+                <a:schemeClr val="tx1"/>
+              </a:solidFill>
+            </a:endParaRPr>
+          </a:p>
         </p:txBody>
       </p:sp>
       <p:pic>
@@ -4145,7 +4219,7 @@
           <p:cNvPr id="4" name="Grafik 3">
             <a:extLst>
               <a:ext uri="{FF2B5EF4-FFF2-40B4-BE49-F238E27FC236}">
-                <a16:creationId xmlns:a16="http://schemas.microsoft.com/office/drawing/2014/main" xmlns="" id="{B65E04B7-248E-49AA-AD46-0E4C2A8140EA}"/>
+                <a16:creationId xmlns="" xmlns:a16="http://schemas.microsoft.com/office/drawing/2014/main" id="{B65E04B7-248E-49AA-AD46-0E4C2A8140EA}"/>
               </a:ext>
             </a:extLst>
           </p:cNvPr>
@@ -4188,6 +4262,13 @@
   <p:transition spd="slow">
     <p:push dir="u"/>
   </p:transition>
+  <p:timing>
+    <p:tnLst>
+      <p:par>
+        <p:cTn id="1" dur="indefinite" restart="never" nodeType="tmRoot"/>
+      </p:par>
+    </p:tnLst>
+  </p:timing>
 </p:sld>
 </file>
 
@@ -4213,7 +4294,7 @@
           <p:cNvPr id="2" name="Titel 1">
             <a:extLst>
               <a:ext uri="{FF2B5EF4-FFF2-40B4-BE49-F238E27FC236}">
-                <a16:creationId xmlns:a16="http://schemas.microsoft.com/office/drawing/2014/main" xmlns="" id="{60271D86-4CB2-4409-B05F-BCA08D355142}"/>
+                <a16:creationId xmlns="" xmlns:a16="http://schemas.microsoft.com/office/drawing/2014/main" id="{60271D86-4CB2-4409-B05F-BCA08D355142}"/>
               </a:ext>
             </a:extLst>
           </p:cNvPr>
@@ -4243,7 +4324,7 @@
           <p:cNvPr id="3" name="Inhaltsplatzhalter 2">
             <a:extLst>
               <a:ext uri="{FF2B5EF4-FFF2-40B4-BE49-F238E27FC236}">
-                <a16:creationId xmlns:a16="http://schemas.microsoft.com/office/drawing/2014/main" xmlns="" id="{26DF3A91-1ACC-4D55-8616-F4C25321C110}"/>
+                <a16:creationId xmlns="" xmlns:a16="http://schemas.microsoft.com/office/drawing/2014/main" id="{26DF3A91-1ACC-4D55-8616-F4C25321C110}"/>
               </a:ext>
             </a:extLst>
           </p:cNvPr>
@@ -4307,8 +4388,21 @@
                   <a:schemeClr val="tx1"/>
                 </a:solidFill>
               </a:rPr>
-              <a:t>Lösung:  </a:t>
-            </a:r>
+              <a:t>Lösung: </a:t>
+            </a:r>
+            <a:r>
+              <a:rPr lang="de-DE" dirty="0" smtClean="0">
+                <a:solidFill>
+                  <a:schemeClr val="tx1"/>
+                </a:solidFill>
+              </a:rPr>
+              <a:t>Automatisierung </a:t>
+            </a:r>
+            <a:endParaRPr lang="de-DE" dirty="0">
+              <a:solidFill>
+                <a:schemeClr val="tx1"/>
+              </a:solidFill>
+            </a:endParaRPr>
           </a:p>
           <a:p>
             <a:pPr lvl="1"/>
@@ -4318,7 +4412,42 @@
                   <a:schemeClr val="tx1"/>
                 </a:solidFill>
               </a:rPr>
-              <a:t>Selber ein Test </a:t>
+              <a:t>Selber ein </a:t>
+            </a:r>
+            <a:r>
+              <a:rPr lang="de-DE" sz="2000" dirty="0" err="1" smtClean="0">
+                <a:solidFill>
+                  <a:schemeClr val="tx1"/>
+                </a:solidFill>
+              </a:rPr>
+              <a:t>Vadere</a:t>
+            </a:r>
+            <a:r>
+              <a:rPr lang="de-DE" sz="2000" dirty="0" smtClean="0">
+                <a:solidFill>
+                  <a:schemeClr val="tx1"/>
+                </a:solidFill>
+              </a:rPr>
+              <a:t> </a:t>
+            </a:r>
+            <a:r>
+              <a:rPr lang="de-DE" sz="2000" dirty="0">
+                <a:solidFill>
+                  <a:schemeClr val="tx1"/>
+                </a:solidFill>
+              </a:rPr>
+              <a:t>Test Projekt erstellen</a:t>
+            </a:r>
+          </a:p>
+          <a:p>
+            <a:pPr lvl="1"/>
+            <a:r>
+              <a:rPr lang="de-DE" sz="2000" dirty="0">
+                <a:solidFill>
+                  <a:schemeClr val="tx1"/>
+                </a:solidFill>
+              </a:rPr>
+              <a:t>Darin das Test Szenario(JSON File) </a:t>
             </a:r>
             <a:r>
               <a:rPr lang="de-DE" sz="2000" dirty="0" err="1">
@@ -4326,7 +4455,7 @@
                   <a:schemeClr val="tx1"/>
                 </a:solidFill>
               </a:rPr>
-              <a:t>Vadere</a:t>
+              <a:t>deserialisieren</a:t>
             </a:r>
             <a:r>
               <a:rPr lang="de-DE" sz="2000" dirty="0">
@@ -4334,7 +4463,7 @@
                   <a:schemeClr val="tx1"/>
                 </a:solidFill>
               </a:rPr>
-              <a:t> Test Projekt erstellen</a:t>
+              <a:t> (zu Java Objekt)</a:t>
             </a:r>
           </a:p>
           <a:p>
@@ -4345,35 +4474,21 @@
                   <a:schemeClr val="tx1"/>
                 </a:solidFill>
               </a:rPr>
-              <a:t>Darin das Test Szenario(JSON File) </a:t>
-            </a:r>
-            <a:r>
-              <a:rPr lang="de-DE" sz="2000" dirty="0" err="1">
-                <a:solidFill>
-                  <a:schemeClr val="tx1"/>
-                </a:solidFill>
-              </a:rPr>
-              <a:t>deserialisieren</a:t>
-            </a:r>
-            <a:r>
-              <a:rPr lang="de-DE" sz="2000" dirty="0">
-                <a:solidFill>
-                  <a:schemeClr val="tx1"/>
-                </a:solidFill>
-              </a:rPr>
-              <a:t> (zu Java Objekt)</a:t>
-            </a:r>
-          </a:p>
-          <a:p>
-            <a:pPr lvl="1"/>
-            <a:r>
-              <a:rPr lang="de-DE" sz="2000" dirty="0">
-                <a:solidFill>
-                  <a:schemeClr val="tx1"/>
-                </a:solidFill>
-              </a:rPr>
-              <a:t>Manipulation der Parameter des Szenarios innerhalb des JSON Files.</a:t>
-            </a:r>
+              <a:t>Manipulation der Parameter des </a:t>
+            </a:r>
+            <a:r>
+              <a:rPr lang="de-DE" sz="2000" dirty="0" smtClean="0">
+                <a:solidFill>
+                  <a:schemeClr val="tx1"/>
+                </a:solidFill>
+              </a:rPr>
+              <a:t>Szenarios</a:t>
+            </a:r>
+            <a:endParaRPr lang="de-DE" sz="2000" dirty="0">
+              <a:solidFill>
+                <a:schemeClr val="tx1"/>
+              </a:solidFill>
+            </a:endParaRPr>
           </a:p>
           <a:p>
             <a:r>
@@ -4416,6 +4531,13 @@
   <p:transition spd="slow">
     <p:push dir="u"/>
   </p:transition>
+  <p:timing>
+    <p:tnLst>
+      <p:par>
+        <p:cTn id="1" dur="indefinite" restart="never" nodeType="tmRoot"/>
+      </p:par>
+    </p:tnLst>
+  </p:timing>
 </p:sld>
 </file>
 
@@ -4441,7 +4563,7 @@
           <p:cNvPr id="2" name="Titel 1">
             <a:extLst>
               <a:ext uri="{FF2B5EF4-FFF2-40B4-BE49-F238E27FC236}">
-                <a16:creationId xmlns:a16="http://schemas.microsoft.com/office/drawing/2014/main" xmlns="" id="{CCAD9307-1B32-4D7F-9148-CD74FFEFF568}"/>
+                <a16:creationId xmlns="" xmlns:a16="http://schemas.microsoft.com/office/drawing/2014/main" id="{CCAD9307-1B32-4D7F-9148-CD74FFEFF568}"/>
               </a:ext>
             </a:extLst>
           </p:cNvPr>
@@ -4471,7 +4593,7 @@
           <p:cNvPr id="3" name="Inhaltsplatzhalter 2">
             <a:extLst>
               <a:ext uri="{FF2B5EF4-FFF2-40B4-BE49-F238E27FC236}">
-                <a16:creationId xmlns:a16="http://schemas.microsoft.com/office/drawing/2014/main" xmlns="" id="{D928D9F6-A085-466A-99D0-B93A9303E798}"/>
+                <a16:creationId xmlns="" xmlns:a16="http://schemas.microsoft.com/office/drawing/2014/main" id="{D928D9F6-A085-466A-99D0-B93A9303E798}"/>
               </a:ext>
             </a:extLst>
           </p:cNvPr>
@@ -4495,8 +4617,21 @@
                   <a:schemeClr val="tx1"/>
                 </a:solidFill>
               </a:rPr>
-              <a:t>Literatur-Recherche über Filter für neuronale Netze wurde zu nächstem Sprint verschoben</a:t>
-            </a:r>
+              <a:t>Literatur-Recherche über </a:t>
+            </a:r>
+            <a:r>
+              <a:rPr lang="de-DE" sz="2800" dirty="0" smtClean="0">
+                <a:solidFill>
+                  <a:schemeClr val="tx1"/>
+                </a:solidFill>
+              </a:rPr>
+              <a:t>Filter zur Datenvorverarbeitung wird im nächsten Sprint noch weiter fortgesetzt.</a:t>
+            </a:r>
+            <a:endParaRPr lang="de-DE" sz="2800" dirty="0">
+              <a:solidFill>
+                <a:schemeClr val="tx1"/>
+              </a:solidFill>
+            </a:endParaRPr>
           </a:p>
         </p:txBody>
       </p:sp>
@@ -4513,6 +4648,13 @@
   <p:transition spd="slow">
     <p:push dir="u"/>
   </p:transition>
+  <p:timing>
+    <p:tnLst>
+      <p:par>
+        <p:cTn id="1" dur="indefinite" restart="never" nodeType="tmRoot"/>
+      </p:par>
+    </p:tnLst>
+  </p:timing>
 </p:sld>
 </file>
 
@@ -4538,7 +4680,7 @@
           <p:cNvPr id="2" name="Title 6">
             <a:extLst>
               <a:ext uri="{FF2B5EF4-FFF2-40B4-BE49-F238E27FC236}">
-                <a16:creationId xmlns:a16="http://schemas.microsoft.com/office/drawing/2014/main" xmlns="" id="{04F78A0C-BF40-4E0B-9FA4-AAAA57E3C4EF}"/>
+                <a16:creationId xmlns="" xmlns:a16="http://schemas.microsoft.com/office/drawing/2014/main" id="{04F78A0C-BF40-4E0B-9FA4-AAAA57E3C4EF}"/>
               </a:ext>
             </a:extLst>
           </p:cNvPr>
@@ -4570,7 +4712,7 @@
           <p:cNvPr id="3" name="Content Placeholder 7">
             <a:extLst>
               <a:ext uri="{FF2B5EF4-FFF2-40B4-BE49-F238E27FC236}">
-                <a16:creationId xmlns:a16="http://schemas.microsoft.com/office/drawing/2014/main" xmlns="" id="{3A52400E-A01D-4CCF-8280-EBE32B011F8E}"/>
+                <a16:creationId xmlns="" xmlns:a16="http://schemas.microsoft.com/office/drawing/2014/main" id="{3A52400E-A01D-4CCF-8280-EBE32B011F8E}"/>
               </a:ext>
             </a:extLst>
           </p:cNvPr>
@@ -4735,6 +4877,13 @@
   <p:transition spd="slow">
     <p:push dir="u"/>
   </p:transition>
+  <p:timing>
+    <p:tnLst>
+      <p:par>
+        <p:cTn id="1" dur="indefinite" restart="never" nodeType="tmRoot"/>
+      </p:par>
+    </p:tnLst>
+  </p:timing>
 </p:sld>
 </file>
 
@@ -4760,7 +4909,7 @@
           <p:cNvPr id="2" name="Titel 1">
             <a:extLst>
               <a:ext uri="{FF2B5EF4-FFF2-40B4-BE49-F238E27FC236}">
-                <a16:creationId xmlns:a16="http://schemas.microsoft.com/office/drawing/2014/main" xmlns="" id="{CCAD9307-1B32-4D7F-9148-CD74FFEFF568}"/>
+                <a16:creationId xmlns="" xmlns:a16="http://schemas.microsoft.com/office/drawing/2014/main" id="{CCAD9307-1B32-4D7F-9148-CD74FFEFF568}"/>
               </a:ext>
             </a:extLst>
           </p:cNvPr>
@@ -4796,6 +4945,13 @@
   <p:transition spd="slow">
     <p:push dir="u"/>
   </p:transition>
+  <p:timing>
+    <p:tnLst>
+      <p:par>
+        <p:cTn id="1" dur="indefinite" restart="never" nodeType="tmRoot"/>
+      </p:par>
+    </p:tnLst>
+  </p:timing>
 </p:sld>
 </file>
 
@@ -4949,6 +5105,13 @@
   <p:transition spd="slow">
     <p:push dir="u"/>
   </p:transition>
+  <p:timing>
+    <p:tnLst>
+      <p:par>
+        <p:cTn id="1" dur="indefinite" restart="never" nodeType="tmRoot"/>
+      </p:par>
+    </p:tnLst>
+  </p:timing>
 </p:sld>
 </file>
 
@@ -5130,56 +5293,56 @@
                 <a:gridCol w="1216476">
                   <a:extLst>
                     <a:ext uri="{9D8B030D-6E8A-4147-A177-3AD203B41FA5}">
-                      <a16:colId xmlns:a16="http://schemas.microsoft.com/office/drawing/2014/main" xmlns="" val="20000"/>
+                      <a16:colId xmlns="" xmlns:a16="http://schemas.microsoft.com/office/drawing/2014/main" val="20000"/>
                     </a:ext>
                   </a:extLst>
                 </a:gridCol>
                 <a:gridCol w="1455938">
                   <a:extLst>
                     <a:ext uri="{9D8B030D-6E8A-4147-A177-3AD203B41FA5}">
-                      <a16:colId xmlns:a16="http://schemas.microsoft.com/office/drawing/2014/main" xmlns="" val="20001"/>
+                      <a16:colId xmlns="" xmlns:a16="http://schemas.microsoft.com/office/drawing/2014/main" val="20001"/>
                     </a:ext>
                   </a:extLst>
                 </a:gridCol>
                 <a:gridCol w="1491449">
                   <a:extLst>
                     <a:ext uri="{9D8B030D-6E8A-4147-A177-3AD203B41FA5}">
-                      <a16:colId xmlns:a16="http://schemas.microsoft.com/office/drawing/2014/main" xmlns="" val="20002"/>
+                      <a16:colId xmlns="" xmlns:a16="http://schemas.microsoft.com/office/drawing/2014/main" val="20002"/>
                     </a:ext>
                   </a:extLst>
                 </a:gridCol>
                 <a:gridCol w="325313">
                   <a:extLst>
                     <a:ext uri="{9D8B030D-6E8A-4147-A177-3AD203B41FA5}">
-                      <a16:colId xmlns:a16="http://schemas.microsoft.com/office/drawing/2014/main" xmlns="" val="20003"/>
+                      <a16:colId xmlns="" xmlns:a16="http://schemas.microsoft.com/office/drawing/2014/main" val="20003"/>
                     </a:ext>
                   </a:extLst>
                 </a:gridCol>
                 <a:gridCol w="1491449">
                   <a:extLst>
                     <a:ext uri="{9D8B030D-6E8A-4147-A177-3AD203B41FA5}">
-                      <a16:colId xmlns:a16="http://schemas.microsoft.com/office/drawing/2014/main" xmlns="" val="20004"/>
+                      <a16:colId xmlns="" xmlns:a16="http://schemas.microsoft.com/office/drawing/2014/main" val="20004"/>
                     </a:ext>
                   </a:extLst>
                 </a:gridCol>
                 <a:gridCol w="585926">
                   <a:extLst>
                     <a:ext uri="{9D8B030D-6E8A-4147-A177-3AD203B41FA5}">
-                      <a16:colId xmlns:a16="http://schemas.microsoft.com/office/drawing/2014/main" xmlns="" val="20005"/>
+                      <a16:colId xmlns="" xmlns:a16="http://schemas.microsoft.com/office/drawing/2014/main" val="20005"/>
                     </a:ext>
                   </a:extLst>
                 </a:gridCol>
                 <a:gridCol w="949911">
                   <a:extLst>
                     <a:ext uri="{9D8B030D-6E8A-4147-A177-3AD203B41FA5}">
-                      <a16:colId xmlns:a16="http://schemas.microsoft.com/office/drawing/2014/main" xmlns="" val="20006"/>
+                      <a16:colId xmlns="" xmlns:a16="http://schemas.microsoft.com/office/drawing/2014/main" val="20006"/>
                     </a:ext>
                   </a:extLst>
                 </a:gridCol>
                 <a:gridCol w="762013">
                   <a:extLst>
                     <a:ext uri="{9D8B030D-6E8A-4147-A177-3AD203B41FA5}">
-                      <a16:colId xmlns:a16="http://schemas.microsoft.com/office/drawing/2014/main" xmlns="" val="20007"/>
+                      <a16:colId xmlns="" xmlns:a16="http://schemas.microsoft.com/office/drawing/2014/main" val="20007"/>
                     </a:ext>
                   </a:extLst>
                 </a:gridCol>
@@ -5315,7 +5478,7 @@
                 </a:tc>
                 <a:extLst>
                   <a:ext uri="{0D108BD9-81ED-4DB2-BD59-A6C34878D82A}">
-                    <a16:rowId xmlns:a16="http://schemas.microsoft.com/office/drawing/2014/main" xmlns="" val="10000"/>
+                    <a16:rowId xmlns="" xmlns:a16="http://schemas.microsoft.com/office/drawing/2014/main" val="10000"/>
                   </a:ext>
                 </a:extLst>
               </a:tr>
@@ -5336,6 +5499,13 @@
   <p:transition spd="slow">
     <p:push dir="u"/>
   </p:transition>
+  <p:timing>
+    <p:tnLst>
+      <p:par>
+        <p:cTn id="1" dur="indefinite" restart="never" nodeType="tmRoot"/>
+      </p:par>
+    </p:tnLst>
+  </p:timing>
 </p:sld>
 </file>
 
@@ -5429,6 +5599,13 @@
   <p:transition spd="slow">
     <p:push dir="u"/>
   </p:transition>
+  <p:timing>
+    <p:tnLst>
+      <p:par>
+        <p:cTn id="1" dur="indefinite" restart="never" nodeType="tmRoot"/>
+      </p:par>
+    </p:tnLst>
+  </p:timing>
 </p:sld>
 </file>
 
@@ -5454,7 +5631,7 @@
           <p:cNvPr id="2" name="Title 6">
             <a:extLst>
               <a:ext uri="{FF2B5EF4-FFF2-40B4-BE49-F238E27FC236}">
-                <a16:creationId xmlns:a16="http://schemas.microsoft.com/office/drawing/2014/main" xmlns="" id="{04F78A0C-BF40-4E0B-9FA4-AAAA57E3C4EF}"/>
+                <a16:creationId xmlns="" xmlns:a16="http://schemas.microsoft.com/office/drawing/2014/main" id="{04F78A0C-BF40-4E0B-9FA4-AAAA57E3C4EF}"/>
               </a:ext>
             </a:extLst>
           </p:cNvPr>
@@ -5486,7 +5663,7 @@
           <p:cNvPr id="3" name="Content Placeholder 7">
             <a:extLst>
               <a:ext uri="{FF2B5EF4-FFF2-40B4-BE49-F238E27FC236}">
-                <a16:creationId xmlns:a16="http://schemas.microsoft.com/office/drawing/2014/main" xmlns="" id="{3A52400E-A01D-4CCF-8280-EBE32B011F8E}"/>
+                <a16:creationId xmlns="" xmlns:a16="http://schemas.microsoft.com/office/drawing/2014/main" id="{3A52400E-A01D-4CCF-8280-EBE32B011F8E}"/>
               </a:ext>
             </a:extLst>
           </p:cNvPr>
@@ -5651,6 +5828,13 @@
   <p:transition spd="slow">
     <p:push dir="u"/>
   </p:transition>
+  <p:timing>
+    <p:tnLst>
+      <p:par>
+        <p:cTn id="1" dur="indefinite" restart="never" nodeType="tmRoot"/>
+      </p:par>
+    </p:tnLst>
+  </p:timing>
 </p:sld>
 </file>
 
@@ -5746,6 +5930,13 @@
   <p:transition spd="slow">
     <p:push dir="u"/>
   </p:transition>
+  <p:timing>
+    <p:tnLst>
+      <p:par>
+        <p:cTn id="1" dur="indefinite" restart="never" nodeType="tmRoot"/>
+      </p:par>
+    </p:tnLst>
+  </p:timing>
 </p:sld>
 </file>
 
@@ -5802,7 +5993,7 @@
           <p:cNvPr id="3" name="Content Placeholder 2">
             <a:extLst>
               <a:ext uri="{FF2B5EF4-FFF2-40B4-BE49-F238E27FC236}">
-                <a16:creationId xmlns:a16="http://schemas.microsoft.com/office/drawing/2014/main" xmlns="" id="{5D4B6457-3E37-4879-A8CB-262CE10EA13A}"/>
+                <a16:creationId xmlns="" xmlns:a16="http://schemas.microsoft.com/office/drawing/2014/main" id="{5D4B6457-3E37-4879-A8CB-262CE10EA13A}"/>
               </a:ext>
             </a:extLst>
           </p:cNvPr>
@@ -5958,6 +6149,13 @@
   <p:transition spd="slow">
     <p:push dir="u"/>
   </p:transition>
+  <p:timing>
+    <p:tnLst>
+      <p:par>
+        <p:cTn id="1" dur="indefinite" restart="never" nodeType="tmRoot"/>
+      </p:par>
+    </p:tnLst>
+  </p:timing>
 </p:sld>
 </file>
 
@@ -6038,6 +6236,13 @@
   <p:transition spd="slow">
     <p:push dir="u"/>
   </p:transition>
+  <p:timing>
+    <p:tnLst>
+      <p:par>
+        <p:cTn id="1" dur="indefinite" restart="never" nodeType="tmRoot"/>
+      </p:par>
+    </p:tnLst>
+  </p:timing>
 </p:sld>
 </file>
 
@@ -6063,7 +6268,7 @@
           <p:cNvPr id="2" name="Title 1">
             <a:extLst>
               <a:ext uri="{FF2B5EF4-FFF2-40B4-BE49-F238E27FC236}">
-                <a16:creationId xmlns:a16="http://schemas.microsoft.com/office/drawing/2014/main" xmlns="" id="{42987CE7-B13A-4B59-8B96-2888C00F9009}"/>
+                <a16:creationId xmlns="" xmlns:a16="http://schemas.microsoft.com/office/drawing/2014/main" id="{42987CE7-B13A-4B59-8B96-2888C00F9009}"/>
               </a:ext>
             </a:extLst>
           </p:cNvPr>
@@ -6332,6 +6537,13 @@
   <p:transition spd="slow">
     <p:push dir="u"/>
   </p:transition>
+  <p:timing>
+    <p:tnLst>
+      <p:par>
+        <p:cTn id="1" dur="indefinite" restart="never" nodeType="tmRoot"/>
+      </p:par>
+    </p:tnLst>
+  </p:timing>
 </p:sld>
 </file>
 
@@ -6357,7 +6569,7 @@
           <p:cNvPr id="2" name="Title 1">
             <a:extLst>
               <a:ext uri="{FF2B5EF4-FFF2-40B4-BE49-F238E27FC236}">
-                <a16:creationId xmlns:a16="http://schemas.microsoft.com/office/drawing/2014/main" xmlns="" id="{093A1977-6FA5-4F92-8973-FAD67E671E73}"/>
+                <a16:creationId xmlns="" xmlns:a16="http://schemas.microsoft.com/office/drawing/2014/main" id="{093A1977-6FA5-4F92-8973-FAD67E671E73}"/>
               </a:ext>
             </a:extLst>
           </p:cNvPr>
@@ -6574,6 +6786,13 @@
   <p:transition spd="slow">
     <p:push dir="u"/>
   </p:transition>
+  <p:timing>
+    <p:tnLst>
+      <p:par>
+        <p:cTn id="1" dur="indefinite" restart="never" nodeType="tmRoot"/>
+      </p:par>
+    </p:tnLst>
+  </p:timing>
 </p:sld>
 </file>
 
@@ -6599,7 +6818,7 @@
           <p:cNvPr id="2" name="Title 1">
             <a:extLst>
               <a:ext uri="{FF2B5EF4-FFF2-40B4-BE49-F238E27FC236}">
-                <a16:creationId xmlns:a16="http://schemas.microsoft.com/office/drawing/2014/main" xmlns="" id="{980B2DBA-E02C-4557-864C-17B2FDEB2149}"/>
+                <a16:creationId xmlns="" xmlns:a16="http://schemas.microsoft.com/office/drawing/2014/main" id="{980B2DBA-E02C-4557-864C-17B2FDEB2149}"/>
               </a:ext>
             </a:extLst>
           </p:cNvPr>
@@ -6893,6 +7112,13 @@
   <p:transition spd="slow">
     <p:push dir="u"/>
   </p:transition>
+  <p:timing>
+    <p:tnLst>
+      <p:par>
+        <p:cTn id="1" dur="indefinite" restart="never" nodeType="tmRoot"/>
+      </p:par>
+    </p:tnLst>
+  </p:timing>
 </p:sld>
 </file>
 
@@ -6918,7 +7144,7 @@
           <p:cNvPr id="2" name="Title 6">
             <a:extLst>
               <a:ext uri="{FF2B5EF4-FFF2-40B4-BE49-F238E27FC236}">
-                <a16:creationId xmlns:a16="http://schemas.microsoft.com/office/drawing/2014/main" xmlns="" id="{04F78A0C-BF40-4E0B-9FA4-AAAA57E3C4EF}"/>
+                <a16:creationId xmlns="" xmlns:a16="http://schemas.microsoft.com/office/drawing/2014/main" id="{04F78A0C-BF40-4E0B-9FA4-AAAA57E3C4EF}"/>
               </a:ext>
             </a:extLst>
           </p:cNvPr>
@@ -6937,7 +7163,19 @@
           <a:lstStyle/>
           <a:p>
             <a:pPr lvl="0" algn="ctr"/>
-            <a:endParaRPr lang="en-GB" sz="2800" dirty="0"/>
+            <a:r>
+              <a:rPr lang="de-DE" sz="6600" dirty="0"/>
+              <a:t>~</a:t>
+            </a:r>
+            <a:r>
+              <a:rPr lang="de-DE" sz="6600" dirty="0" smtClean="0"/>
+              <a:t>1 </a:t>
+            </a:r>
+            <a:r>
+              <a:rPr lang="de-DE" sz="6600" dirty="0"/>
+              <a:t>%</a:t>
+            </a:r>
+            <a:endParaRPr lang="en-GB" sz="6600" dirty="0"/>
           </a:p>
         </p:txBody>
       </p:sp>
@@ -6946,7 +7184,7 @@
           <p:cNvPr id="3" name="Content Placeholder 7">
             <a:extLst>
               <a:ext uri="{FF2B5EF4-FFF2-40B4-BE49-F238E27FC236}">
-                <a16:creationId xmlns:a16="http://schemas.microsoft.com/office/drawing/2014/main" xmlns="" id="{3A52400E-A01D-4CCF-8280-EBE32B011F8E}"/>
+                <a16:creationId xmlns="" xmlns:a16="http://schemas.microsoft.com/office/drawing/2014/main" id="{3A52400E-A01D-4CCF-8280-EBE32B011F8E}"/>
               </a:ext>
             </a:extLst>
           </p:cNvPr>
@@ -7111,6 +7349,13 @@
   <p:transition spd="slow">
     <p:push dir="u"/>
   </p:transition>
+  <p:timing>
+    <p:tnLst>
+      <p:par>
+        <p:cTn id="1" dur="indefinite" restart="never" nodeType="tmRoot"/>
+      </p:par>
+    </p:tnLst>
+  </p:timing>
 </p:sld>
 </file>
 
@@ -7136,7 +7381,7 @@
           <p:cNvPr id="2" name="Title 1">
             <a:extLst>
               <a:ext uri="{FF2B5EF4-FFF2-40B4-BE49-F238E27FC236}">
-                <a16:creationId xmlns:a16="http://schemas.microsoft.com/office/drawing/2014/main" xmlns="" id="{4830BEB7-55A9-47F9-992E-3F39B8ED4A85}"/>
+                <a16:creationId xmlns="" xmlns:a16="http://schemas.microsoft.com/office/drawing/2014/main" id="{4830BEB7-55A9-47F9-992E-3F39B8ED4A85}"/>
               </a:ext>
             </a:extLst>
           </p:cNvPr>
@@ -7173,6 +7418,13 @@
   <p:transition spd="slow">
     <p:push dir="u"/>
   </p:transition>
+  <p:timing>
+    <p:tnLst>
+      <p:par>
+        <p:cTn id="1" dur="indefinite" restart="never" nodeType="tmRoot"/>
+      </p:par>
+    </p:tnLst>
+  </p:timing>
 </p:sld>
 </file>
 
@@ -7365,6 +7617,13 @@
   <p:transition spd="slow">
     <p:push dir="u"/>
   </p:transition>
+  <p:timing>
+    <p:tnLst>
+      <p:par>
+        <p:cTn id="1" dur="indefinite" restart="never" nodeType="tmRoot"/>
+      </p:par>
+    </p:tnLst>
+  </p:timing>
 </p:sld>
 </file>
 
@@ -7568,6 +7827,13 @@
   <p:transition spd="slow">
     <p:push dir="u"/>
   </p:transition>
+  <p:timing>
+    <p:tnLst>
+      <p:par>
+        <p:cTn id="1" dur="indefinite" restart="never" nodeType="tmRoot"/>
+      </p:par>
+    </p:tnLst>
+  </p:timing>
 </p:sld>
 </file>
 
@@ -7691,6 +7957,13 @@
   <p:transition spd="slow">
     <p:push dir="u"/>
   </p:transition>
+  <p:timing>
+    <p:tnLst>
+      <p:par>
+        <p:cTn id="1" dur="indefinite" restart="never" nodeType="tmRoot"/>
+      </p:par>
+    </p:tnLst>
+  </p:timing>
 </p:sld>
 </file>
 
@@ -7716,7 +7989,7 @@
           <p:cNvPr id="2" name="Title 6">
             <a:extLst>
               <a:ext uri="{FF2B5EF4-FFF2-40B4-BE49-F238E27FC236}">
-                <a16:creationId xmlns:a16="http://schemas.microsoft.com/office/drawing/2014/main" xmlns="" id="{04F78A0C-BF40-4E0B-9FA4-AAAA57E3C4EF}"/>
+                <a16:creationId xmlns="" xmlns:a16="http://schemas.microsoft.com/office/drawing/2014/main" id="{04F78A0C-BF40-4E0B-9FA4-AAAA57E3C4EF}"/>
               </a:ext>
             </a:extLst>
           </p:cNvPr>
@@ -7736,8 +8009,12 @@
           <a:p>
             <a:pPr lvl="0" algn="ctr"/>
             <a:r>
+              <a:rPr lang="de-DE" sz="6600" dirty="0" smtClean="0"/>
+              <a:t>16 </a:t>
+            </a:r>
+            <a:r>
               <a:rPr lang="de-DE" sz="6600" dirty="0"/>
-              <a:t>17 % </a:t>
+              <a:t>% </a:t>
             </a:r>
             <a:endParaRPr lang="en-GB" sz="2800" dirty="0"/>
           </a:p>
@@ -7748,7 +8025,7 @@
           <p:cNvPr id="3" name="Content Placeholder 7">
             <a:extLst>
               <a:ext uri="{FF2B5EF4-FFF2-40B4-BE49-F238E27FC236}">
-                <a16:creationId xmlns:a16="http://schemas.microsoft.com/office/drawing/2014/main" xmlns="" id="{3A52400E-A01D-4CCF-8280-EBE32B011F8E}"/>
+                <a16:creationId xmlns="" xmlns:a16="http://schemas.microsoft.com/office/drawing/2014/main" id="{3A52400E-A01D-4CCF-8280-EBE32B011F8E}"/>
               </a:ext>
             </a:extLst>
           </p:cNvPr>
@@ -7913,6 +8190,13 @@
   <p:transition spd="slow">
     <p:push dir="u"/>
   </p:transition>
+  <p:timing>
+    <p:tnLst>
+      <p:par>
+        <p:cTn id="1" dur="indefinite" restart="never" nodeType="tmRoot"/>
+      </p:par>
+    </p:tnLst>
+  </p:timing>
 </p:sld>
 </file>
 
@@ -7969,7 +8253,7 @@
           <p:cNvPr id="3" name="Content Placeholder 2">
             <a:extLst>
               <a:ext uri="{FF2B5EF4-FFF2-40B4-BE49-F238E27FC236}">
-                <a16:creationId xmlns:a16="http://schemas.microsoft.com/office/drawing/2014/main" xmlns="" id="{5D4B6457-3E37-4879-A8CB-262CE10EA13A}"/>
+                <a16:creationId xmlns="" xmlns:a16="http://schemas.microsoft.com/office/drawing/2014/main" id="{5D4B6457-3E37-4879-A8CB-262CE10EA13A}"/>
               </a:ext>
             </a:extLst>
           </p:cNvPr>
@@ -8122,6 +8406,13 @@
   <p:transition spd="slow">
     <p:push dir="u"/>
   </p:transition>
+  <p:timing>
+    <p:tnLst>
+      <p:par>
+        <p:cTn id="1" dur="indefinite" restart="never" nodeType="tmRoot"/>
+      </p:par>
+    </p:tnLst>
+  </p:timing>
 </p:sld>
 </file>
 
@@ -8202,6 +8493,13 @@
   <p:transition spd="slow">
     <p:push dir="u"/>
   </p:transition>
+  <p:timing>
+    <p:tnLst>
+      <p:par>
+        <p:cTn id="1" dur="indefinite" restart="never" nodeType="tmRoot"/>
+      </p:par>
+    </p:tnLst>
+  </p:timing>
 </p:sld>
 </file>
 
@@ -8227,7 +8525,7 @@
           <p:cNvPr id="2" name="Title 6">
             <a:extLst>
               <a:ext uri="{FF2B5EF4-FFF2-40B4-BE49-F238E27FC236}">
-                <a16:creationId xmlns:a16="http://schemas.microsoft.com/office/drawing/2014/main" xmlns="" id="{04F78A0C-BF40-4E0B-9FA4-AAAA57E3C4EF}"/>
+                <a16:creationId xmlns="" xmlns:a16="http://schemas.microsoft.com/office/drawing/2014/main" id="{04F78A0C-BF40-4E0B-9FA4-AAAA57E3C4EF}"/>
               </a:ext>
             </a:extLst>
           </p:cNvPr>
@@ -8257,7 +8555,7 @@
           <p:cNvPr id="3" name="Content Placeholder 7">
             <a:extLst>
               <a:ext uri="{FF2B5EF4-FFF2-40B4-BE49-F238E27FC236}">
-                <a16:creationId xmlns:a16="http://schemas.microsoft.com/office/drawing/2014/main" xmlns="" id="{3A52400E-A01D-4CCF-8280-EBE32B011F8E}"/>
+                <a16:creationId xmlns="" xmlns:a16="http://schemas.microsoft.com/office/drawing/2014/main" id="{3A52400E-A01D-4CCF-8280-EBE32B011F8E}"/>
               </a:ext>
             </a:extLst>
           </p:cNvPr>
@@ -8336,6 +8634,13 @@
   <p:transition spd="slow">
     <p:push dir="u"/>
   </p:transition>
+  <p:timing>
+    <p:tnLst>
+      <p:par>
+        <p:cTn id="1" dur="indefinite" restart="never" nodeType="tmRoot"/>
+      </p:par>
+    </p:tnLst>
+  </p:timing>
 </p:sld>
 </file>
 
@@ -8361,7 +8666,7 @@
           <p:cNvPr id="2" name="Title 1">
             <a:extLst>
               <a:ext uri="{FF2B5EF4-FFF2-40B4-BE49-F238E27FC236}">
-                <a16:creationId xmlns:a16="http://schemas.microsoft.com/office/drawing/2014/main" xmlns="" id="{6A957F68-909E-49D3-98A5-0D417ABCFAB9}"/>
+                <a16:creationId xmlns="" xmlns:a16="http://schemas.microsoft.com/office/drawing/2014/main" id="{6A957F68-909E-49D3-98A5-0D417ABCFAB9}"/>
               </a:ext>
             </a:extLst>
           </p:cNvPr>
@@ -8393,7 +8698,7 @@
           <p:cNvPr id="3" name="Content Placeholder 2">
             <a:extLst>
               <a:ext uri="{FF2B5EF4-FFF2-40B4-BE49-F238E27FC236}">
-                <a16:creationId xmlns:a16="http://schemas.microsoft.com/office/drawing/2014/main" xmlns="" id="{D998EE4F-50DE-4482-A66D-E9A06C7DFD16}"/>
+                <a16:creationId xmlns="" xmlns:a16="http://schemas.microsoft.com/office/drawing/2014/main" id="{D998EE4F-50DE-4482-A66D-E9A06C7DFD16}"/>
               </a:ext>
             </a:extLst>
           </p:cNvPr>
@@ -8488,7 +8793,7 @@
           <p:cNvPr id="4" name="Content Placeholder 5">
             <a:extLst>
               <a:ext uri="{FF2B5EF4-FFF2-40B4-BE49-F238E27FC236}">
-                <a16:creationId xmlns:a16="http://schemas.microsoft.com/office/drawing/2014/main" xmlns="" id="{0CADCC4B-41EB-442D-8677-2E3D32E5998C}"/>
+                <a16:creationId xmlns="" xmlns:a16="http://schemas.microsoft.com/office/drawing/2014/main" id="{0CADCC4B-41EB-442D-8677-2E3D32E5998C}"/>
               </a:ext>
             </a:extLst>
           </p:cNvPr>
@@ -8525,6 +8830,13 @@
   <p:transition spd="slow">
     <p:push dir="u"/>
   </p:transition>
+  <p:timing>
+    <p:tnLst>
+      <p:par>
+        <p:cTn id="1" dur="indefinite" restart="never" nodeType="tmRoot"/>
+      </p:par>
+    </p:tnLst>
+  </p:timing>
 </p:sld>
 </file>
 
@@ -8550,7 +8862,7 @@
           <p:cNvPr id="2" name="Title 1">
             <a:extLst>
               <a:ext uri="{FF2B5EF4-FFF2-40B4-BE49-F238E27FC236}">
-                <a16:creationId xmlns:a16="http://schemas.microsoft.com/office/drawing/2014/main" xmlns="" id="{84CA9567-EE70-447E-95ED-B75B1E5769FC}"/>
+                <a16:creationId xmlns="" xmlns:a16="http://schemas.microsoft.com/office/drawing/2014/main" id="{84CA9567-EE70-447E-95ED-B75B1E5769FC}"/>
               </a:ext>
             </a:extLst>
           </p:cNvPr>
@@ -8582,7 +8894,7 @@
           <p:cNvPr id="3" name="Content Placeholder 2">
             <a:extLst>
               <a:ext uri="{FF2B5EF4-FFF2-40B4-BE49-F238E27FC236}">
-                <a16:creationId xmlns:a16="http://schemas.microsoft.com/office/drawing/2014/main" xmlns="" id="{492DD7BD-063F-4E3D-8E9A-3AB783D556D8}"/>
+                <a16:creationId xmlns="" xmlns:a16="http://schemas.microsoft.com/office/drawing/2014/main" id="{492DD7BD-063F-4E3D-8E9A-3AB783D556D8}"/>
               </a:ext>
             </a:extLst>
           </p:cNvPr>
@@ -8723,6 +9035,13 @@
   <p:transition spd="slow">
     <p:push dir="u"/>
   </p:transition>
+  <p:timing>
+    <p:tnLst>
+      <p:par>
+        <p:cTn id="1" dur="indefinite" restart="never" nodeType="tmRoot"/>
+      </p:par>
+    </p:tnLst>
+  </p:timing>
 </p:sld>
 </file>
 
@@ -8748,7 +9067,7 @@
           <p:cNvPr id="2" name="Title 1">
             <a:extLst>
               <a:ext uri="{FF2B5EF4-FFF2-40B4-BE49-F238E27FC236}">
-                <a16:creationId xmlns:a16="http://schemas.microsoft.com/office/drawing/2014/main" xmlns="" id="{125D1A1F-72A6-4F53-94B7-AA52911C148C}"/>
+                <a16:creationId xmlns="" xmlns:a16="http://schemas.microsoft.com/office/drawing/2014/main" id="{125D1A1F-72A6-4F53-94B7-AA52911C148C}"/>
               </a:ext>
             </a:extLst>
           </p:cNvPr>
@@ -8780,7 +9099,7 @@
           <p:cNvPr id="3" name="Content Placeholder 2">
             <a:extLst>
               <a:ext uri="{FF2B5EF4-FFF2-40B4-BE49-F238E27FC236}">
-                <a16:creationId xmlns:a16="http://schemas.microsoft.com/office/drawing/2014/main" xmlns="" id="{9200409B-6442-4073-882A-466AA2C1EA55}"/>
+                <a16:creationId xmlns="" xmlns:a16="http://schemas.microsoft.com/office/drawing/2014/main" id="{9200409B-6442-4073-882A-466AA2C1EA55}"/>
               </a:ext>
             </a:extLst>
           </p:cNvPr>
@@ -8857,6 +9176,13 @@
   <p:transition spd="slow">
     <p:push dir="u"/>
   </p:transition>
+  <p:timing>
+    <p:tnLst>
+      <p:par>
+        <p:cTn id="1" dur="indefinite" restart="never" nodeType="tmRoot"/>
+      </p:par>
+    </p:tnLst>
+  </p:timing>
 </p:sld>
 </file>
 
@@ -8882,7 +9208,7 @@
           <p:cNvPr id="2" name="Title 6">
             <a:extLst>
               <a:ext uri="{FF2B5EF4-FFF2-40B4-BE49-F238E27FC236}">
-                <a16:creationId xmlns:a16="http://schemas.microsoft.com/office/drawing/2014/main" xmlns="" id="{04F78A0C-BF40-4E0B-9FA4-AAAA57E3C4EF}"/>
+                <a16:creationId xmlns="" xmlns:a16="http://schemas.microsoft.com/office/drawing/2014/main" id="{04F78A0C-BF40-4E0B-9FA4-AAAA57E3C4EF}"/>
               </a:ext>
             </a:extLst>
           </p:cNvPr>
@@ -8914,7 +9240,7 @@
           <p:cNvPr id="3" name="Content Placeholder 7">
             <a:extLst>
               <a:ext uri="{FF2B5EF4-FFF2-40B4-BE49-F238E27FC236}">
-                <a16:creationId xmlns:a16="http://schemas.microsoft.com/office/drawing/2014/main" xmlns="" id="{3A52400E-A01D-4CCF-8280-EBE32B011F8E}"/>
+                <a16:creationId xmlns="" xmlns:a16="http://schemas.microsoft.com/office/drawing/2014/main" id="{3A52400E-A01D-4CCF-8280-EBE32B011F8E}"/>
               </a:ext>
             </a:extLst>
           </p:cNvPr>
@@ -9087,6 +9413,13 @@
   <p:transition spd="slow">
     <p:push dir="u"/>
   </p:transition>
+  <p:timing>
+    <p:tnLst>
+      <p:par>
+        <p:cTn id="1" dur="indefinite" restart="never" nodeType="tmRoot"/>
+      </p:par>
+    </p:tnLst>
+  </p:timing>
 </p:sld>
 </file>
 
@@ -9112,7 +9445,7 @@
           <p:cNvPr id="2" name="Title 6">
             <a:extLst>
               <a:ext uri="{FF2B5EF4-FFF2-40B4-BE49-F238E27FC236}">
-                <a16:creationId xmlns:a16="http://schemas.microsoft.com/office/drawing/2014/main" xmlns="" id="{04F78A0C-BF40-4E0B-9FA4-AAAA57E3C4EF}"/>
+                <a16:creationId xmlns="" xmlns:a16="http://schemas.microsoft.com/office/drawing/2014/main" id="{04F78A0C-BF40-4E0B-9FA4-AAAA57E3C4EF}"/>
               </a:ext>
             </a:extLst>
           </p:cNvPr>
@@ -9152,6 +9485,13 @@
   <p:transition spd="slow">
     <p:push dir="u"/>
   </p:transition>
+  <p:timing>
+    <p:tnLst>
+      <p:par>
+        <p:cTn id="1" dur="indefinite" restart="never" nodeType="tmRoot"/>
+      </p:par>
+    </p:tnLst>
+  </p:timing>
 </p:sld>
 </file>
 
@@ -9177,7 +9517,7 @@
           <p:cNvPr id="2" name="Title 6">
             <a:extLst>
               <a:ext uri="{FF2B5EF4-FFF2-40B4-BE49-F238E27FC236}">
-                <a16:creationId xmlns:a16="http://schemas.microsoft.com/office/drawing/2014/main" xmlns="" id="{04F78A0C-BF40-4E0B-9FA4-AAAA57E3C4EF}"/>
+                <a16:creationId xmlns="" xmlns:a16="http://schemas.microsoft.com/office/drawing/2014/main" id="{04F78A0C-BF40-4E0B-9FA4-AAAA57E3C4EF}"/>
               </a:ext>
             </a:extLst>
           </p:cNvPr>
@@ -9209,7 +9549,7 @@
           <p:cNvPr id="3" name="Content Placeholder 7">
             <a:extLst>
               <a:ext uri="{FF2B5EF4-FFF2-40B4-BE49-F238E27FC236}">
-                <a16:creationId xmlns:a16="http://schemas.microsoft.com/office/drawing/2014/main" xmlns="" id="{3A52400E-A01D-4CCF-8280-EBE32B011F8E}"/>
+                <a16:creationId xmlns="" xmlns:a16="http://schemas.microsoft.com/office/drawing/2014/main" id="{3A52400E-A01D-4CCF-8280-EBE32B011F8E}"/>
               </a:ext>
             </a:extLst>
           </p:cNvPr>
@@ -9396,6 +9736,13 @@
   <p:transition spd="slow">
     <p:push dir="u"/>
   </p:transition>
+  <p:timing>
+    <p:tnLst>
+      <p:par>
+        <p:cTn id="1" dur="indefinite" restart="never" nodeType="tmRoot"/>
+      </p:par>
+    </p:tnLst>
+  </p:timing>
 </p:sld>
 </file>
 
@@ -9421,7 +9768,7 @@
           <p:cNvPr id="2" name="Title 6">
             <a:extLst>
               <a:ext uri="{FF2B5EF4-FFF2-40B4-BE49-F238E27FC236}">
-                <a16:creationId xmlns:a16="http://schemas.microsoft.com/office/drawing/2014/main" xmlns="" id="{04F78A0C-BF40-4E0B-9FA4-AAAA57E3C4EF}"/>
+                <a16:creationId xmlns="" xmlns:a16="http://schemas.microsoft.com/office/drawing/2014/main" id="{04F78A0C-BF40-4E0B-9FA4-AAAA57E3C4EF}"/>
               </a:ext>
             </a:extLst>
           </p:cNvPr>
@@ -9489,7 +9836,7 @@
           <p:cNvPr id="3" name="Content Placeholder 7">
             <a:extLst>
               <a:ext uri="{FF2B5EF4-FFF2-40B4-BE49-F238E27FC236}">
-                <a16:creationId xmlns:a16="http://schemas.microsoft.com/office/drawing/2014/main" xmlns="" id="{3A52400E-A01D-4CCF-8280-EBE32B011F8E}"/>
+                <a16:creationId xmlns="" xmlns:a16="http://schemas.microsoft.com/office/drawing/2014/main" id="{3A52400E-A01D-4CCF-8280-EBE32B011F8E}"/>
               </a:ext>
             </a:extLst>
           </p:cNvPr>
@@ -9572,6 +9919,13 @@
   <p:transition spd="slow">
     <p:push dir="u"/>
   </p:transition>
+  <p:timing>
+    <p:tnLst>
+      <p:par>
+        <p:cTn id="1" dur="indefinite" restart="never" nodeType="tmRoot"/>
+      </p:par>
+    </p:tnLst>
+  </p:timing>
 </p:sld>
 </file>
 
@@ -9597,7 +9951,7 @@
           <p:cNvPr id="2" name="Title 6">
             <a:extLst>
               <a:ext uri="{FF2B5EF4-FFF2-40B4-BE49-F238E27FC236}">
-                <a16:creationId xmlns:a16="http://schemas.microsoft.com/office/drawing/2014/main" xmlns="" id="{04F78A0C-BF40-4E0B-9FA4-AAAA57E3C4EF}"/>
+                <a16:creationId xmlns="" xmlns:a16="http://schemas.microsoft.com/office/drawing/2014/main" id="{04F78A0C-BF40-4E0B-9FA4-AAAA57E3C4EF}"/>
               </a:ext>
             </a:extLst>
           </p:cNvPr>
@@ -9615,16 +9969,12 @@
           </a:bodyPr>
           <a:lstStyle/>
           <a:p>
-            <a:pPr lvl="0"/>
-            <a:r>
-              <a:rPr lang="de-DE" sz="4800" dirty="0"/>
-              <a:t>Gauß Dichte-</a:t>
-            </a:r>
-            <a:r>
-              <a:rPr lang="de-DE" sz="4800" dirty="0" err="1"/>
-              <a:t>berechung</a:t>
-            </a:r>
-            <a:endParaRPr lang="en-GB" sz="1800" dirty="0"/>
+            <a:pPr lvl="0" algn="ctr"/>
+            <a:r>
+              <a:rPr lang="de-DE" sz="6600" dirty="0"/>
+              <a:t>17 %</a:t>
+            </a:r>
+            <a:endParaRPr lang="en-GB" sz="2800" dirty="0"/>
           </a:p>
         </p:txBody>
       </p:sp>
@@ -9633,7 +9983,7 @@
           <p:cNvPr id="3" name="Content Placeholder 7">
             <a:extLst>
               <a:ext uri="{FF2B5EF4-FFF2-40B4-BE49-F238E27FC236}">
-                <a16:creationId xmlns:a16="http://schemas.microsoft.com/office/drawing/2014/main" xmlns="" id="{3A52400E-A01D-4CCF-8280-EBE32B011F8E}"/>
+                <a16:creationId xmlns="" xmlns:a16="http://schemas.microsoft.com/office/drawing/2014/main" id="{3A52400E-A01D-4CCF-8280-EBE32B011F8E}"/>
               </a:ext>
             </a:extLst>
           </p:cNvPr>
@@ -9657,18 +10007,138 @@
               </a:lnSpc>
               <a:buNone/>
             </a:pPr>
-            <a:endParaRPr lang="de-DE" dirty="0">
-              <a:solidFill>
-                <a:srgbClr val="00B0F0"/>
-              </a:solidFill>
-            </a:endParaRPr>
+            <a:r>
+              <a:rPr lang="de-DE" sz="2800" dirty="0">
+                <a:solidFill>
+                  <a:schemeClr val="tx1"/>
+                </a:solidFill>
+              </a:rPr>
+              <a:t>Selbsteinschätzung:</a:t>
+            </a:r>
+          </a:p>
+          <a:p>
+            <a:pPr lvl="0"/>
+            <a:r>
+              <a:rPr lang="de-DE" b="1" dirty="0">
+                <a:solidFill>
+                  <a:schemeClr val="tx1"/>
+                </a:solidFill>
+              </a:rPr>
+              <a:t>Einarbeitung in die Simulationssoftware Vadere 6%</a:t>
+            </a:r>
+          </a:p>
+          <a:p>
+            <a:pPr lvl="0"/>
+            <a:r>
+              <a:rPr lang="de-DE" dirty="0">
+                <a:solidFill>
+                  <a:schemeClr val="tx1"/>
+                </a:solidFill>
+              </a:rPr>
+              <a:t>Generierung der Test Szenarios 10%</a:t>
+            </a:r>
+          </a:p>
+          <a:p>
+            <a:pPr lvl="0"/>
+            <a:r>
+              <a:rPr lang="de-DE" dirty="0">
+                <a:solidFill>
+                  <a:schemeClr val="tx1"/>
+                </a:solidFill>
+              </a:rPr>
+              <a:t>Automatisierung von Simulationsdurchläufen 25%</a:t>
+            </a:r>
+          </a:p>
+          <a:p>
+            <a:pPr lvl="0"/>
+            <a:r>
+              <a:rPr lang="de-DE" dirty="0">
+                <a:solidFill>
+                  <a:schemeClr val="tx1"/>
+                </a:solidFill>
+              </a:rPr>
+              <a:t>Erstellen eines Datenformats für Trajektorien 20%</a:t>
+            </a:r>
+          </a:p>
+          <a:p>
+            <a:pPr lvl="0"/>
+            <a:r>
+              <a:rPr lang="de-DE" dirty="0">
+                <a:solidFill>
+                  <a:schemeClr val="tx1"/>
+                </a:solidFill>
+              </a:rPr>
+              <a:t>Literatur Recherche Bildfilter 4%</a:t>
+            </a:r>
+          </a:p>
+          <a:p>
+            <a:pPr lvl="0"/>
+            <a:r>
+              <a:rPr lang="de-DE" b="1" dirty="0">
+                <a:solidFill>
+                  <a:schemeClr val="tx1"/>
+                </a:solidFill>
+              </a:rPr>
+              <a:t>Datenformat für die Personendichte 30%</a:t>
+            </a:r>
+          </a:p>
+          <a:p>
+            <a:pPr lvl="1"/>
+            <a:r>
+              <a:rPr lang="de-DE" b="1" dirty="0">
+                <a:solidFill>
+                  <a:schemeClr val="tx1"/>
+                </a:solidFill>
+              </a:rPr>
+              <a:t>Variante 1: Auslesung der Personendichte aus Vadere</a:t>
+            </a:r>
+          </a:p>
+          <a:p>
+            <a:pPr lvl="1"/>
+            <a:r>
+              <a:rPr lang="de-DE" b="1" dirty="0">
+                <a:solidFill>
+                  <a:schemeClr val="tx1"/>
+                </a:solidFill>
+              </a:rPr>
+              <a:t>Variante 2: Berechnung der Persoendichte aus Trajektorien</a:t>
+            </a:r>
+          </a:p>
+          <a:p>
+            <a:pPr lvl="1"/>
+            <a:r>
+              <a:rPr lang="de-DE" b="1" dirty="0">
+                <a:solidFill>
+                  <a:schemeClr val="tx1"/>
+                </a:solidFill>
+              </a:rPr>
+              <a:t>Testen der Ergebnisse</a:t>
+            </a:r>
+          </a:p>
+          <a:p>
+            <a:r>
+              <a:rPr lang="de-DE" dirty="0" err="1">
+                <a:solidFill>
+                  <a:schemeClr val="tx1"/>
+                </a:solidFill>
+              </a:rPr>
+              <a:t>Scrum</a:t>
+            </a:r>
+            <a:r>
+              <a:rPr lang="de-DE" dirty="0">
+                <a:solidFill>
+                  <a:schemeClr val="tx1"/>
+                </a:solidFill>
+              </a:rPr>
+              <a:t> Master 5%</a:t>
+            </a:r>
           </a:p>
         </p:txBody>
       </p:sp>
     </p:spTree>
     <p:extLst>
       <p:ext uri="{BB962C8B-B14F-4D97-AF65-F5344CB8AC3E}">
-        <p14:creationId xmlns:p14="http://schemas.microsoft.com/office/powerpoint/2010/main" val="1378842414"/>
+        <p14:creationId xmlns:p14="http://schemas.microsoft.com/office/powerpoint/2010/main" val="2341506299"/>
       </p:ext>
     </p:extLst>
   </p:cSld>
@@ -9678,6 +10148,13 @@
   <p:transition spd="slow">
     <p:push dir="u"/>
   </p:transition>
+  <p:timing>
+    <p:tnLst>
+      <p:par>
+        <p:cTn id="1" dur="indefinite" restart="never" nodeType="tmRoot"/>
+      </p:par>
+    </p:tnLst>
+  </p:timing>
 </p:sld>
 </file>
 
@@ -9734,7 +10211,7 @@
           <p:cNvPr id="9" name="Content Placeholder 8">
             <a:extLst>
               <a:ext uri="{FF2B5EF4-FFF2-40B4-BE49-F238E27FC236}">
-                <a16:creationId xmlns:a16="http://schemas.microsoft.com/office/drawing/2014/main" xmlns="" id="{08DF57E2-668B-4E5A-AEBF-D8CEC596E7D4}"/>
+                <a16:creationId xmlns="" xmlns:a16="http://schemas.microsoft.com/office/drawing/2014/main" id="{08DF57E2-668B-4E5A-AEBF-D8CEC596E7D4}"/>
               </a:ext>
             </a:extLst>
           </p:cNvPr>
@@ -9964,6 +10441,13 @@
   <p:transition spd="slow">
     <p:push dir="u"/>
   </p:transition>
+  <p:timing>
+    <p:tnLst>
+      <p:par>
+        <p:cTn id="1" dur="indefinite" restart="never" nodeType="tmRoot"/>
+      </p:par>
+    </p:tnLst>
+  </p:timing>
 </p:sld>
 </file>
 
@@ -9989,7 +10473,7 @@
           <p:cNvPr id="2" name="Title 6">
             <a:extLst>
               <a:ext uri="{FF2B5EF4-FFF2-40B4-BE49-F238E27FC236}">
-                <a16:creationId xmlns:a16="http://schemas.microsoft.com/office/drawing/2014/main" xmlns="" id="{04F78A0C-BF40-4E0B-9FA4-AAAA57E3C4EF}"/>
+                <a16:creationId xmlns="" xmlns:a16="http://schemas.microsoft.com/office/drawing/2014/main" id="{04F78A0C-BF40-4E0B-9FA4-AAAA57E3C4EF}"/>
               </a:ext>
             </a:extLst>
           </p:cNvPr>
@@ -9997,7 +10481,7 @@
             <a:spLocks noGrp="1"/>
           </p:cNvSpPr>
           <p:nvPr>
-            <p:ph type="title"/>
+            <p:ph type="ctrTitle"/>
           </p:nvPr>
         </p:nvSpPr>
         <p:spPr/>
@@ -10007,176 +10491,19 @@
           </a:bodyPr>
           <a:lstStyle/>
           <a:p>
-            <a:pPr lvl="0" algn="ctr"/>
+            <a:pPr lvl="0"/>
             <a:r>
               <a:rPr lang="de-DE" sz="6600" dirty="0"/>
-              <a:t>17 %</a:t>
+              <a:t>Lisa</a:t>
             </a:r>
             <a:endParaRPr lang="en-GB" sz="2800" dirty="0"/>
-          </a:p>
-        </p:txBody>
-      </p:sp>
-      <p:sp>
-        <p:nvSpPr>
-          <p:cNvPr id="3" name="Content Placeholder 7">
-            <a:extLst>
-              <a:ext uri="{FF2B5EF4-FFF2-40B4-BE49-F238E27FC236}">
-                <a16:creationId xmlns:a16="http://schemas.microsoft.com/office/drawing/2014/main" xmlns="" id="{3A52400E-A01D-4CCF-8280-EBE32B011F8E}"/>
-              </a:ext>
-            </a:extLst>
-          </p:cNvPr>
-          <p:cNvSpPr txBox="1">
-            <a:spLocks noGrp="1"/>
-          </p:cNvSpPr>
-          <p:nvPr>
-            <p:ph idx="1"/>
-          </p:nvPr>
-        </p:nvSpPr>
-        <p:spPr/>
-        <p:txBody>
-          <a:bodyPr>
-            <a:normAutofit/>
-          </a:bodyPr>
-          <a:lstStyle/>
-          <a:p>
-            <a:pPr marL="0" lvl="0" indent="0">
-              <a:lnSpc>
-                <a:spcPct val="200000"/>
-              </a:lnSpc>
-              <a:buNone/>
-            </a:pPr>
-            <a:r>
-              <a:rPr lang="de-DE" sz="2800" dirty="0">
-                <a:solidFill>
-                  <a:schemeClr val="tx1"/>
-                </a:solidFill>
-              </a:rPr>
-              <a:t>Selbsteinschätzung:</a:t>
-            </a:r>
-          </a:p>
-          <a:p>
-            <a:pPr lvl="0"/>
-            <a:r>
-              <a:rPr lang="de-DE" b="1" dirty="0">
-                <a:solidFill>
-                  <a:schemeClr val="tx1"/>
-                </a:solidFill>
-              </a:rPr>
-              <a:t>Einarbeitung in die Simulationssoftware Vadere 6%</a:t>
-            </a:r>
-          </a:p>
-          <a:p>
-            <a:pPr lvl="0"/>
-            <a:r>
-              <a:rPr lang="de-DE" dirty="0">
-                <a:solidFill>
-                  <a:schemeClr val="tx1"/>
-                </a:solidFill>
-              </a:rPr>
-              <a:t>Generierung der Test Szenarios 10%</a:t>
-            </a:r>
-          </a:p>
-          <a:p>
-            <a:pPr lvl="0"/>
-            <a:r>
-              <a:rPr lang="de-DE" dirty="0">
-                <a:solidFill>
-                  <a:schemeClr val="tx1"/>
-                </a:solidFill>
-              </a:rPr>
-              <a:t>Automatisierung von Simulationsdurchläufen 25%</a:t>
-            </a:r>
-          </a:p>
-          <a:p>
-            <a:pPr lvl="0"/>
-            <a:r>
-              <a:rPr lang="de-DE" dirty="0">
-                <a:solidFill>
-                  <a:schemeClr val="tx1"/>
-                </a:solidFill>
-              </a:rPr>
-              <a:t>Erstellen eines Datenformats für Trajektorien 20%</a:t>
-            </a:r>
-          </a:p>
-          <a:p>
-            <a:pPr lvl="0"/>
-            <a:r>
-              <a:rPr lang="de-DE" dirty="0">
-                <a:solidFill>
-                  <a:schemeClr val="tx1"/>
-                </a:solidFill>
-              </a:rPr>
-              <a:t>Literatur Recherche Bildfilter 4%</a:t>
-            </a:r>
-          </a:p>
-          <a:p>
-            <a:pPr lvl="0"/>
-            <a:r>
-              <a:rPr lang="de-DE" b="1" dirty="0">
-                <a:solidFill>
-                  <a:schemeClr val="tx1"/>
-                </a:solidFill>
-              </a:rPr>
-              <a:t>Datenformat für die Personendichte 30%</a:t>
-            </a:r>
-          </a:p>
-          <a:p>
-            <a:pPr lvl="1"/>
-            <a:r>
-              <a:rPr lang="de-DE" b="1" dirty="0">
-                <a:solidFill>
-                  <a:schemeClr val="tx1"/>
-                </a:solidFill>
-              </a:rPr>
-              <a:t>Variante 1: Auslesung der Personendichte aus Vadere</a:t>
-            </a:r>
-          </a:p>
-          <a:p>
-            <a:pPr lvl="1"/>
-            <a:r>
-              <a:rPr lang="de-DE" b="1" dirty="0">
-                <a:solidFill>
-                  <a:schemeClr val="tx1"/>
-                </a:solidFill>
-              </a:rPr>
-              <a:t>Variante 2: Berechnung der Persoendichte aus Trajektorien</a:t>
-            </a:r>
-          </a:p>
-          <a:p>
-            <a:pPr lvl="1"/>
-            <a:r>
-              <a:rPr lang="de-DE" b="1" dirty="0">
-                <a:solidFill>
-                  <a:schemeClr val="tx1"/>
-                </a:solidFill>
-              </a:rPr>
-              <a:t>Testen der Ergebnisse</a:t>
-            </a:r>
-          </a:p>
-          <a:p>
-            <a:r>
-              <a:rPr lang="de-DE" dirty="0" err="1">
-                <a:solidFill>
-                  <a:schemeClr val="tx1"/>
-                </a:solidFill>
-              </a:rPr>
-              <a:t>Scrum</a:t>
-            </a:r>
-            <a:r>
-              <a:rPr lang="de-DE" dirty="0">
-                <a:solidFill>
-                  <a:schemeClr val="tx1"/>
-                </a:solidFill>
-              </a:rPr>
-              <a:t> Master 5%</a:t>
-            </a:r>
           </a:p>
         </p:txBody>
       </p:sp>
     </p:spTree>
     <p:extLst>
       <p:ext uri="{BB962C8B-B14F-4D97-AF65-F5344CB8AC3E}">
-        <p14:creationId xmlns:p14="http://schemas.microsoft.com/office/powerpoint/2010/main" val="2341506299"/>
+        <p14:creationId xmlns:p14="http://schemas.microsoft.com/office/powerpoint/2010/main" val="2241856939"/>
       </p:ext>
     </p:extLst>
   </p:cSld>
@@ -10186,6 +10513,13 @@
   <p:transition spd="slow">
     <p:push dir="u"/>
   </p:transition>
+  <p:timing>
+    <p:tnLst>
+      <p:par>
+        <p:cTn id="1" dur="indefinite" restart="never" nodeType="tmRoot"/>
+      </p:par>
+    </p:tnLst>
+  </p:timing>
 </p:sld>
 </file>
 
@@ -10208,18 +10542,12 @@
       </p:grpSpPr>
       <p:sp>
         <p:nvSpPr>
-          <p:cNvPr id="2" name="Title 6">
-            <a:extLst>
-              <a:ext uri="{FF2B5EF4-FFF2-40B4-BE49-F238E27FC236}">
-                <a16:creationId xmlns:a16="http://schemas.microsoft.com/office/drawing/2014/main" xmlns="" id="{04F78A0C-BF40-4E0B-9FA4-AAAA57E3C4EF}"/>
-              </a:ext>
-            </a:extLst>
-          </p:cNvPr>
-          <p:cNvSpPr txBox="1">
-            <a:spLocks noGrp="1"/>
-          </p:cNvSpPr>
-          <p:nvPr>
-            <p:ph type="ctrTitle"/>
+          <p:cNvPr id="2" name="Titel 1"/>
+          <p:cNvSpPr>
+            <a:spLocks noGrp="1"/>
+          </p:cNvSpPr>
+          <p:nvPr>
+            <p:ph type="title"/>
           </p:nvPr>
         </p:nvSpPr>
         <p:spPr/>
@@ -10229,21 +10557,25 @@
           </a:bodyPr>
           <a:lstStyle/>
           <a:p>
-            <a:pPr lvl="0"/>
-            <a:r>
-              <a:rPr lang="de-DE" sz="6600" dirty="0"/>
-              <a:t>Lisa</a:t>
-            </a:r>
-            <a:endParaRPr lang="en-GB" sz="2800" dirty="0"/>
-          </a:p>
-        </p:txBody>
-      </p:sp>
-      <p:sp>
-        <p:nvSpPr>
-          <p:cNvPr id="4" name="Subtitle 3">
+            <a:pPr algn="l"/>
+            <a:r>
+              <a:rPr lang="de-DE" dirty="0"/>
+              <a:t>Meine Rolle während </a:t>
+            </a:r>
+            <a:r>
+              <a:rPr lang="de-DE"/>
+              <a:t>des Sprints</a:t>
+            </a:r>
+            <a:endParaRPr lang="de-DE" dirty="0"/>
+          </a:p>
+        </p:txBody>
+      </p:sp>
+      <p:sp>
+        <p:nvSpPr>
+          <p:cNvPr id="3" name="Content Placeholder 2">
             <a:extLst>
               <a:ext uri="{FF2B5EF4-FFF2-40B4-BE49-F238E27FC236}">
-                <a16:creationId xmlns:a16="http://schemas.microsoft.com/office/drawing/2014/main" xmlns="" id="{944F6B10-491F-4152-9337-40A35086FCEA}"/>
+                <a16:creationId xmlns="" xmlns:a16="http://schemas.microsoft.com/office/drawing/2014/main" id="{F7349B0D-CF00-4A1B-8AF6-99D24FD1B835}"/>
               </a:ext>
             </a:extLst>
           </p:cNvPr>
@@ -10251,22 +10583,115 @@
             <a:spLocks noGrp="1"/>
           </p:cNvSpPr>
           <p:nvPr>
-            <p:ph type="subTitle" idx="1"/>
+            <p:ph idx="1"/>
           </p:nvPr>
         </p:nvSpPr>
         <p:spPr/>
         <p:txBody>
-          <a:bodyPr/>
-          <a:lstStyle/>
-          <a:p>
-            <a:endParaRPr lang="en-GB"/>
+          <a:bodyPr>
+            <a:normAutofit/>
+          </a:bodyPr>
+          <a:lstStyle/>
+          <a:p>
+            <a:r>
+              <a:rPr lang="de-DE" dirty="0" err="1">
+                <a:solidFill>
+                  <a:schemeClr val="tx1"/>
+                </a:solidFill>
+              </a:rPr>
+              <a:t>Scrum</a:t>
+            </a:r>
+            <a:r>
+              <a:rPr lang="de-DE" dirty="0">
+                <a:solidFill>
+                  <a:schemeClr val="tx1"/>
+                </a:solidFill>
+              </a:rPr>
+              <a:t> Master</a:t>
+            </a:r>
+          </a:p>
+          <a:p>
+            <a:r>
+              <a:rPr lang="de-DE" dirty="0">
+                <a:solidFill>
+                  <a:schemeClr val="tx1"/>
+                </a:solidFill>
+              </a:rPr>
+              <a:t>Organisation der Treffen </a:t>
+            </a:r>
+          </a:p>
+          <a:p>
+            <a:r>
+              <a:rPr lang="de-DE" dirty="0">
+                <a:solidFill>
+                  <a:schemeClr val="tx1"/>
+                </a:solidFill>
+              </a:rPr>
+              <a:t>Einarbeitung in Vadere und damit verbunden erstellen einiger Test Szenarien</a:t>
+            </a:r>
+          </a:p>
+          <a:p>
+            <a:r>
+              <a:rPr lang="de-DE" dirty="0">
+                <a:solidFill>
+                  <a:schemeClr val="tx1"/>
+                </a:solidFill>
+              </a:rPr>
+              <a:t>Einarbeitung in Python</a:t>
+            </a:r>
+          </a:p>
+          <a:p>
+            <a:r>
+              <a:rPr lang="de-DE" dirty="0">
+                <a:solidFill>
+                  <a:schemeClr val="tx1"/>
+                </a:solidFill>
+              </a:rPr>
+              <a:t>Programmieren einer Software zum Erstellen der Daten für die Maschinenlerngruppen aus den Trajektorien</a:t>
+            </a:r>
+          </a:p>
+          <a:p>
+            <a:r>
+              <a:rPr lang="de-DE" dirty="0">
+                <a:solidFill>
+                  <a:schemeClr val="tx1"/>
+                </a:solidFill>
+              </a:rPr>
+              <a:t>Testen der Daten der Dichteberechnung (</a:t>
+            </a:r>
+            <a:r>
+              <a:rPr lang="de-DE" dirty="0" err="1">
+                <a:solidFill>
+                  <a:schemeClr val="tx1"/>
+                </a:solidFill>
+              </a:rPr>
+              <a:t>unit</a:t>
+            </a:r>
+            <a:r>
+              <a:rPr lang="de-DE" dirty="0">
+                <a:solidFill>
+                  <a:schemeClr val="tx1"/>
+                </a:solidFill>
+              </a:rPr>
+              <a:t> Tests / Vergleich Vadere)</a:t>
+            </a:r>
+          </a:p>
+          <a:p>
+            <a:r>
+              <a:rPr lang="de-DE" dirty="0">
+                <a:solidFill>
+                  <a:schemeClr val="tx1"/>
+                </a:solidFill>
+              </a:rPr>
+              <a:t>Automatisierung der Simulation</a:t>
+            </a:r>
           </a:p>
         </p:txBody>
       </p:sp>
     </p:spTree>
     <p:extLst>
       <p:ext uri="{BB962C8B-B14F-4D97-AF65-F5344CB8AC3E}">
-        <p14:creationId xmlns:p14="http://schemas.microsoft.com/office/powerpoint/2010/main" val="2241856939"/>
+        <p14:creationId xmlns:p14="http://schemas.microsoft.com/office/powerpoint/2010/main" val="1305712072"/>
       </p:ext>
     </p:extLst>
   </p:cSld>
@@ -10276,6 +10701,13 @@
   <p:transition spd="slow">
     <p:push dir="u"/>
   </p:transition>
+  <p:timing>
+    <p:tnLst>
+      <p:par>
+        <p:cTn id="1" dur="indefinite" restart="never" nodeType="tmRoot"/>
+      </p:par>
+    </p:tnLst>
+  </p:timing>
 </p:sld>
 </file>
 
@@ -10315,14 +10747,9 @@
           <a:p>
             <a:pPr algn="l"/>
             <a:r>
-              <a:rPr lang="de-DE" dirty="0"/>
-              <a:t>Meine Rolle während </a:t>
-            </a:r>
-            <a:r>
-              <a:rPr lang="de-DE"/>
-              <a:t>des Sprints</a:t>
-            </a:r>
-            <a:endParaRPr lang="de-DE" dirty="0"/>
+              <a:rPr lang="de-DE" sz="3200" dirty="0"/>
+              <a:t>Meine Schwierigkeiten</a:t>
+            </a:r>
           </a:p>
         </p:txBody>
       </p:sp>
@@ -10331,7 +10758,7 @@
           <p:cNvPr id="3" name="Content Placeholder 2">
             <a:extLst>
               <a:ext uri="{FF2B5EF4-FFF2-40B4-BE49-F238E27FC236}">
-                <a16:creationId xmlns:a16="http://schemas.microsoft.com/office/drawing/2014/main" xmlns="" id="{F7349B0D-CF00-4A1B-8AF6-99D24FD1B835}"/>
+                <a16:creationId xmlns="" xmlns:a16="http://schemas.microsoft.com/office/drawing/2014/main" id="{7F058883-6F2A-40BA-866C-965B491E500F}"/>
               </a:ext>
             </a:extLst>
           </p:cNvPr>
@@ -10344,110 +10771,79 @@
         </p:nvSpPr>
         <p:spPr/>
         <p:txBody>
-          <a:bodyPr>
-            <a:normAutofit/>
-          </a:bodyPr>
-          <a:lstStyle/>
-          <a:p>
+          <a:bodyPr/>
+          <a:lstStyle/>
+          <a:p>
+            <a:r>
+              <a:rPr lang="de-DE" dirty="0">
+                <a:solidFill>
+                  <a:schemeClr val="tx1"/>
+                </a:solidFill>
+              </a:rPr>
+              <a:t>Vadere: Probleme </a:t>
+            </a:r>
+            <a:r>
+              <a:rPr lang="de-DE" dirty="0" smtClean="0">
+                <a:solidFill>
+                  <a:schemeClr val="tx1"/>
+                </a:solidFill>
+              </a:rPr>
+              <a:t>bei </a:t>
+            </a:r>
+            <a:r>
+              <a:rPr lang="de-DE" dirty="0">
+                <a:solidFill>
+                  <a:schemeClr val="tx1"/>
+                </a:solidFill>
+              </a:rPr>
+              <a:t>der </a:t>
+            </a:r>
+            <a:r>
+              <a:rPr lang="de-DE" dirty="0" smtClean="0">
+                <a:solidFill>
+                  <a:schemeClr val="tx1"/>
+                </a:solidFill>
+              </a:rPr>
+              <a:t>Simulation</a:t>
+            </a:r>
+          </a:p>
+          <a:p>
+            <a:r>
+              <a:rPr lang="de-DE" dirty="0" smtClean="0">
+                <a:solidFill>
+                  <a:schemeClr val="tx1"/>
+                </a:solidFill>
+              </a:rPr>
+              <a:t>Automatisierung</a:t>
+            </a:r>
+            <a:r>
+              <a:rPr lang="de-DE" dirty="0">
+                <a:solidFill>
+                  <a:schemeClr val="tx1"/>
+                </a:solidFill>
+              </a:rPr>
+              <a:t>: Starten der Simulation von außerhalb </a:t>
+            </a:r>
             <a:r>
               <a:rPr lang="de-DE" dirty="0" err="1">
                 <a:solidFill>
                   <a:schemeClr val="tx1"/>
                 </a:solidFill>
               </a:rPr>
-              <a:t>Scrum</a:t>
-            </a:r>
-            <a:r>
-              <a:rPr lang="de-DE" dirty="0">
-                <a:solidFill>
-                  <a:schemeClr val="tx1"/>
-                </a:solidFill>
-              </a:rPr>
-              <a:t> Master</a:t>
-            </a:r>
-          </a:p>
-          <a:p>
-            <a:r>
-              <a:rPr lang="de-DE" dirty="0">
-                <a:solidFill>
-                  <a:schemeClr val="tx1"/>
-                </a:solidFill>
-              </a:rPr>
-              <a:t>Organisation der Treffen </a:t>
-            </a:r>
-          </a:p>
-          <a:p>
-            <a:r>
-              <a:rPr lang="de-DE" dirty="0">
-                <a:solidFill>
-                  <a:schemeClr val="tx1"/>
-                </a:solidFill>
-              </a:rPr>
-              <a:t>Einarbeitung in Vadere und damit verbunden erstellen einiger Test Szenarien</a:t>
-            </a:r>
-          </a:p>
-          <a:p>
-            <a:r>
-              <a:rPr lang="de-DE" dirty="0">
-                <a:solidFill>
-                  <a:schemeClr val="tx1"/>
-                </a:solidFill>
-              </a:rPr>
-              <a:t>Einarbeitung in Python</a:t>
-            </a:r>
-          </a:p>
-          <a:p>
-            <a:r>
-              <a:rPr lang="de-DE" dirty="0">
-                <a:solidFill>
-                  <a:schemeClr val="tx1"/>
-                </a:solidFill>
-              </a:rPr>
-              <a:t>Programmieren einer Software zum Erstellen der Daten für die Maschinenlerngruppen aus den Trajektorien</a:t>
-            </a:r>
-          </a:p>
-          <a:p>
-            <a:r>
-              <a:rPr lang="de-DE" dirty="0">
-                <a:solidFill>
-                  <a:schemeClr val="tx1"/>
-                </a:solidFill>
-              </a:rPr>
-              <a:t>Testen der Daten der Dichteberechnung (</a:t>
-            </a:r>
-            <a:r>
-              <a:rPr lang="de-DE" dirty="0" err="1">
-                <a:solidFill>
-                  <a:schemeClr val="tx1"/>
-                </a:solidFill>
-              </a:rPr>
-              <a:t>unit</a:t>
-            </a:r>
-            <a:r>
-              <a:rPr lang="de-DE" dirty="0">
-                <a:solidFill>
-                  <a:schemeClr val="tx1"/>
-                </a:solidFill>
-              </a:rPr>
-              <a:t> Tests / Vergleich Vadere)</a:t>
-            </a:r>
-          </a:p>
-          <a:p>
-            <a:r>
-              <a:rPr lang="de-DE" dirty="0">
-                <a:solidFill>
-                  <a:schemeClr val="tx1"/>
-                </a:solidFill>
-              </a:rPr>
-              <a:t>Automatisierung der Simulation</a:t>
-            </a:r>
+              <a:t>Vaderes</a:t>
+            </a:r>
+            <a:endParaRPr lang="de-DE" dirty="0">
+              <a:solidFill>
+                <a:schemeClr val="tx1"/>
+              </a:solidFill>
+            </a:endParaRPr>
           </a:p>
         </p:txBody>
       </p:sp>
     </p:spTree>
     <p:extLst>
       <p:ext uri="{BB962C8B-B14F-4D97-AF65-F5344CB8AC3E}">
-        <p14:creationId xmlns:p14="http://schemas.microsoft.com/office/powerpoint/2010/main" val="1305712072"/>
+        <p14:creationId xmlns:p14="http://schemas.microsoft.com/office/powerpoint/2010/main" val="2417586414"/>
       </p:ext>
     </p:extLst>
   </p:cSld>
@@ -10457,6 +10853,13 @@
   <p:transition spd="slow">
     <p:push dir="u"/>
   </p:transition>
+  <p:timing>
+    <p:tnLst>
+      <p:par>
+        <p:cTn id="1" dur="indefinite" restart="never" nodeType="tmRoot"/>
+      </p:par>
+    </p:tnLst>
+  </p:timing>
 </p:sld>
 </file>
 
@@ -10479,139 +10882,10 @@
       </p:grpSpPr>
       <p:sp>
         <p:nvSpPr>
-          <p:cNvPr id="2" name="Titel 1"/>
-          <p:cNvSpPr>
-            <a:spLocks noGrp="1"/>
-          </p:cNvSpPr>
-          <p:nvPr>
-            <p:ph type="title"/>
-          </p:nvPr>
-        </p:nvSpPr>
-        <p:spPr/>
-        <p:txBody>
-          <a:bodyPr>
-            <a:normAutofit/>
-          </a:bodyPr>
-          <a:lstStyle/>
-          <a:p>
-            <a:pPr algn="l"/>
-            <a:r>
-              <a:rPr lang="de-DE" sz="3200" dirty="0"/>
-              <a:t>Meine Schwierigkeiten</a:t>
-            </a:r>
-          </a:p>
-        </p:txBody>
-      </p:sp>
-      <p:sp>
-        <p:nvSpPr>
-          <p:cNvPr id="3" name="Content Placeholder 2">
-            <a:extLst>
-              <a:ext uri="{FF2B5EF4-FFF2-40B4-BE49-F238E27FC236}">
-                <a16:creationId xmlns:a16="http://schemas.microsoft.com/office/drawing/2014/main" xmlns="" id="{7F058883-6F2A-40BA-866C-965B491E500F}"/>
-              </a:ext>
-            </a:extLst>
-          </p:cNvPr>
-          <p:cNvSpPr>
-            <a:spLocks noGrp="1"/>
-          </p:cNvSpPr>
-          <p:nvPr>
-            <p:ph idx="1"/>
-          </p:nvPr>
-        </p:nvSpPr>
-        <p:spPr/>
-        <p:txBody>
-          <a:bodyPr/>
-          <a:lstStyle/>
-          <a:p>
-            <a:r>
-              <a:rPr lang="de-DE" dirty="0">
-                <a:solidFill>
-                  <a:schemeClr val="tx1"/>
-                </a:solidFill>
-              </a:rPr>
-              <a:t>Vadere: Probleme beim bei der </a:t>
-            </a:r>
-            <a:r>
-              <a:rPr lang="de-DE" dirty="0" smtClean="0">
-                <a:solidFill>
-                  <a:schemeClr val="tx1"/>
-                </a:solidFill>
-              </a:rPr>
-              <a:t>Simulation</a:t>
-            </a:r>
-          </a:p>
-          <a:p>
-            <a:r>
-              <a:rPr lang="de-DE" dirty="0" smtClean="0">
-                <a:solidFill>
-                  <a:schemeClr val="tx1"/>
-                </a:solidFill>
-              </a:rPr>
-              <a:t>Automatisierung</a:t>
-            </a:r>
-            <a:r>
-              <a:rPr lang="de-DE" dirty="0">
-                <a:solidFill>
-                  <a:schemeClr val="tx1"/>
-                </a:solidFill>
-              </a:rPr>
-              <a:t>: Starten der Simulation von außerhalb </a:t>
-            </a:r>
-            <a:r>
-              <a:rPr lang="de-DE" dirty="0" err="1">
-                <a:solidFill>
-                  <a:schemeClr val="tx1"/>
-                </a:solidFill>
-              </a:rPr>
-              <a:t>Vaderes</a:t>
-            </a:r>
-            <a:endParaRPr lang="de-DE" dirty="0">
-              <a:solidFill>
-                <a:schemeClr val="tx1"/>
-              </a:solidFill>
-            </a:endParaRPr>
-          </a:p>
-        </p:txBody>
-      </p:sp>
-    </p:spTree>
-    <p:extLst>
-      <p:ext uri="{BB962C8B-B14F-4D97-AF65-F5344CB8AC3E}">
-        <p14:creationId xmlns:p14="http://schemas.microsoft.com/office/powerpoint/2010/main" val="2417586414"/>
-      </p:ext>
-    </p:extLst>
-  </p:cSld>
-  <p:clrMapOvr>
-    <a:masterClrMapping/>
-  </p:clrMapOvr>
-  <p:transition spd="slow">
-    <p:push dir="u"/>
-  </p:transition>
-</p:sld>
-</file>
-
-<file path=ppt/slides/slide44.xml><?xml version="1.0" encoding="utf-8"?>
-<p:sld xmlns:a="http://schemas.openxmlformats.org/drawingml/2006/main" xmlns:r="http://schemas.openxmlformats.org/officeDocument/2006/relationships" xmlns:p="http://schemas.openxmlformats.org/presentationml/2006/main">
-  <p:cSld>
-    <p:spTree>
-      <p:nvGrpSpPr>
-        <p:cNvPr id="1" name=""/>
-        <p:cNvGrpSpPr/>
-        <p:nvPr/>
-      </p:nvGrpSpPr>
-      <p:grpSpPr>
-        <a:xfrm>
-          <a:off x="0" y="0"/>
-          <a:ext cx="0" cy="0"/>
-          <a:chOff x="0" y="0"/>
-          <a:chExt cx="0" cy="0"/>
-        </a:xfrm>
-      </p:grpSpPr>
-      <p:sp>
-        <p:nvSpPr>
           <p:cNvPr id="2" name="Title 6">
             <a:extLst>
               <a:ext uri="{FF2B5EF4-FFF2-40B4-BE49-F238E27FC236}">
-                <a16:creationId xmlns:a16="http://schemas.microsoft.com/office/drawing/2014/main" xmlns="" id="{04F78A0C-BF40-4E0B-9FA4-AAAA57E3C4EF}"/>
+                <a16:creationId xmlns="" xmlns:a16="http://schemas.microsoft.com/office/drawing/2014/main" id="{04F78A0C-BF40-4E0B-9FA4-AAAA57E3C4EF}"/>
               </a:ext>
             </a:extLst>
           </p:cNvPr>
@@ -10643,7 +10917,7 @@
           <p:cNvPr id="3" name="Content Placeholder 7">
             <a:extLst>
               <a:ext uri="{FF2B5EF4-FFF2-40B4-BE49-F238E27FC236}">
-                <a16:creationId xmlns:a16="http://schemas.microsoft.com/office/drawing/2014/main" xmlns="" id="{3A52400E-A01D-4CCF-8280-EBE32B011F8E}"/>
+                <a16:creationId xmlns="" xmlns:a16="http://schemas.microsoft.com/office/drawing/2014/main" id="{3A52400E-A01D-4CCF-8280-EBE32B011F8E}"/>
               </a:ext>
             </a:extLst>
           </p:cNvPr>
@@ -10824,6 +11098,13 @@
   <p:transition spd="slow">
     <p:push dir="u"/>
   </p:transition>
+  <p:timing>
+    <p:tnLst>
+      <p:par>
+        <p:cTn id="1" dur="indefinite" restart="never" nodeType="tmRoot"/>
+      </p:par>
+    </p:tnLst>
+  </p:timing>
 </p:sld>
 </file>
 
@@ -10849,7 +11130,7 @@
           <p:cNvPr id="8" name="Text Placeholder 7">
             <a:extLst>
               <a:ext uri="{FF2B5EF4-FFF2-40B4-BE49-F238E27FC236}">
-                <a16:creationId xmlns:a16="http://schemas.microsoft.com/office/drawing/2014/main" xmlns="" id="{7C7B7B5E-EB63-48A8-BCF5-30057479D808}"/>
+                <a16:creationId xmlns="" xmlns:a16="http://schemas.microsoft.com/office/drawing/2014/main" id="{7C7B7B5E-EB63-48A8-BCF5-30057479D808}"/>
               </a:ext>
             </a:extLst>
           </p:cNvPr>
@@ -10888,7 +11169,7 @@
           <p:cNvPr id="9" name="Content Placeholder 8">
             <a:extLst>
               <a:ext uri="{FF2B5EF4-FFF2-40B4-BE49-F238E27FC236}">
-                <a16:creationId xmlns:a16="http://schemas.microsoft.com/office/drawing/2014/main" xmlns="" id="{B69192B4-B668-4E8C-8C21-3A34BA8E13E7}"/>
+                <a16:creationId xmlns="" xmlns:a16="http://schemas.microsoft.com/office/drawing/2014/main" id="{B69192B4-B668-4E8C-8C21-3A34BA8E13E7}"/>
               </a:ext>
             </a:extLst>
           </p:cNvPr>
@@ -11032,7 +11313,7 @@
           <p:cNvPr id="10" name="Text Placeholder 9">
             <a:extLst>
               <a:ext uri="{FF2B5EF4-FFF2-40B4-BE49-F238E27FC236}">
-                <a16:creationId xmlns:a16="http://schemas.microsoft.com/office/drawing/2014/main" xmlns="" id="{528A301B-E3B1-4B35-BE7D-F69C91D785D0}"/>
+                <a16:creationId xmlns="" xmlns:a16="http://schemas.microsoft.com/office/drawing/2014/main" id="{528A301B-E3B1-4B35-BE7D-F69C91D785D0}"/>
               </a:ext>
             </a:extLst>
           </p:cNvPr>
@@ -11071,7 +11352,7 @@
           <p:cNvPr id="11" name="Content Placeholder 10">
             <a:extLst>
               <a:ext uri="{FF2B5EF4-FFF2-40B4-BE49-F238E27FC236}">
-                <a16:creationId xmlns:a16="http://schemas.microsoft.com/office/drawing/2014/main" xmlns="" id="{33DCA290-89C4-4275-A93D-319C803D2771}"/>
+                <a16:creationId xmlns="" xmlns:a16="http://schemas.microsoft.com/office/drawing/2014/main" id="{33DCA290-89C4-4275-A93D-319C803D2771}"/>
               </a:ext>
             </a:extLst>
           </p:cNvPr>
@@ -11213,7 +11494,7 @@
           <p:cNvPr id="12" name="Arrow: Down 11">
             <a:extLst>
               <a:ext uri="{FF2B5EF4-FFF2-40B4-BE49-F238E27FC236}">
-                <a16:creationId xmlns:a16="http://schemas.microsoft.com/office/drawing/2014/main" xmlns="" id="{5F710989-371B-4482-A9BD-56DFD57DBD75}"/>
+                <a16:creationId xmlns="" xmlns:a16="http://schemas.microsoft.com/office/drawing/2014/main" id="{5F710989-371B-4482-A9BD-56DFD57DBD75}"/>
               </a:ext>
             </a:extLst>
           </p:cNvPr>
@@ -11267,7 +11548,7 @@
           <p:cNvPr id="13" name="Arrow: Down 12">
             <a:extLst>
               <a:ext uri="{FF2B5EF4-FFF2-40B4-BE49-F238E27FC236}">
-                <a16:creationId xmlns:a16="http://schemas.microsoft.com/office/drawing/2014/main" xmlns="" id="{3C3CD861-7549-47BE-8D26-BF01FD79F024}"/>
+                <a16:creationId xmlns="" xmlns:a16="http://schemas.microsoft.com/office/drawing/2014/main" id="{3C3CD861-7549-47BE-8D26-BF01FD79F024}"/>
               </a:ext>
             </a:extLst>
           </p:cNvPr>
@@ -11329,6 +11610,13 @@
   <p:transition spd="slow">
     <p:push dir="u"/>
   </p:transition>
+  <p:timing>
+    <p:tnLst>
+      <p:par>
+        <p:cTn id="1" dur="indefinite" restart="never" nodeType="tmRoot"/>
+      </p:par>
+    </p:tnLst>
+  </p:timing>
 </p:sld>
 </file>
 
@@ -11354,7 +11642,7 @@
           <p:cNvPr id="11" name="Text Placeholder 10">
             <a:extLst>
               <a:ext uri="{FF2B5EF4-FFF2-40B4-BE49-F238E27FC236}">
-                <a16:creationId xmlns:a16="http://schemas.microsoft.com/office/drawing/2014/main" xmlns="" id="{EA176D17-8200-422B-A524-7F10475ECEF8}"/>
+                <a16:creationId xmlns="" xmlns:a16="http://schemas.microsoft.com/office/drawing/2014/main" id="{EA176D17-8200-422B-A524-7F10475ECEF8}"/>
               </a:ext>
             </a:extLst>
           </p:cNvPr>
@@ -11398,7 +11686,7 @@
           <p:cNvPr id="8" name="Content Placeholder 7">
             <a:extLst>
               <a:ext uri="{FF2B5EF4-FFF2-40B4-BE49-F238E27FC236}">
-                <a16:creationId xmlns:a16="http://schemas.microsoft.com/office/drawing/2014/main" xmlns="" id="{5FF4DCB6-21B0-4D52-90D0-4B41F67FF51E}"/>
+                <a16:creationId xmlns="" xmlns:a16="http://schemas.microsoft.com/office/drawing/2014/main" id="{5FF4DCB6-21B0-4D52-90D0-4B41F67FF51E}"/>
               </a:ext>
             </a:extLst>
           </p:cNvPr>
@@ -11442,8 +11730,21 @@
                   <a:schemeClr val="tx1"/>
                 </a:solidFill>
               </a:rPr>
-              <a:t>Aufbereitung der Daten für die Gruppen des Maschinenlernalgorithmus</a:t>
-            </a:r>
+              <a:t>Aufbereitung der Daten für die Gruppen des </a:t>
+            </a:r>
+            <a:r>
+              <a:rPr lang="de-DE" dirty="0" smtClean="0">
+                <a:solidFill>
+                  <a:schemeClr val="tx1"/>
+                </a:solidFill>
+              </a:rPr>
+              <a:t>Maschinenlernalgorithmus (nach Fraunhofer)</a:t>
+            </a:r>
+            <a:endParaRPr lang="de-DE" dirty="0">
+              <a:solidFill>
+                <a:schemeClr val="tx1"/>
+              </a:solidFill>
+            </a:endParaRPr>
           </a:p>
           <a:p>
             <a:r>
@@ -11482,7 +11783,7 @@
           <p:cNvPr id="9" name="Content Placeholder 8">
             <a:extLst>
               <a:ext uri="{FF2B5EF4-FFF2-40B4-BE49-F238E27FC236}">
-                <a16:creationId xmlns:a16="http://schemas.microsoft.com/office/drawing/2014/main" xmlns="" id="{6D926286-4DAB-48EB-97A3-06175DC678CE}"/>
+                <a16:creationId xmlns="" xmlns:a16="http://schemas.microsoft.com/office/drawing/2014/main" id="{6D926286-4DAB-48EB-97A3-06175DC678CE}"/>
               </a:ext>
             </a:extLst>
           </p:cNvPr>
@@ -11580,7 +11881,7 @@
           <p:cNvPr id="14" name="Picture 13">
             <a:extLst>
               <a:ext uri="{FF2B5EF4-FFF2-40B4-BE49-F238E27FC236}">
-                <a16:creationId xmlns:a16="http://schemas.microsoft.com/office/drawing/2014/main" xmlns="" id="{6F1B2972-00B7-472B-870D-CC70C6F0BD20}"/>
+                <a16:creationId xmlns="" xmlns:a16="http://schemas.microsoft.com/office/drawing/2014/main" id="{6F1B2972-00B7-472B-870D-CC70C6F0BD20}"/>
               </a:ext>
             </a:extLst>
           </p:cNvPr>
@@ -11619,7 +11920,7 @@
         </p:nvSpPr>
         <p:spPr>
           <a:xfrm>
-            <a:off x="5925669" y="2359032"/>
+            <a:off x="6429452" y="1998765"/>
             <a:ext cx="161365" cy="161926"/>
           </a:xfrm>
           <a:prstGeom prst="flowChartConnector">
@@ -11661,13 +11962,13 @@
       </p:sp>
       <p:sp>
         <p:nvSpPr>
-          <p:cNvPr id="7" name="Flussdiagramm: Verbindungsstelle 6"/>
+          <p:cNvPr id="15" name="Flussdiagramm: Verbindungsstelle 14"/>
           <p:cNvSpPr/>
           <p:nvPr/>
         </p:nvSpPr>
         <p:spPr>
           <a:xfrm>
-            <a:off x="6185645" y="2358751"/>
+            <a:off x="6429453" y="2694751"/>
             <a:ext cx="161365" cy="161926"/>
           </a:xfrm>
           <a:prstGeom prst="flowChartConnector">
@@ -11709,13 +12010,157 @@
       </p:sp>
       <p:sp>
         <p:nvSpPr>
-          <p:cNvPr id="10" name="Flussdiagramm: Verbindungsstelle 9"/>
+          <p:cNvPr id="16" name="Flussdiagramm: Verbindungsstelle 15"/>
           <p:cNvSpPr/>
           <p:nvPr/>
         </p:nvSpPr>
         <p:spPr>
           <a:xfrm>
-            <a:off x="6486663" y="2358751"/>
+            <a:off x="6429451" y="3674421"/>
+            <a:ext cx="161365" cy="161926"/>
+          </a:xfrm>
+          <a:prstGeom prst="flowChartConnector">
+            <a:avLst/>
+          </a:prstGeom>
+          <a:solidFill>
+            <a:srgbClr val="FFFF00"/>
+          </a:solidFill>
+          <a:ln>
+            <a:solidFill>
+              <a:srgbClr val="FFFF00"/>
+            </a:solidFill>
+          </a:ln>
+        </p:spPr>
+        <p:style>
+          <a:lnRef idx="2">
+            <a:schemeClr val="accent1">
+              <a:shade val="50000"/>
+            </a:schemeClr>
+          </a:lnRef>
+          <a:fillRef idx="1">
+            <a:schemeClr val="accent1"/>
+          </a:fillRef>
+          <a:effectRef idx="0">
+            <a:schemeClr val="accent1"/>
+          </a:effectRef>
+          <a:fontRef idx="minor">
+            <a:schemeClr val="lt1"/>
+          </a:fontRef>
+        </p:style>
+        <p:txBody>
+          <a:bodyPr rtlCol="0" anchor="ctr"/>
+          <a:lstStyle/>
+          <a:p>
+            <a:pPr algn="ctr"/>
+            <a:endParaRPr lang="de-DE"/>
+          </a:p>
+        </p:txBody>
+      </p:sp>
+      <p:sp>
+        <p:nvSpPr>
+          <p:cNvPr id="20" name="Flussdiagramm: Verbindungsstelle 19"/>
+          <p:cNvSpPr/>
+          <p:nvPr/>
+        </p:nvSpPr>
+        <p:spPr>
+          <a:xfrm>
+            <a:off x="6431208" y="4608209"/>
+            <a:ext cx="161365" cy="161926"/>
+          </a:xfrm>
+          <a:prstGeom prst="flowChartConnector">
+            <a:avLst/>
+          </a:prstGeom>
+          <a:solidFill>
+            <a:srgbClr val="FFFF00"/>
+          </a:solidFill>
+          <a:ln>
+            <a:solidFill>
+              <a:srgbClr val="FFFF00"/>
+            </a:solidFill>
+          </a:ln>
+        </p:spPr>
+        <p:style>
+          <a:lnRef idx="2">
+            <a:schemeClr val="accent1">
+              <a:shade val="50000"/>
+            </a:schemeClr>
+          </a:lnRef>
+          <a:fillRef idx="1">
+            <a:schemeClr val="accent1"/>
+          </a:fillRef>
+          <a:effectRef idx="0">
+            <a:schemeClr val="accent1"/>
+          </a:effectRef>
+          <a:fontRef idx="minor">
+            <a:schemeClr val="lt1"/>
+          </a:fontRef>
+        </p:style>
+        <p:txBody>
+          <a:bodyPr rtlCol="0" anchor="ctr"/>
+          <a:lstStyle/>
+          <a:p>
+            <a:pPr algn="ctr"/>
+            <a:endParaRPr lang="de-DE"/>
+          </a:p>
+        </p:txBody>
+      </p:sp>
+      <p:sp>
+        <p:nvSpPr>
+          <p:cNvPr id="22" name="Flussdiagramm: Verbindungsstelle 21"/>
+          <p:cNvSpPr/>
+          <p:nvPr/>
+        </p:nvSpPr>
+        <p:spPr>
+          <a:xfrm>
+            <a:off x="6430443" y="5304195"/>
+            <a:ext cx="161365" cy="161926"/>
+          </a:xfrm>
+          <a:prstGeom prst="flowChartConnector">
+            <a:avLst/>
+          </a:prstGeom>
+          <a:solidFill>
+            <a:srgbClr val="FFFF00"/>
+          </a:solidFill>
+          <a:ln>
+            <a:solidFill>
+              <a:srgbClr val="FFFF00"/>
+            </a:solidFill>
+          </a:ln>
+        </p:spPr>
+        <p:style>
+          <a:lnRef idx="2">
+            <a:schemeClr val="accent1">
+              <a:shade val="50000"/>
+            </a:schemeClr>
+          </a:lnRef>
+          <a:fillRef idx="1">
+            <a:schemeClr val="accent1"/>
+          </a:fillRef>
+          <a:effectRef idx="0">
+            <a:schemeClr val="accent1"/>
+          </a:effectRef>
+          <a:fontRef idx="minor">
+            <a:schemeClr val="lt1"/>
+          </a:fontRef>
+        </p:style>
+        <p:txBody>
+          <a:bodyPr rtlCol="0" anchor="ctr"/>
+          <a:lstStyle/>
+          <a:p>
+            <a:pPr algn="ctr"/>
+            <a:endParaRPr lang="de-DE"/>
+          </a:p>
+        </p:txBody>
+      </p:sp>
+      <p:sp>
+        <p:nvSpPr>
+          <p:cNvPr id="27" name="Flussdiagramm: Verbindungsstelle 26"/>
+          <p:cNvSpPr/>
+          <p:nvPr/>
+        </p:nvSpPr>
+        <p:spPr>
+          <a:xfrm>
+            <a:off x="11168210" y="2043111"/>
             <a:ext cx="161365" cy="161926"/>
           </a:xfrm>
           <a:prstGeom prst="flowChartConnector">
@@ -11757,13 +12202,13 @@
       </p:sp>
       <p:sp>
         <p:nvSpPr>
-          <p:cNvPr id="12" name="Flussdiagramm: Verbindungsstelle 11"/>
+          <p:cNvPr id="28" name="Flussdiagramm: Verbindungsstelle 27"/>
           <p:cNvSpPr/>
           <p:nvPr/>
         </p:nvSpPr>
         <p:spPr>
           <a:xfrm>
-            <a:off x="6482183" y="3107235"/>
+            <a:off x="11170284" y="3998703"/>
             <a:ext cx="161365" cy="161926"/>
           </a:xfrm>
           <a:prstGeom prst="flowChartConnector">
@@ -11805,13 +12250,61 @@
       </p:sp>
       <p:sp>
         <p:nvSpPr>
-          <p:cNvPr id="13" name="Flussdiagramm: Verbindungsstelle 12"/>
+          <p:cNvPr id="33" name="Flussdiagramm: Verbindungsstelle 32"/>
           <p:cNvSpPr/>
           <p:nvPr/>
         </p:nvSpPr>
         <p:spPr>
           <a:xfrm>
-            <a:off x="6185645" y="3110979"/>
+            <a:off x="11168209" y="5221692"/>
+            <a:ext cx="161365" cy="161926"/>
+          </a:xfrm>
+          <a:prstGeom prst="flowChartConnector">
+            <a:avLst/>
+          </a:prstGeom>
+          <a:solidFill>
+            <a:srgbClr val="FFFF00"/>
+          </a:solidFill>
+          <a:ln>
+            <a:solidFill>
+              <a:srgbClr val="FFFF00"/>
+            </a:solidFill>
+          </a:ln>
+        </p:spPr>
+        <p:style>
+          <a:lnRef idx="2">
+            <a:schemeClr val="accent1">
+              <a:shade val="50000"/>
+            </a:schemeClr>
+          </a:lnRef>
+          <a:fillRef idx="1">
+            <a:schemeClr val="accent1"/>
+          </a:fillRef>
+          <a:effectRef idx="0">
+            <a:schemeClr val="accent1"/>
+          </a:effectRef>
+          <a:fontRef idx="minor">
+            <a:schemeClr val="lt1"/>
+          </a:fontRef>
+        </p:style>
+        <p:txBody>
+          <a:bodyPr rtlCol="0" anchor="ctr"/>
+          <a:lstStyle/>
+          <a:p>
+            <a:pPr algn="ctr"/>
+            <a:endParaRPr lang="de-DE"/>
+          </a:p>
+        </p:txBody>
+      </p:sp>
+      <p:sp>
+        <p:nvSpPr>
+          <p:cNvPr id="34" name="Flussdiagramm: Verbindungsstelle 33"/>
+          <p:cNvSpPr/>
+          <p:nvPr/>
+        </p:nvSpPr>
+        <p:spPr>
+          <a:xfrm>
+            <a:off x="11172153" y="2775714"/>
             <a:ext cx="161365" cy="161926"/>
           </a:xfrm>
           <a:prstGeom prst="flowChartConnector">
@@ -11851,1062 +12344,6 @@
           </a:p>
         </p:txBody>
       </p:sp>
-      <p:sp>
-        <p:nvSpPr>
-          <p:cNvPr id="15" name="Flussdiagramm: Verbindungsstelle 14"/>
-          <p:cNvSpPr/>
-          <p:nvPr/>
-        </p:nvSpPr>
-        <p:spPr>
-          <a:xfrm>
-            <a:off x="5925670" y="3110979"/>
-            <a:ext cx="161365" cy="161926"/>
-          </a:xfrm>
-          <a:prstGeom prst="flowChartConnector">
-            <a:avLst/>
-          </a:prstGeom>
-          <a:solidFill>
-            <a:srgbClr val="92D050"/>
-          </a:solidFill>
-          <a:ln>
-            <a:solidFill>
-              <a:srgbClr val="92D050"/>
-            </a:solidFill>
-          </a:ln>
-        </p:spPr>
-        <p:style>
-          <a:lnRef idx="2">
-            <a:schemeClr val="accent1">
-              <a:shade val="50000"/>
-            </a:schemeClr>
-          </a:lnRef>
-          <a:fillRef idx="1">
-            <a:schemeClr val="accent1"/>
-          </a:fillRef>
-          <a:effectRef idx="0">
-            <a:schemeClr val="accent1"/>
-          </a:effectRef>
-          <a:fontRef idx="minor">
-            <a:schemeClr val="lt1"/>
-          </a:fontRef>
-        </p:style>
-        <p:txBody>
-          <a:bodyPr rtlCol="0" anchor="ctr"/>
-          <a:lstStyle/>
-          <a:p>
-            <a:pPr algn="ctr"/>
-            <a:endParaRPr lang="de-DE"/>
-          </a:p>
-        </p:txBody>
-      </p:sp>
-      <p:sp>
-        <p:nvSpPr>
-          <p:cNvPr id="16" name="Flussdiagramm: Verbindungsstelle 15"/>
-          <p:cNvSpPr/>
-          <p:nvPr/>
-        </p:nvSpPr>
-        <p:spPr>
-          <a:xfrm>
-            <a:off x="6482182" y="3780690"/>
-            <a:ext cx="161365" cy="161926"/>
-          </a:xfrm>
-          <a:prstGeom prst="flowChartConnector">
-            <a:avLst/>
-          </a:prstGeom>
-          <a:solidFill>
-            <a:srgbClr val="FFFF00"/>
-          </a:solidFill>
-          <a:ln>
-            <a:solidFill>
-              <a:srgbClr val="FFFF00"/>
-            </a:solidFill>
-          </a:ln>
-        </p:spPr>
-        <p:style>
-          <a:lnRef idx="2">
-            <a:schemeClr val="accent1">
-              <a:shade val="50000"/>
-            </a:schemeClr>
-          </a:lnRef>
-          <a:fillRef idx="1">
-            <a:schemeClr val="accent1"/>
-          </a:fillRef>
-          <a:effectRef idx="0">
-            <a:schemeClr val="accent1"/>
-          </a:effectRef>
-          <a:fontRef idx="minor">
-            <a:schemeClr val="lt1"/>
-          </a:fontRef>
-        </p:style>
-        <p:txBody>
-          <a:bodyPr rtlCol="0" anchor="ctr"/>
-          <a:lstStyle/>
-          <a:p>
-            <a:pPr algn="ctr"/>
-            <a:endParaRPr lang="de-DE"/>
-          </a:p>
-        </p:txBody>
-      </p:sp>
-      <p:sp>
-        <p:nvSpPr>
-          <p:cNvPr id="17" name="Flussdiagramm: Verbindungsstelle 16"/>
-          <p:cNvSpPr/>
-          <p:nvPr/>
-        </p:nvSpPr>
-        <p:spPr>
-          <a:xfrm>
-            <a:off x="6185645" y="3781963"/>
-            <a:ext cx="161365" cy="161926"/>
-          </a:xfrm>
-          <a:prstGeom prst="flowChartConnector">
-            <a:avLst/>
-          </a:prstGeom>
-          <a:solidFill>
-            <a:srgbClr val="92D050"/>
-          </a:solidFill>
-          <a:ln>
-            <a:solidFill>
-              <a:srgbClr val="92D050"/>
-            </a:solidFill>
-          </a:ln>
-        </p:spPr>
-        <p:style>
-          <a:lnRef idx="2">
-            <a:schemeClr val="accent1">
-              <a:shade val="50000"/>
-            </a:schemeClr>
-          </a:lnRef>
-          <a:fillRef idx="1">
-            <a:schemeClr val="accent1"/>
-          </a:fillRef>
-          <a:effectRef idx="0">
-            <a:schemeClr val="accent1"/>
-          </a:effectRef>
-          <a:fontRef idx="minor">
-            <a:schemeClr val="lt1"/>
-          </a:fontRef>
-        </p:style>
-        <p:txBody>
-          <a:bodyPr rtlCol="0" anchor="ctr"/>
-          <a:lstStyle/>
-          <a:p>
-            <a:pPr algn="ctr"/>
-            <a:endParaRPr lang="de-DE"/>
-          </a:p>
-        </p:txBody>
-      </p:sp>
-      <p:sp>
-        <p:nvSpPr>
-          <p:cNvPr id="18" name="Flussdiagramm: Verbindungsstelle 17"/>
-          <p:cNvSpPr/>
-          <p:nvPr/>
-        </p:nvSpPr>
-        <p:spPr>
-          <a:xfrm>
-            <a:off x="5930151" y="3781963"/>
-            <a:ext cx="161365" cy="161926"/>
-          </a:xfrm>
-          <a:prstGeom prst="flowChartConnector">
-            <a:avLst/>
-          </a:prstGeom>
-          <a:solidFill>
-            <a:srgbClr val="92D050"/>
-          </a:solidFill>
-          <a:ln>
-            <a:solidFill>
-              <a:srgbClr val="92D050"/>
-            </a:solidFill>
-          </a:ln>
-        </p:spPr>
-        <p:style>
-          <a:lnRef idx="2">
-            <a:schemeClr val="accent1">
-              <a:shade val="50000"/>
-            </a:schemeClr>
-          </a:lnRef>
-          <a:fillRef idx="1">
-            <a:schemeClr val="accent1"/>
-          </a:fillRef>
-          <a:effectRef idx="0">
-            <a:schemeClr val="accent1"/>
-          </a:effectRef>
-          <a:fontRef idx="minor">
-            <a:schemeClr val="lt1"/>
-          </a:fontRef>
-        </p:style>
-        <p:txBody>
-          <a:bodyPr rtlCol="0" anchor="ctr"/>
-          <a:lstStyle/>
-          <a:p>
-            <a:pPr algn="ctr"/>
-            <a:endParaRPr lang="de-DE"/>
-          </a:p>
-        </p:txBody>
-      </p:sp>
-      <p:sp>
-        <p:nvSpPr>
-          <p:cNvPr id="19" name="Flussdiagramm: Verbindungsstelle 18"/>
-          <p:cNvSpPr/>
-          <p:nvPr/>
-        </p:nvSpPr>
-        <p:spPr>
-          <a:xfrm>
-            <a:off x="6911634" y="4472471"/>
-            <a:ext cx="161365" cy="161926"/>
-          </a:xfrm>
-          <a:prstGeom prst="flowChartConnector">
-            <a:avLst/>
-          </a:prstGeom>
-          <a:solidFill>
-            <a:srgbClr val="FF0000"/>
-          </a:solidFill>
-          <a:ln>
-            <a:solidFill>
-              <a:srgbClr val="FF0000"/>
-            </a:solidFill>
-          </a:ln>
-        </p:spPr>
-        <p:style>
-          <a:lnRef idx="2">
-            <a:schemeClr val="accent1">
-              <a:shade val="50000"/>
-            </a:schemeClr>
-          </a:lnRef>
-          <a:fillRef idx="1">
-            <a:schemeClr val="accent1"/>
-          </a:fillRef>
-          <a:effectRef idx="0">
-            <a:schemeClr val="accent1"/>
-          </a:effectRef>
-          <a:fontRef idx="minor">
-            <a:schemeClr val="lt1"/>
-          </a:fontRef>
-        </p:style>
-        <p:txBody>
-          <a:bodyPr rtlCol="0" anchor="ctr"/>
-          <a:lstStyle/>
-          <a:p>
-            <a:pPr algn="ctr"/>
-            <a:endParaRPr lang="de-DE"/>
-          </a:p>
-        </p:txBody>
-      </p:sp>
-      <p:sp>
-        <p:nvSpPr>
-          <p:cNvPr id="20" name="Flussdiagramm: Verbindungsstelle 19"/>
-          <p:cNvSpPr/>
-          <p:nvPr/>
-        </p:nvSpPr>
-        <p:spPr>
-          <a:xfrm>
-            <a:off x="6617520" y="4472471"/>
-            <a:ext cx="161365" cy="161926"/>
-          </a:xfrm>
-          <a:prstGeom prst="flowChartConnector">
-            <a:avLst/>
-          </a:prstGeom>
-          <a:solidFill>
-            <a:srgbClr val="FFFF00"/>
-          </a:solidFill>
-          <a:ln>
-            <a:solidFill>
-              <a:srgbClr val="FFFF00"/>
-            </a:solidFill>
-          </a:ln>
-        </p:spPr>
-        <p:style>
-          <a:lnRef idx="2">
-            <a:schemeClr val="accent1">
-              <a:shade val="50000"/>
-            </a:schemeClr>
-          </a:lnRef>
-          <a:fillRef idx="1">
-            <a:schemeClr val="accent1"/>
-          </a:fillRef>
-          <a:effectRef idx="0">
-            <a:schemeClr val="accent1"/>
-          </a:effectRef>
-          <a:fontRef idx="minor">
-            <a:schemeClr val="lt1"/>
-          </a:fontRef>
-        </p:style>
-        <p:txBody>
-          <a:bodyPr rtlCol="0" anchor="ctr"/>
-          <a:lstStyle/>
-          <a:p>
-            <a:pPr algn="ctr"/>
-            <a:endParaRPr lang="de-DE"/>
-          </a:p>
-        </p:txBody>
-      </p:sp>
-      <p:sp>
-        <p:nvSpPr>
-          <p:cNvPr id="21" name="Flussdiagramm: Verbindungsstelle 20"/>
-          <p:cNvSpPr/>
-          <p:nvPr/>
-        </p:nvSpPr>
-        <p:spPr>
-          <a:xfrm>
-            <a:off x="6323406" y="4472471"/>
-            <a:ext cx="161365" cy="161926"/>
-          </a:xfrm>
-          <a:prstGeom prst="flowChartConnector">
-            <a:avLst/>
-          </a:prstGeom>
-          <a:solidFill>
-            <a:srgbClr val="92D050"/>
-          </a:solidFill>
-          <a:ln>
-            <a:solidFill>
-              <a:srgbClr val="92D050"/>
-            </a:solidFill>
-          </a:ln>
-        </p:spPr>
-        <p:style>
-          <a:lnRef idx="2">
-            <a:schemeClr val="accent1">
-              <a:shade val="50000"/>
-            </a:schemeClr>
-          </a:lnRef>
-          <a:fillRef idx="1">
-            <a:schemeClr val="accent1"/>
-          </a:fillRef>
-          <a:effectRef idx="0">
-            <a:schemeClr val="accent1"/>
-          </a:effectRef>
-          <a:fontRef idx="minor">
-            <a:schemeClr val="lt1"/>
-          </a:fontRef>
-        </p:style>
-        <p:txBody>
-          <a:bodyPr rtlCol="0" anchor="ctr"/>
-          <a:lstStyle/>
-          <a:p>
-            <a:pPr algn="ctr"/>
-            <a:endParaRPr lang="de-DE"/>
-          </a:p>
-        </p:txBody>
-      </p:sp>
-      <p:sp>
-        <p:nvSpPr>
-          <p:cNvPr id="22" name="Flussdiagramm: Verbindungsstelle 21"/>
-          <p:cNvSpPr/>
-          <p:nvPr/>
-        </p:nvSpPr>
-        <p:spPr>
-          <a:xfrm>
-            <a:off x="6509683" y="5202629"/>
-            <a:ext cx="161365" cy="161926"/>
-          </a:xfrm>
-          <a:prstGeom prst="flowChartConnector">
-            <a:avLst/>
-          </a:prstGeom>
-          <a:solidFill>
-            <a:srgbClr val="FFFF00"/>
-          </a:solidFill>
-          <a:ln>
-            <a:solidFill>
-              <a:srgbClr val="FFFF00"/>
-            </a:solidFill>
-          </a:ln>
-        </p:spPr>
-        <p:style>
-          <a:lnRef idx="2">
-            <a:schemeClr val="accent1">
-              <a:shade val="50000"/>
-            </a:schemeClr>
-          </a:lnRef>
-          <a:fillRef idx="1">
-            <a:schemeClr val="accent1"/>
-          </a:fillRef>
-          <a:effectRef idx="0">
-            <a:schemeClr val="accent1"/>
-          </a:effectRef>
-          <a:fontRef idx="minor">
-            <a:schemeClr val="lt1"/>
-          </a:fontRef>
-        </p:style>
-        <p:txBody>
-          <a:bodyPr rtlCol="0" anchor="ctr"/>
-          <a:lstStyle/>
-          <a:p>
-            <a:pPr algn="ctr"/>
-            <a:endParaRPr lang="de-DE"/>
-          </a:p>
-        </p:txBody>
-      </p:sp>
-      <p:sp>
-        <p:nvSpPr>
-          <p:cNvPr id="23" name="Flussdiagramm: Verbindungsstelle 22"/>
-          <p:cNvSpPr/>
-          <p:nvPr/>
-        </p:nvSpPr>
-        <p:spPr>
-          <a:xfrm>
-            <a:off x="6207721" y="5204894"/>
-            <a:ext cx="161365" cy="161926"/>
-          </a:xfrm>
-          <a:prstGeom prst="flowChartConnector">
-            <a:avLst/>
-          </a:prstGeom>
-          <a:solidFill>
-            <a:srgbClr val="92D050"/>
-          </a:solidFill>
-          <a:ln>
-            <a:solidFill>
-              <a:srgbClr val="92D050"/>
-            </a:solidFill>
-          </a:ln>
-        </p:spPr>
-        <p:style>
-          <a:lnRef idx="2">
-            <a:schemeClr val="accent1">
-              <a:shade val="50000"/>
-            </a:schemeClr>
-          </a:lnRef>
-          <a:fillRef idx="1">
-            <a:schemeClr val="accent1"/>
-          </a:fillRef>
-          <a:effectRef idx="0">
-            <a:schemeClr val="accent1"/>
-          </a:effectRef>
-          <a:fontRef idx="minor">
-            <a:schemeClr val="lt1"/>
-          </a:fontRef>
-        </p:style>
-        <p:txBody>
-          <a:bodyPr rtlCol="0" anchor="ctr"/>
-          <a:lstStyle/>
-          <a:p>
-            <a:pPr algn="ctr"/>
-            <a:endParaRPr lang="de-DE"/>
-          </a:p>
-        </p:txBody>
-      </p:sp>
-      <p:sp>
-        <p:nvSpPr>
-          <p:cNvPr id="24" name="Flussdiagramm: Verbindungsstelle 23"/>
-          <p:cNvSpPr/>
-          <p:nvPr/>
-        </p:nvSpPr>
-        <p:spPr>
-          <a:xfrm>
-            <a:off x="5923601" y="5204894"/>
-            <a:ext cx="161365" cy="161926"/>
-          </a:xfrm>
-          <a:prstGeom prst="flowChartConnector">
-            <a:avLst/>
-          </a:prstGeom>
-          <a:solidFill>
-            <a:srgbClr val="92D050"/>
-          </a:solidFill>
-          <a:ln>
-            <a:solidFill>
-              <a:srgbClr val="92D050"/>
-            </a:solidFill>
-          </a:ln>
-        </p:spPr>
-        <p:style>
-          <a:lnRef idx="2">
-            <a:schemeClr val="accent1">
-              <a:shade val="50000"/>
-            </a:schemeClr>
-          </a:lnRef>
-          <a:fillRef idx="1">
-            <a:schemeClr val="accent1"/>
-          </a:fillRef>
-          <a:effectRef idx="0">
-            <a:schemeClr val="accent1"/>
-          </a:effectRef>
-          <a:fontRef idx="minor">
-            <a:schemeClr val="lt1"/>
-          </a:fontRef>
-        </p:style>
-        <p:txBody>
-          <a:bodyPr rtlCol="0" anchor="ctr"/>
-          <a:lstStyle/>
-          <a:p>
-            <a:pPr algn="ctr"/>
-            <a:endParaRPr lang="de-DE"/>
-          </a:p>
-        </p:txBody>
-      </p:sp>
-      <p:sp>
-        <p:nvSpPr>
-          <p:cNvPr id="25" name="Flussdiagramm: Verbindungsstelle 24"/>
-          <p:cNvSpPr/>
-          <p:nvPr/>
-        </p:nvSpPr>
-        <p:spPr>
-          <a:xfrm>
-            <a:off x="11483789" y="2043111"/>
-            <a:ext cx="161365" cy="161926"/>
-          </a:xfrm>
-          <a:prstGeom prst="flowChartConnector">
-            <a:avLst/>
-          </a:prstGeom>
-          <a:solidFill>
-            <a:srgbClr val="92D050"/>
-          </a:solidFill>
-          <a:ln>
-            <a:solidFill>
-              <a:srgbClr val="92D050"/>
-            </a:solidFill>
-          </a:ln>
-        </p:spPr>
-        <p:style>
-          <a:lnRef idx="2">
-            <a:schemeClr val="accent1">
-              <a:shade val="50000"/>
-            </a:schemeClr>
-          </a:lnRef>
-          <a:fillRef idx="1">
-            <a:schemeClr val="accent1"/>
-          </a:fillRef>
-          <a:effectRef idx="0">
-            <a:schemeClr val="accent1"/>
-          </a:effectRef>
-          <a:fontRef idx="minor">
-            <a:schemeClr val="lt1"/>
-          </a:fontRef>
-        </p:style>
-        <p:txBody>
-          <a:bodyPr rtlCol="0" anchor="ctr"/>
-          <a:lstStyle/>
-          <a:p>
-            <a:pPr algn="ctr"/>
-            <a:endParaRPr lang="de-DE"/>
-          </a:p>
-        </p:txBody>
-      </p:sp>
-      <p:sp>
-        <p:nvSpPr>
-          <p:cNvPr id="26" name="Flussdiagramm: Verbindungsstelle 25"/>
-          <p:cNvSpPr/>
-          <p:nvPr/>
-        </p:nvSpPr>
-        <p:spPr>
-          <a:xfrm>
-            <a:off x="11186674" y="2043111"/>
-            <a:ext cx="161365" cy="161926"/>
-          </a:xfrm>
-          <a:prstGeom prst="flowChartConnector">
-            <a:avLst/>
-          </a:prstGeom>
-          <a:solidFill>
-            <a:srgbClr val="92D050"/>
-          </a:solidFill>
-          <a:ln>
-            <a:solidFill>
-              <a:srgbClr val="92D050"/>
-            </a:solidFill>
-          </a:ln>
-        </p:spPr>
-        <p:style>
-          <a:lnRef idx="2">
-            <a:schemeClr val="accent1">
-              <a:shade val="50000"/>
-            </a:schemeClr>
-          </a:lnRef>
-          <a:fillRef idx="1">
-            <a:schemeClr val="accent1"/>
-          </a:fillRef>
-          <a:effectRef idx="0">
-            <a:schemeClr val="accent1"/>
-          </a:effectRef>
-          <a:fontRef idx="minor">
-            <a:schemeClr val="lt1"/>
-          </a:fontRef>
-        </p:style>
-        <p:txBody>
-          <a:bodyPr rtlCol="0" anchor="ctr"/>
-          <a:lstStyle/>
-          <a:p>
-            <a:pPr algn="ctr"/>
-            <a:endParaRPr lang="de-DE"/>
-          </a:p>
-        </p:txBody>
-      </p:sp>
-      <p:sp>
-        <p:nvSpPr>
-          <p:cNvPr id="27" name="Flussdiagramm: Verbindungsstelle 26"/>
-          <p:cNvSpPr/>
-          <p:nvPr/>
-        </p:nvSpPr>
-        <p:spPr>
-          <a:xfrm>
-            <a:off x="10941423" y="2043111"/>
-            <a:ext cx="161365" cy="161926"/>
-          </a:xfrm>
-          <a:prstGeom prst="flowChartConnector">
-            <a:avLst/>
-          </a:prstGeom>
-          <a:solidFill>
-            <a:srgbClr val="92D050"/>
-          </a:solidFill>
-          <a:ln>
-            <a:solidFill>
-              <a:srgbClr val="92D050"/>
-            </a:solidFill>
-          </a:ln>
-        </p:spPr>
-        <p:style>
-          <a:lnRef idx="2">
-            <a:schemeClr val="accent1">
-              <a:shade val="50000"/>
-            </a:schemeClr>
-          </a:lnRef>
-          <a:fillRef idx="1">
-            <a:schemeClr val="accent1"/>
-          </a:fillRef>
-          <a:effectRef idx="0">
-            <a:schemeClr val="accent1"/>
-          </a:effectRef>
-          <a:fontRef idx="minor">
-            <a:schemeClr val="lt1"/>
-          </a:fontRef>
-        </p:style>
-        <p:txBody>
-          <a:bodyPr rtlCol="0" anchor="ctr"/>
-          <a:lstStyle/>
-          <a:p>
-            <a:pPr algn="ctr"/>
-            <a:endParaRPr lang="de-DE"/>
-          </a:p>
-        </p:txBody>
-      </p:sp>
-      <p:sp>
-        <p:nvSpPr>
-          <p:cNvPr id="28" name="Flussdiagramm: Verbindungsstelle 27"/>
-          <p:cNvSpPr/>
-          <p:nvPr/>
-        </p:nvSpPr>
-        <p:spPr>
-          <a:xfrm>
-            <a:off x="10448364" y="4822450"/>
-            <a:ext cx="161365" cy="161926"/>
-          </a:xfrm>
-          <a:prstGeom prst="flowChartConnector">
-            <a:avLst/>
-          </a:prstGeom>
-          <a:solidFill>
-            <a:srgbClr val="92D050"/>
-          </a:solidFill>
-          <a:ln>
-            <a:solidFill>
-              <a:srgbClr val="92D050"/>
-            </a:solidFill>
-          </a:ln>
-        </p:spPr>
-        <p:style>
-          <a:lnRef idx="2">
-            <a:schemeClr val="accent1">
-              <a:shade val="50000"/>
-            </a:schemeClr>
-          </a:lnRef>
-          <a:fillRef idx="1">
-            <a:schemeClr val="accent1"/>
-          </a:fillRef>
-          <a:effectRef idx="0">
-            <a:schemeClr val="accent1"/>
-          </a:effectRef>
-          <a:fontRef idx="minor">
-            <a:schemeClr val="lt1"/>
-          </a:fontRef>
-        </p:style>
-        <p:txBody>
-          <a:bodyPr rtlCol="0" anchor="ctr"/>
-          <a:lstStyle/>
-          <a:p>
-            <a:pPr algn="ctr"/>
-            <a:endParaRPr lang="de-DE"/>
-          </a:p>
-        </p:txBody>
-      </p:sp>
-      <p:sp>
-        <p:nvSpPr>
-          <p:cNvPr id="29" name="Flussdiagramm: Verbindungsstelle 28"/>
-          <p:cNvSpPr/>
-          <p:nvPr/>
-        </p:nvSpPr>
-        <p:spPr>
-          <a:xfrm>
-            <a:off x="10062882" y="4822450"/>
-            <a:ext cx="161365" cy="161926"/>
-          </a:xfrm>
-          <a:prstGeom prst="flowChartConnector">
-            <a:avLst/>
-          </a:prstGeom>
-          <a:solidFill>
-            <a:srgbClr val="92D050"/>
-          </a:solidFill>
-          <a:ln>
-            <a:solidFill>
-              <a:srgbClr val="92D050"/>
-            </a:solidFill>
-          </a:ln>
-        </p:spPr>
-        <p:style>
-          <a:lnRef idx="2">
-            <a:schemeClr val="accent1">
-              <a:shade val="50000"/>
-            </a:schemeClr>
-          </a:lnRef>
-          <a:fillRef idx="1">
-            <a:schemeClr val="accent1"/>
-          </a:fillRef>
-          <a:effectRef idx="0">
-            <a:schemeClr val="accent1"/>
-          </a:effectRef>
-          <a:fontRef idx="minor">
-            <a:schemeClr val="lt1"/>
-          </a:fontRef>
-        </p:style>
-        <p:txBody>
-          <a:bodyPr rtlCol="0" anchor="ctr"/>
-          <a:lstStyle/>
-          <a:p>
-            <a:pPr algn="ctr"/>
-            <a:endParaRPr lang="de-DE"/>
-          </a:p>
-        </p:txBody>
-      </p:sp>
-      <p:sp>
-        <p:nvSpPr>
-          <p:cNvPr id="30" name="Flussdiagramm: Verbindungsstelle 29"/>
-          <p:cNvSpPr/>
-          <p:nvPr/>
-        </p:nvSpPr>
-        <p:spPr>
-          <a:xfrm>
-            <a:off x="9690847" y="4822450"/>
-            <a:ext cx="161365" cy="161926"/>
-          </a:xfrm>
-          <a:prstGeom prst="flowChartConnector">
-            <a:avLst/>
-          </a:prstGeom>
-          <a:solidFill>
-            <a:srgbClr val="92D050"/>
-          </a:solidFill>
-          <a:ln>
-            <a:solidFill>
-              <a:srgbClr val="92D050"/>
-            </a:solidFill>
-          </a:ln>
-        </p:spPr>
-        <p:style>
-          <a:lnRef idx="2">
-            <a:schemeClr val="accent1">
-              <a:shade val="50000"/>
-            </a:schemeClr>
-          </a:lnRef>
-          <a:fillRef idx="1">
-            <a:schemeClr val="accent1"/>
-          </a:fillRef>
-          <a:effectRef idx="0">
-            <a:schemeClr val="accent1"/>
-          </a:effectRef>
-          <a:fontRef idx="minor">
-            <a:schemeClr val="lt1"/>
-          </a:fontRef>
-        </p:style>
-        <p:txBody>
-          <a:bodyPr rtlCol="0" anchor="ctr"/>
-          <a:lstStyle/>
-          <a:p>
-            <a:pPr algn="ctr"/>
-            <a:endParaRPr lang="de-DE"/>
-          </a:p>
-        </p:txBody>
-      </p:sp>
-      <p:sp>
-        <p:nvSpPr>
-          <p:cNvPr id="31" name="Flussdiagramm: Verbindungsstelle 30"/>
-          <p:cNvSpPr/>
-          <p:nvPr/>
-        </p:nvSpPr>
-        <p:spPr>
-          <a:xfrm>
-            <a:off x="10094258" y="5557274"/>
-            <a:ext cx="161365" cy="161926"/>
-          </a:xfrm>
-          <a:prstGeom prst="flowChartConnector">
-            <a:avLst/>
-          </a:prstGeom>
-          <a:solidFill>
-            <a:srgbClr val="FF0000"/>
-          </a:solidFill>
-          <a:ln>
-            <a:solidFill>
-              <a:srgbClr val="FF0000"/>
-            </a:solidFill>
-          </a:ln>
-        </p:spPr>
-        <p:style>
-          <a:lnRef idx="2">
-            <a:schemeClr val="accent1">
-              <a:shade val="50000"/>
-            </a:schemeClr>
-          </a:lnRef>
-          <a:fillRef idx="1">
-            <a:schemeClr val="accent1"/>
-          </a:fillRef>
-          <a:effectRef idx="0">
-            <a:schemeClr val="accent1"/>
-          </a:effectRef>
-          <a:fontRef idx="minor">
-            <a:schemeClr val="lt1"/>
-          </a:fontRef>
-        </p:style>
-        <p:txBody>
-          <a:bodyPr rtlCol="0" anchor="ctr"/>
-          <a:lstStyle/>
-          <a:p>
-            <a:pPr algn="ctr"/>
-            <a:endParaRPr lang="de-DE"/>
-          </a:p>
-        </p:txBody>
-      </p:sp>
-      <p:sp>
-        <p:nvSpPr>
-          <p:cNvPr id="32" name="Flussdiagramm: Verbindungsstelle 31"/>
-          <p:cNvSpPr/>
-          <p:nvPr/>
-        </p:nvSpPr>
-        <p:spPr>
-          <a:xfrm>
-            <a:off x="9737119" y="5562038"/>
-            <a:ext cx="161365" cy="161926"/>
-          </a:xfrm>
-          <a:prstGeom prst="flowChartConnector">
-            <a:avLst/>
-          </a:prstGeom>
-          <a:solidFill>
-            <a:srgbClr val="FF0000"/>
-          </a:solidFill>
-          <a:ln>
-            <a:solidFill>
-              <a:srgbClr val="FF0000"/>
-            </a:solidFill>
-          </a:ln>
-        </p:spPr>
-        <p:style>
-          <a:lnRef idx="2">
-            <a:schemeClr val="accent1">
-              <a:shade val="50000"/>
-            </a:schemeClr>
-          </a:lnRef>
-          <a:fillRef idx="1">
-            <a:schemeClr val="accent1"/>
-          </a:fillRef>
-          <a:effectRef idx="0">
-            <a:schemeClr val="accent1"/>
-          </a:effectRef>
-          <a:fontRef idx="minor">
-            <a:schemeClr val="lt1"/>
-          </a:fontRef>
-        </p:style>
-        <p:txBody>
-          <a:bodyPr rtlCol="0" anchor="ctr"/>
-          <a:lstStyle/>
-          <a:p>
-            <a:pPr algn="ctr"/>
-            <a:endParaRPr lang="de-DE"/>
-          </a:p>
-        </p:txBody>
-      </p:sp>
-      <p:sp>
-        <p:nvSpPr>
-          <p:cNvPr id="33" name="Flussdiagramm: Verbindungsstelle 32"/>
-          <p:cNvSpPr/>
-          <p:nvPr/>
-        </p:nvSpPr>
-        <p:spPr>
-          <a:xfrm>
-            <a:off x="9397047" y="5562038"/>
-            <a:ext cx="161365" cy="161926"/>
-          </a:xfrm>
-          <a:prstGeom prst="flowChartConnector">
-            <a:avLst/>
-          </a:prstGeom>
-          <a:solidFill>
-            <a:srgbClr val="FFFF00"/>
-          </a:solidFill>
-          <a:ln>
-            <a:solidFill>
-              <a:srgbClr val="FFFF00"/>
-            </a:solidFill>
-          </a:ln>
-        </p:spPr>
-        <p:style>
-          <a:lnRef idx="2">
-            <a:schemeClr val="accent1">
-              <a:shade val="50000"/>
-            </a:schemeClr>
-          </a:lnRef>
-          <a:fillRef idx="1">
-            <a:schemeClr val="accent1"/>
-          </a:fillRef>
-          <a:effectRef idx="0">
-            <a:schemeClr val="accent1"/>
-          </a:effectRef>
-          <a:fontRef idx="minor">
-            <a:schemeClr val="lt1"/>
-          </a:fontRef>
-        </p:style>
-        <p:txBody>
-          <a:bodyPr rtlCol="0" anchor="ctr"/>
-          <a:lstStyle/>
-          <a:p>
-            <a:pPr algn="ctr"/>
-            <a:endParaRPr lang="de-DE"/>
-          </a:p>
-        </p:txBody>
-      </p:sp>
-      <p:sp>
-        <p:nvSpPr>
-          <p:cNvPr id="34" name="Flussdiagramm: Verbindungsstelle 33"/>
-          <p:cNvSpPr/>
-          <p:nvPr/>
-        </p:nvSpPr>
-        <p:spPr>
-          <a:xfrm>
-            <a:off x="11483789" y="3530281"/>
-            <a:ext cx="161365" cy="161926"/>
-          </a:xfrm>
-          <a:prstGeom prst="flowChartConnector">
-            <a:avLst/>
-          </a:prstGeom>
-          <a:solidFill>
-            <a:srgbClr val="FFFF00"/>
-          </a:solidFill>
-          <a:ln>
-            <a:solidFill>
-              <a:srgbClr val="FFFF00"/>
-            </a:solidFill>
-          </a:ln>
-        </p:spPr>
-        <p:style>
-          <a:lnRef idx="2">
-            <a:schemeClr val="accent1">
-              <a:shade val="50000"/>
-            </a:schemeClr>
-          </a:lnRef>
-          <a:fillRef idx="1">
-            <a:schemeClr val="accent1"/>
-          </a:fillRef>
-          <a:effectRef idx="0">
-            <a:schemeClr val="accent1"/>
-          </a:effectRef>
-          <a:fontRef idx="minor">
-            <a:schemeClr val="lt1"/>
-          </a:fontRef>
-        </p:style>
-        <p:txBody>
-          <a:bodyPr rtlCol="0" anchor="ctr"/>
-          <a:lstStyle/>
-          <a:p>
-            <a:pPr algn="ctr"/>
-            <a:endParaRPr lang="de-DE"/>
-          </a:p>
-        </p:txBody>
-      </p:sp>
-      <p:sp>
-        <p:nvSpPr>
-          <p:cNvPr id="35" name="Flussdiagramm: Verbindungsstelle 34"/>
-          <p:cNvSpPr/>
-          <p:nvPr/>
-        </p:nvSpPr>
-        <p:spPr>
-          <a:xfrm>
-            <a:off x="11213568" y="3544009"/>
-            <a:ext cx="161365" cy="161926"/>
-          </a:xfrm>
-          <a:prstGeom prst="flowChartConnector">
-            <a:avLst/>
-          </a:prstGeom>
-          <a:solidFill>
-            <a:srgbClr val="92D050"/>
-          </a:solidFill>
-          <a:ln>
-            <a:solidFill>
-              <a:srgbClr val="92D050"/>
-            </a:solidFill>
-          </a:ln>
-        </p:spPr>
-        <p:style>
-          <a:lnRef idx="2">
-            <a:schemeClr val="accent1">
-              <a:shade val="50000"/>
-            </a:schemeClr>
-          </a:lnRef>
-          <a:fillRef idx="1">
-            <a:schemeClr val="accent1"/>
-          </a:fillRef>
-          <a:effectRef idx="0">
-            <a:schemeClr val="accent1"/>
-          </a:effectRef>
-          <a:fontRef idx="minor">
-            <a:schemeClr val="lt1"/>
-          </a:fontRef>
-        </p:style>
-        <p:txBody>
-          <a:bodyPr rtlCol="0" anchor="ctr"/>
-          <a:lstStyle/>
-          <a:p>
-            <a:pPr algn="ctr"/>
-            <a:endParaRPr lang="de-DE"/>
-          </a:p>
-        </p:txBody>
-      </p:sp>
-      <p:sp>
-        <p:nvSpPr>
-          <p:cNvPr id="36" name="Flussdiagramm: Verbindungsstelle 35"/>
-          <p:cNvSpPr/>
-          <p:nvPr/>
-        </p:nvSpPr>
-        <p:spPr>
-          <a:xfrm>
-            <a:off x="10941421" y="3544009"/>
-            <a:ext cx="161365" cy="161926"/>
-          </a:xfrm>
-          <a:prstGeom prst="flowChartConnector">
-            <a:avLst/>
-          </a:prstGeom>
-          <a:solidFill>
-            <a:srgbClr val="92D050"/>
-          </a:solidFill>
-          <a:ln>
-            <a:solidFill>
-              <a:srgbClr val="92D050"/>
-            </a:solidFill>
-          </a:ln>
-        </p:spPr>
-        <p:style>
-          <a:lnRef idx="2">
-            <a:schemeClr val="accent1">
-              <a:shade val="50000"/>
-            </a:schemeClr>
-          </a:lnRef>
-          <a:fillRef idx="1">
-            <a:schemeClr val="accent1"/>
-          </a:fillRef>
-          <a:effectRef idx="0">
-            <a:schemeClr val="accent1"/>
-          </a:effectRef>
-          <a:fontRef idx="minor">
-            <a:schemeClr val="lt1"/>
-          </a:fontRef>
-        </p:style>
-        <p:txBody>
-          <a:bodyPr rtlCol="0" anchor="ctr"/>
-          <a:lstStyle/>
-          <a:p>
-            <a:pPr algn="ctr"/>
-            <a:endParaRPr lang="de-DE"/>
-          </a:p>
-        </p:txBody>
-      </p:sp>
     </p:spTree>
     <p:extLst>
       <p:ext uri="{BB962C8B-B14F-4D97-AF65-F5344CB8AC3E}">
@@ -12920,6 +12357,13 @@
   <p:transition spd="slow">
     <p:push dir="u"/>
   </p:transition>
+  <p:timing>
+    <p:tnLst>
+      <p:par>
+        <p:cTn id="1" dur="indefinite" restart="never" nodeType="tmRoot"/>
+      </p:par>
+    </p:tnLst>
+  </p:timing>
 </p:sld>
 </file>
 
@@ -12945,7 +12389,7 @@
           <p:cNvPr id="14" name="Content Placeholder 13">
             <a:extLst>
               <a:ext uri="{FF2B5EF4-FFF2-40B4-BE49-F238E27FC236}">
-                <a16:creationId xmlns:a16="http://schemas.microsoft.com/office/drawing/2014/main" xmlns="" id="{86EA5D6E-C62C-47D0-8138-CB405D04E4E4}"/>
+                <a16:creationId xmlns="" xmlns:a16="http://schemas.microsoft.com/office/drawing/2014/main" id="{86EA5D6E-C62C-47D0-8138-CB405D04E4E4}"/>
               </a:ext>
             </a:extLst>
           </p:cNvPr>
@@ -13008,7 +12452,27 @@
                 </a:solidFill>
                 <a:cs typeface="Times New Roman" panose="02020603050405020304" pitchFamily="18" charset="0"/>
               </a:rPr>
-              <a:t>Erstellen des Datenformats nach Vorgaben des Fraunhofer Instituts</a:t>
+              <a:t>Erstellen des Datenformats nach Vorgaben des Fraunhofer </a:t>
+            </a:r>
+            <a:r>
+              <a:rPr lang="de-DE" sz="2400" dirty="0" smtClean="0">
+                <a:solidFill>
+                  <a:schemeClr val="tx1"/>
+                </a:solidFill>
+                <a:cs typeface="Times New Roman" panose="02020603050405020304" pitchFamily="18" charset="0"/>
+              </a:rPr>
+              <a:t>Instituts</a:t>
+            </a:r>
+          </a:p>
+          <a:p>
+            <a:r>
+              <a:rPr lang="de-DE" sz="2400" dirty="0" smtClean="0">
+                <a:solidFill>
+                  <a:schemeClr val="tx1"/>
+                </a:solidFill>
+                <a:cs typeface="Times New Roman" panose="02020603050405020304" pitchFamily="18" charset="0"/>
+              </a:rPr>
+              <a:t>Verteilung berechnen durch Permutation bei der Automatisierung</a:t>
             </a:r>
             <a:endParaRPr lang="en-GB" sz="2400" dirty="0"/>
           </a:p>
@@ -13036,7 +12500,7 @@
         </p:blipFill>
         <p:spPr>
           <a:xfrm>
-            <a:off x="3869268" y="4870344"/>
+            <a:off x="3869268" y="5247800"/>
             <a:ext cx="6956111" cy="854676"/>
           </a:xfrm>
           <a:prstGeom prst="rect">
@@ -13049,7 +12513,7 @@
           <p:cNvPr id="9" name="Titel 1">
             <a:extLst>
               <a:ext uri="{FF2B5EF4-FFF2-40B4-BE49-F238E27FC236}">
-                <a16:creationId xmlns:a16="http://schemas.microsoft.com/office/drawing/2014/main" xmlns="" id="{E5885248-D7EC-46A9-881C-FEC0809E0C48}"/>
+                <a16:creationId xmlns="" xmlns:a16="http://schemas.microsoft.com/office/drawing/2014/main" id="{E5885248-D7EC-46A9-881C-FEC0809E0C48}"/>
               </a:ext>
             </a:extLst>
           </p:cNvPr>
@@ -13109,7 +12573,7 @@
           <p:cNvPr id="16" name="Title 15">
             <a:extLst>
               <a:ext uri="{FF2B5EF4-FFF2-40B4-BE49-F238E27FC236}">
-                <a16:creationId xmlns:a16="http://schemas.microsoft.com/office/drawing/2014/main" xmlns="" id="{0311113E-B278-4458-8FCF-AD752B46CF64}"/>
+                <a16:creationId xmlns="" xmlns:a16="http://schemas.microsoft.com/office/drawing/2014/main" id="{0311113E-B278-4458-8FCF-AD752B46CF64}"/>
               </a:ext>
             </a:extLst>
           </p:cNvPr>
@@ -13148,6 +12612,13 @@
   <p:transition spd="slow">
     <p:push dir="u"/>
   </p:transition>
+  <p:timing>
+    <p:tnLst>
+      <p:par>
+        <p:cTn id="1" dur="indefinite" restart="never" nodeType="tmRoot"/>
+      </p:par>
+    </p:tnLst>
+  </p:timing>
 </p:sld>
 </file>
 
@@ -13211,6 +12682,13 @@
   <p:transition spd="slow">
     <p:push dir="u"/>
   </p:transition>
+  <p:timing>
+    <p:tnLst>
+      <p:par>
+        <p:cTn id="1" dur="indefinite" restart="never" nodeType="tmRoot"/>
+      </p:par>
+    </p:tnLst>
+  </p:timing>
 </p:sld>
 </file>
 
@@ -13236,7 +12714,7 @@
           <p:cNvPr id="2" name="Titel 1">
             <a:extLst>
               <a:ext uri="{FF2B5EF4-FFF2-40B4-BE49-F238E27FC236}">
-                <a16:creationId xmlns:a16="http://schemas.microsoft.com/office/drawing/2014/main" xmlns="" id="{F92BECF1-38C4-42E7-ABE8-26C37206B6D1}"/>
+                <a16:creationId xmlns="" xmlns:a16="http://schemas.microsoft.com/office/drawing/2014/main" id="{F92BECF1-38C4-42E7-ABE8-26C37206B6D1}"/>
               </a:ext>
             </a:extLst>
           </p:cNvPr>
@@ -13247,13 +12725,20 @@
             <p:ph type="title"/>
           </p:nvPr>
         </p:nvSpPr>
-        <p:spPr/>
-        <p:txBody>
-          <a:bodyPr/>
-          <a:lstStyle/>
-          <a:p>
-            <a:r>
-              <a:rPr lang="de-DE" dirty="0"/>
+        <p:spPr>
+          <a:xfrm>
+            <a:off x="252918" y="1123837"/>
+            <a:ext cx="3218701" cy="4601183"/>
+          </a:xfrm>
+        </p:spPr>
+        <p:txBody>
+          <a:bodyPr>
+            <a:normAutofit/>
+          </a:bodyPr>
+          <a:lstStyle/>
+          <a:p>
+            <a:r>
+              <a:rPr lang="de-DE" sz="3200" dirty="0"/>
               <a:t>Datenerzeugung</a:t>
             </a:r>
           </a:p>
@@ -13264,7 +12749,7 @@
           <p:cNvPr id="3" name="Inhaltsplatzhalter 2">
             <a:extLst>
               <a:ext uri="{FF2B5EF4-FFF2-40B4-BE49-F238E27FC236}">
-                <a16:creationId xmlns:a16="http://schemas.microsoft.com/office/drawing/2014/main" xmlns="" id="{74BE07E9-9FDA-4058-9B8B-903BFFE92079}"/>
+                <a16:creationId xmlns="" xmlns:a16="http://schemas.microsoft.com/office/drawing/2014/main" id="{74BE07E9-9FDA-4058-9B8B-903BFFE92079}"/>
               </a:ext>
             </a:extLst>
           </p:cNvPr>
@@ -13345,8 +12830,21 @@
                   <a:schemeClr val="tx1"/>
                 </a:solidFill>
               </a:rPr>
-              <a:t>Literatur-Recherche über Filter für neuronale Netze wurde zu nächstem Sprint verschoben</a:t>
-            </a:r>
+              <a:t>Literatur-Recherche über Filter </a:t>
+            </a:r>
+            <a:r>
+              <a:rPr lang="de-DE" dirty="0" smtClean="0">
+                <a:solidFill>
+                  <a:schemeClr val="tx1"/>
+                </a:solidFill>
+              </a:rPr>
+              <a:t>der Datenvorverarbeitung</a:t>
+            </a:r>
+            <a:endParaRPr lang="de-DE" dirty="0">
+              <a:solidFill>
+                <a:schemeClr val="tx1"/>
+              </a:solidFill>
+            </a:endParaRPr>
           </a:p>
         </p:txBody>
       </p:sp>
@@ -13363,6 +12861,13 @@
   <p:transition spd="slow">
     <p:push dir="u"/>
   </p:transition>
+  <p:timing>
+    <p:tnLst>
+      <p:par>
+        <p:cTn id="1" dur="indefinite" restart="never" nodeType="tmRoot"/>
+      </p:par>
+    </p:tnLst>
+  </p:timing>
 </p:sld>
 </file>
 

</xml_diff>